<commit_message>
vault backup: 2024-07-18 15:49:36
</commit_message>
<xml_diff>
--- a/06-ppt/discussion/0719.pptx
+++ b/06-ppt/discussion/0719.pptx
@@ -3,38 +3,24 @@
 <p:presentation xmlns:a="http://schemas.openxmlformats.org/drawingml/2006/main" xmlns:r="http://schemas.openxmlformats.org/officeDocument/2006/relationships" xmlns:p="http://schemas.openxmlformats.org/presentationml/2006/main" embedTrueTypeFonts="1" saveSubsetFonts="1">
   <p:sldMasterIdLst>
     <p:sldMasterId id="2147483648" r:id="rId1"/>
-    <p:sldMasterId id="2147483660" r:id="rId2"/>
+    <p:sldMasterId id="2147483660" r:id="rId3"/>
   </p:sldMasterIdLst>
   <p:notesMasterIdLst>
-    <p:notesMasterId r:id="rId9"/>
+    <p:notesMasterId r:id="rId6"/>
   </p:notesMasterIdLst>
   <p:sldIdLst>
-    <p:sldId id="256" r:id="rId3"/>
-    <p:sldId id="264" r:id="rId4"/>
-    <p:sldId id="259" r:id="rId5"/>
-    <p:sldId id="260" r:id="rId6"/>
-    <p:sldId id="261" r:id="rId7"/>
-    <p:sldId id="262" r:id="rId8"/>
+    <p:sldId id="256" r:id="rId4"/>
+    <p:sldId id="264" r:id="rId5"/>
+    <p:sldId id="270" r:id="rId7"/>
+    <p:sldId id="271" r:id="rId8"/>
+    <p:sldId id="269" r:id="rId9"/>
   </p:sldIdLst>
   <p:sldSz cx="12192000" cy="6858000"/>
   <p:notesSz cx="6858000" cy="9144000"/>
   <p:embeddedFontLst>
     <p:embeddedFont>
-      <p:font typeface="Cambria Math" panose="02040503050406030204" pitchFamily="18" charset="0"/>
-      <p:regular r:id="rId10"/>
-    </p:embeddedFont>
-    <p:embeddedFont>
-      <p:font typeface="DejaVu Math TeX Gyre" panose="02000503000000000000" pitchFamily="2" charset="0"/>
-      <p:regular r:id="rId11"/>
-    </p:embeddedFont>
-    <p:embeddedFont>
-      <p:font typeface="等线" panose="02010600030101010101" pitchFamily="2" charset="-122"/>
-      <p:regular r:id="rId12"/>
-      <p:bold r:id="rId13"/>
-    </p:embeddedFont>
-    <p:embeddedFont>
-      <p:font typeface="等线 Light" panose="02010600030101010101" pitchFamily="2" charset="-122"/>
-      <p:regular r:id="rId14"/>
+      <p:font typeface="等线" charset="0"/>
+      <p:regular r:id="rId13"/>
     </p:embeddedFont>
   </p:embeddedFontLst>
   <p:defaultTextStyle>
@@ -135,7 +121,7 @@
   <p:extLst>
     <p:ext uri="{EFAFB233-063F-42B5-8137-9DF3F51BA10A}">
       <p15:sldGuideLst xmlns:p15="http://schemas.microsoft.com/office/powerpoint/2012/main">
-        <p15:guide id="1" orient="horz" pos="2160" userDrawn="1">
+        <p15:guide id="1" orient="horz" pos="2174" userDrawn="1">
           <p15:clr>
             <a:srgbClr val="A4A3A4"/>
           </p15:clr>
@@ -233,7 +219,6 @@
           <a:p>
             <a:fld id="{60A92938-FD9F-4358-9210-CF762F0206A4}" type="datetimeFigureOut">
               <a:rPr lang="zh-CN" altLang="en-US" smtClean="0"/>
-              <a:t>2024/7/1</a:t>
             </a:fld>
             <a:endParaRPr lang="zh-CN" altLang="en-US"/>
           </a:p>
@@ -300,6 +285,7 @@
               <a:rPr lang="zh-CN" altLang="en-US"/>
               <a:t>单击此处编辑母版文本样式</a:t>
             </a:r>
+            <a:endParaRPr lang="zh-CN" altLang="en-US"/>
           </a:p>
           <a:p>
             <a:pPr lvl="1"/>
@@ -307,6 +293,7 @@
               <a:rPr lang="zh-CN" altLang="en-US"/>
               <a:t>二级</a:t>
             </a:r>
+            <a:endParaRPr lang="zh-CN" altLang="en-US"/>
           </a:p>
           <a:p>
             <a:pPr lvl="2"/>
@@ -314,6 +301,7 @@
               <a:rPr lang="zh-CN" altLang="en-US"/>
               <a:t>三级</a:t>
             </a:r>
+            <a:endParaRPr lang="zh-CN" altLang="en-US"/>
           </a:p>
           <a:p>
             <a:pPr lvl="3"/>
@@ -321,6 +309,7 @@
               <a:rPr lang="zh-CN" altLang="en-US"/>
               <a:t>四级</a:t>
             </a:r>
+            <a:endParaRPr lang="zh-CN" altLang="en-US"/>
           </a:p>
           <a:p>
             <a:pPr lvl="4"/>
@@ -328,6 +317,7 @@
               <a:rPr lang="zh-CN" altLang="en-US"/>
               <a:t>五级</a:t>
             </a:r>
+            <a:endParaRPr lang="zh-CN" altLang="en-US"/>
           </a:p>
         </p:txBody>
       </p:sp>
@@ -391,18 +381,12 @@
           <a:p>
             <a:fld id="{4E0213E6-8C4C-437E-84EC-B5D10E90E209}" type="slidenum">
               <a:rPr lang="zh-CN" altLang="en-US" smtClean="0"/>
-              <a:t>‹#›</a:t>
             </a:fld>
             <a:endParaRPr lang="zh-CN" altLang="en-US"/>
           </a:p>
         </p:txBody>
       </p:sp>
     </p:spTree>
-    <p:extLst>
-      <p:ext uri="{BB962C8B-B14F-4D97-AF65-F5344CB8AC3E}">
-        <p14:creationId xmlns:p14="http://schemas.microsoft.com/office/powerpoint/2010/main" val="232822178"/>
-      </p:ext>
-    </p:extLst>
   </p:cSld>
   <p:clrMap bg1="lt1" tx1="dk1" bg2="lt2" tx2="dk2" accent1="accent1" accent2="accent2" accent3="accent3" accent4="accent4" accent5="accent5" accent6="accent6" hlink="hlink" folHlink="folHlink"/>
   <p:notesStyle>
@@ -558,18 +542,23 @@
               <a:buSzTx/>
               <a:buFontTx/>
               <a:buNone/>
-              <a:tabLst/>
               <a:defRPr/>
             </a:pPr>
             <a:r>
               <a:rPr lang="en-US" altLang="zh-CN" sz="1800" kern="100" dirty="0">
                 <a:effectLst/>
                 <a:latin typeface="Calibri" panose="020F0502020204030204" pitchFamily="34" charset="0"/>
-                <a:ea typeface="宋体" panose="02010600030101010101" pitchFamily="2" charset="-122"/>
-                <a:cs typeface="Times New Roman" panose="02020603050405020304" pitchFamily="18" charset="0"/>
+                <a:ea typeface="宋体" pitchFamily="2" charset="-122"/>
+                <a:cs typeface="Times New Roman" panose="02020503050405090304" pitchFamily="18" charset="0"/>
               </a:rPr>
               <a:t>ROS2 consists of three basic units</a:t>
             </a:r>
+            <a:endParaRPr lang="en-US" altLang="zh-CN" sz="1800" kern="100" dirty="0">
+              <a:effectLst/>
+              <a:latin typeface="Calibri" panose="020F0502020204030204" pitchFamily="34" charset="0"/>
+              <a:ea typeface="宋体" pitchFamily="2" charset="-122"/>
+              <a:cs typeface="Times New Roman" panose="02020503050405090304" pitchFamily="18" charset="0"/>
+            </a:endParaRPr>
           </a:p>
           <a:p>
             <a:endParaRPr lang="zh-CN" altLang="en-US" dirty="0"/>
@@ -593,18 +582,12 @@
           <a:p>
             <a:fld id="{4E0213E6-8C4C-437E-84EC-B5D10E90E209}" type="slidenum">
               <a:rPr lang="zh-CN" altLang="en-US" smtClean="0"/>
-              <a:t>2</a:t>
             </a:fld>
             <a:endParaRPr lang="zh-CN" altLang="en-US"/>
           </a:p>
         </p:txBody>
       </p:sp>
     </p:spTree>
-    <p:extLst>
-      <p:ext uri="{BB962C8B-B14F-4D97-AF65-F5344CB8AC3E}">
-        <p14:creationId xmlns:p14="http://schemas.microsoft.com/office/powerpoint/2010/main" val="510871990"/>
-      </p:ext>
-    </p:extLst>
   </p:cSld>
   <p:clrMapOvr>
     <a:masterClrMapping/>
@@ -656,6 +639,39 @@
           <a:bodyPr/>
           <a:lstStyle/>
           <a:p>
+            <a:pPr marL="0" marR="0" lvl="0" indent="0" algn="l" defTabSz="914400" rtl="0" eaLnBrk="1" fontAlgn="auto" latinLnBrk="0" hangingPunct="1">
+              <a:lnSpc>
+                <a:spcPct val="100000"/>
+              </a:lnSpc>
+              <a:spcBef>
+                <a:spcPts val="0"/>
+              </a:spcBef>
+              <a:spcAft>
+                <a:spcPts val="0"/>
+              </a:spcAft>
+              <a:buClrTx/>
+              <a:buSzTx/>
+              <a:buFontTx/>
+              <a:buNone/>
+              <a:defRPr/>
+            </a:pPr>
+            <a:r>
+              <a:rPr lang="en-US" altLang="zh-CN" sz="1800" kern="100" dirty="0">
+                <a:effectLst/>
+                <a:latin typeface="Calibri" panose="020F0502020204030204" pitchFamily="34" charset="0"/>
+                <a:ea typeface="宋体" pitchFamily="2" charset="-122"/>
+                <a:cs typeface="Times New Roman" panose="02020503050405090304" pitchFamily="18" charset="0"/>
+              </a:rPr>
+              <a:t>ROS2 consists of three basic units</a:t>
+            </a:r>
+            <a:endParaRPr lang="en-US" altLang="zh-CN" sz="1800" kern="100" dirty="0">
+              <a:effectLst/>
+              <a:latin typeface="Calibri" panose="020F0502020204030204" pitchFamily="34" charset="0"/>
+              <a:ea typeface="宋体" pitchFamily="2" charset="-122"/>
+              <a:cs typeface="Times New Roman" panose="02020503050405090304" pitchFamily="18" charset="0"/>
+            </a:endParaRPr>
+          </a:p>
+          <a:p>
             <a:endParaRPr lang="zh-CN" altLang="en-US" dirty="0"/>
           </a:p>
         </p:txBody>
@@ -677,18 +693,12 @@
           <a:p>
             <a:fld id="{4E0213E6-8C4C-437E-84EC-B5D10E90E209}" type="slidenum">
               <a:rPr lang="zh-CN" altLang="en-US" smtClean="0"/>
-              <a:t>5</a:t>
             </a:fld>
             <a:endParaRPr lang="zh-CN" altLang="en-US"/>
           </a:p>
         </p:txBody>
       </p:sp>
     </p:spTree>
-    <p:extLst>
-      <p:ext uri="{BB962C8B-B14F-4D97-AF65-F5344CB8AC3E}">
-        <p14:creationId xmlns:p14="http://schemas.microsoft.com/office/powerpoint/2010/main" val="1971515000"/>
-      </p:ext>
-    </p:extLst>
   </p:cSld>
   <p:clrMapOvr>
     <a:masterClrMapping/>
@@ -754,36 +764,134 @@
               <a:buSzTx/>
               <a:buFontTx/>
               <a:buNone/>
-              <a:tabLst/>
               <a:defRPr/>
             </a:pPr>
             <a:r>
               <a:rPr lang="en-US" altLang="zh-CN" sz="1800" kern="100" dirty="0">
                 <a:effectLst/>
                 <a:latin typeface="Calibri" panose="020F0502020204030204" pitchFamily="34" charset="0"/>
-                <a:ea typeface="宋体" panose="02010600030101010101" pitchFamily="2" charset="-122"/>
-                <a:cs typeface="Times New Roman" panose="02020603050405020304" pitchFamily="18" charset="0"/>
+                <a:ea typeface="宋体" pitchFamily="2" charset="-122"/>
+                <a:cs typeface="Times New Roman" panose="02020503050405090304" pitchFamily="18" charset="0"/>
               </a:rPr>
-              <a:t>Modifying the thread scheduling policy and period will affect the operation of the ros2 program. However, the Linux system under the non-real-time kernel has a greater impact on the real-time performance of the ros2 program. Because other system processes have higher priority under the non-real-time kernel, even if we use "</a:t>
-            </a:r>
-            <a:r>
-              <a:rPr lang="en-US" altLang="zh-CN" sz="1800" kern="100" dirty="0" err="1">
-                <a:effectLst/>
-                <a:latin typeface="Calibri" panose="020F0502020204030204" pitchFamily="34" charset="0"/>
-                <a:ea typeface="宋体" panose="02010600030101010101" pitchFamily="2" charset="-122"/>
-                <a:cs typeface="Times New Roman" panose="02020603050405020304" pitchFamily="18" charset="0"/>
-              </a:rPr>
-              <a:t>chrt</a:t>
-            </a:r>
+              <a:t>ROS2 consists of three basic units</a:t>
+            </a:r>
+            <a:endParaRPr lang="en-US" altLang="zh-CN" sz="1800" kern="100" dirty="0">
+              <a:effectLst/>
+              <a:latin typeface="Calibri" panose="020F0502020204030204" pitchFamily="34" charset="0"/>
+              <a:ea typeface="宋体" pitchFamily="2" charset="-122"/>
+              <a:cs typeface="Times New Roman" panose="02020503050405090304" pitchFamily="18" charset="0"/>
+            </a:endParaRPr>
+          </a:p>
+          <a:p>
+            <a:endParaRPr lang="zh-CN" altLang="en-US" dirty="0"/>
+          </a:p>
+        </p:txBody>
+      </p:sp>
+      <p:sp>
+        <p:nvSpPr>
+          <p:cNvPr id="4" name="灯片编号占位符 3"/>
+          <p:cNvSpPr>
+            <a:spLocks noGrp="1"/>
+          </p:cNvSpPr>
+          <p:nvPr>
+            <p:ph type="sldNum" sz="quarter" idx="5"/>
+          </p:nvPr>
+        </p:nvSpPr>
+        <p:spPr/>
+        <p:txBody>
+          <a:bodyPr/>
+          <a:lstStyle/>
+          <a:p>
+            <a:fld id="{4E0213E6-8C4C-437E-84EC-B5D10E90E209}" type="slidenum">
+              <a:rPr lang="zh-CN" altLang="en-US" smtClean="0"/>
+            </a:fld>
+            <a:endParaRPr lang="zh-CN" altLang="en-US"/>
+          </a:p>
+        </p:txBody>
+      </p:sp>
+    </p:spTree>
+  </p:cSld>
+  <p:clrMapOvr>
+    <a:masterClrMapping/>
+  </p:clrMapOvr>
+</p:notes>
+</file>
+
+<file path=ppt/notesSlides/notesSlide4.xml><?xml version="1.0" encoding="utf-8"?>
+<p:notes xmlns:a="http://schemas.openxmlformats.org/drawingml/2006/main" xmlns:r="http://schemas.openxmlformats.org/officeDocument/2006/relationships" xmlns:p="http://schemas.openxmlformats.org/presentationml/2006/main">
+  <p:cSld>
+    <p:spTree>
+      <p:nvGrpSpPr>
+        <p:cNvPr id="1" name=""/>
+        <p:cNvGrpSpPr/>
+        <p:nvPr/>
+      </p:nvGrpSpPr>
+      <p:grpSpPr>
+        <a:xfrm>
+          <a:off x="0" y="0"/>
+          <a:ext cx="0" cy="0"/>
+          <a:chOff x="0" y="0"/>
+          <a:chExt cx="0" cy="0"/>
+        </a:xfrm>
+      </p:grpSpPr>
+      <p:sp>
+        <p:nvSpPr>
+          <p:cNvPr id="2" name="幻灯片图像占位符 1"/>
+          <p:cNvSpPr>
+            <a:spLocks noGrp="1" noRot="1" noChangeAspect="1"/>
+          </p:cNvSpPr>
+          <p:nvPr>
+            <p:ph type="sldImg"/>
+          </p:nvPr>
+        </p:nvSpPr>
+        <p:spPr/>
+      </p:sp>
+      <p:sp>
+        <p:nvSpPr>
+          <p:cNvPr id="3" name="备注占位符 2"/>
+          <p:cNvSpPr>
+            <a:spLocks noGrp="1"/>
+          </p:cNvSpPr>
+          <p:nvPr>
+            <p:ph type="body" idx="1"/>
+          </p:nvPr>
+        </p:nvSpPr>
+        <p:spPr/>
+        <p:txBody>
+          <a:bodyPr/>
+          <a:lstStyle/>
+          <a:p>
+            <a:pPr marL="0" marR="0" lvl="0" indent="0" algn="l" defTabSz="914400" rtl="0" eaLnBrk="1" fontAlgn="auto" latinLnBrk="0" hangingPunct="1">
+              <a:lnSpc>
+                <a:spcPct val="100000"/>
+              </a:lnSpc>
+              <a:spcBef>
+                <a:spcPts val="0"/>
+              </a:spcBef>
+              <a:spcAft>
+                <a:spcPts val="0"/>
+              </a:spcAft>
+              <a:buClrTx/>
+              <a:buSzTx/>
+              <a:buFontTx/>
+              <a:buNone/>
+              <a:defRPr/>
+            </a:pPr>
             <a:r>
               <a:rPr lang="en-US" altLang="zh-CN" sz="1800" kern="100" dirty="0">
                 <a:effectLst/>
                 <a:latin typeface="Calibri" panose="020F0502020204030204" pitchFamily="34" charset="0"/>
-                <a:ea typeface="宋体" panose="02010600030101010101" pitchFamily="2" charset="-122"/>
-                <a:cs typeface="Times New Roman" panose="02020603050405020304" pitchFamily="18" charset="0"/>
+                <a:ea typeface="宋体" pitchFamily="2" charset="-122"/>
+                <a:cs typeface="Times New Roman" panose="02020503050405090304" pitchFamily="18" charset="0"/>
               </a:rPr>
-              <a:t>" to modify the thread, it is not enough to improve performance.</a:t>
-            </a:r>
+              <a:t>ROS2 consists of three basic units</a:t>
+            </a:r>
+            <a:endParaRPr lang="en-US" altLang="zh-CN" sz="1800" kern="100" dirty="0">
+              <a:effectLst/>
+              <a:latin typeface="Calibri" panose="020F0502020204030204" pitchFamily="34" charset="0"/>
+              <a:ea typeface="宋体" pitchFamily="2" charset="-122"/>
+              <a:cs typeface="Times New Roman" panose="02020503050405090304" pitchFamily="18" charset="0"/>
+            </a:endParaRPr>
           </a:p>
           <a:p>
             <a:endParaRPr lang="zh-CN" altLang="en-US" dirty="0"/>
@@ -807,18 +915,12 @@
           <a:p>
             <a:fld id="{4E0213E6-8C4C-437E-84EC-B5D10E90E209}" type="slidenum">
               <a:rPr lang="zh-CN" altLang="en-US" smtClean="0"/>
-              <a:t>6</a:t>
             </a:fld>
             <a:endParaRPr lang="zh-CN" altLang="en-US"/>
           </a:p>
         </p:txBody>
       </p:sp>
     </p:spTree>
-    <p:extLst>
-      <p:ext uri="{BB962C8B-B14F-4D97-AF65-F5344CB8AC3E}">
-        <p14:creationId xmlns:p14="http://schemas.microsoft.com/office/powerpoint/2010/main" val="1083276759"/>
-      </p:ext>
-    </p:extLst>
   </p:cSld>
   <p:clrMapOvr>
     <a:masterClrMapping/>
@@ -871,6 +973,7 @@
               <a:rPr lang="zh-CN" altLang="en-US"/>
               <a:t>单击此处编辑母版标题样式</a:t>
             </a:r>
+            <a:endParaRPr lang="zh-CN" altLang="en-US"/>
           </a:p>
         </p:txBody>
       </p:sp>
@@ -935,6 +1038,7 @@
               <a:rPr lang="zh-CN" altLang="en-US"/>
               <a:t>单击此处编辑母版副标题样式</a:t>
             </a:r>
+            <a:endParaRPr lang="zh-CN" altLang="en-US"/>
           </a:p>
         </p:txBody>
       </p:sp>
@@ -955,7 +1059,6 @@
           <a:p>
             <a:fld id="{51FD5836-1B78-4E70-983F-F8F353C30F27}" type="datetimeFigureOut">
               <a:rPr lang="zh-CN" altLang="en-US" smtClean="0"/>
-              <a:t>2024/7/1</a:t>
             </a:fld>
             <a:endParaRPr lang="zh-CN" altLang="en-US"/>
           </a:p>
@@ -997,7 +1100,6 @@
           <a:p>
             <a:fld id="{AB80B9A9-C03D-4F64-ADE2-7C0EC2978D5F}" type="slidenum">
               <a:rPr lang="zh-CN" altLang="en-US" smtClean="0"/>
-              <a:t>‹#›</a:t>
             </a:fld>
             <a:endParaRPr lang="zh-CN" altLang="en-US"/>
           </a:p>
@@ -1047,6 +1149,7 @@
               <a:rPr lang="zh-CN" altLang="en-US"/>
               <a:t>单击此处编辑母版标题样式</a:t>
             </a:r>
+            <a:endParaRPr lang="zh-CN" altLang="en-US"/>
           </a:p>
         </p:txBody>
       </p:sp>
@@ -1070,6 +1173,7 @@
               <a:rPr lang="zh-CN" altLang="en-US"/>
               <a:t>单击此处编辑母版文本样式</a:t>
             </a:r>
+            <a:endParaRPr lang="zh-CN" altLang="en-US"/>
           </a:p>
           <a:p>
             <a:pPr lvl="1"/>
@@ -1077,6 +1181,7 @@
               <a:rPr lang="zh-CN" altLang="en-US"/>
               <a:t>二级</a:t>
             </a:r>
+            <a:endParaRPr lang="zh-CN" altLang="en-US"/>
           </a:p>
           <a:p>
             <a:pPr lvl="2"/>
@@ -1084,6 +1189,7 @@
               <a:rPr lang="zh-CN" altLang="en-US"/>
               <a:t>三级</a:t>
             </a:r>
+            <a:endParaRPr lang="zh-CN" altLang="en-US"/>
           </a:p>
           <a:p>
             <a:pPr lvl="3"/>
@@ -1091,6 +1197,7 @@
               <a:rPr lang="zh-CN" altLang="en-US"/>
               <a:t>四级</a:t>
             </a:r>
+            <a:endParaRPr lang="zh-CN" altLang="en-US"/>
           </a:p>
           <a:p>
             <a:pPr lvl="4"/>
@@ -1098,6 +1205,7 @@
               <a:rPr lang="zh-CN" altLang="en-US"/>
               <a:t>五级</a:t>
             </a:r>
+            <a:endParaRPr lang="zh-CN" altLang="en-US"/>
           </a:p>
         </p:txBody>
       </p:sp>
@@ -1118,7 +1226,6 @@
           <a:p>
             <a:fld id="{51FD5836-1B78-4E70-983F-F8F353C30F27}" type="datetimeFigureOut">
               <a:rPr lang="zh-CN" altLang="en-US" smtClean="0"/>
-              <a:t>2024/7/1</a:t>
             </a:fld>
             <a:endParaRPr lang="zh-CN" altLang="en-US"/>
           </a:p>
@@ -1160,7 +1267,6 @@
           <a:p>
             <a:fld id="{AB80B9A9-C03D-4F64-ADE2-7C0EC2978D5F}" type="slidenum">
               <a:rPr lang="zh-CN" altLang="en-US" smtClean="0"/>
-              <a:t>‹#›</a:t>
             </a:fld>
             <a:endParaRPr lang="zh-CN" altLang="en-US"/>
           </a:p>
@@ -1215,6 +1321,7 @@
               <a:rPr lang="zh-CN" altLang="en-US"/>
               <a:t>单击此处编辑母版标题样式</a:t>
             </a:r>
+            <a:endParaRPr lang="zh-CN" altLang="en-US"/>
           </a:p>
         </p:txBody>
       </p:sp>
@@ -1243,6 +1350,7 @@
               <a:rPr lang="zh-CN" altLang="en-US"/>
               <a:t>单击此处编辑母版文本样式</a:t>
             </a:r>
+            <a:endParaRPr lang="zh-CN" altLang="en-US"/>
           </a:p>
           <a:p>
             <a:pPr lvl="1"/>
@@ -1250,6 +1358,7 @@
               <a:rPr lang="zh-CN" altLang="en-US"/>
               <a:t>二级</a:t>
             </a:r>
+            <a:endParaRPr lang="zh-CN" altLang="en-US"/>
           </a:p>
           <a:p>
             <a:pPr lvl="2"/>
@@ -1257,6 +1366,7 @@
               <a:rPr lang="zh-CN" altLang="en-US"/>
               <a:t>三级</a:t>
             </a:r>
+            <a:endParaRPr lang="zh-CN" altLang="en-US"/>
           </a:p>
           <a:p>
             <a:pPr lvl="3"/>
@@ -1264,6 +1374,7 @@
               <a:rPr lang="zh-CN" altLang="en-US"/>
               <a:t>四级</a:t>
             </a:r>
+            <a:endParaRPr lang="zh-CN" altLang="en-US"/>
           </a:p>
           <a:p>
             <a:pPr lvl="4"/>
@@ -1271,6 +1382,7 @@
               <a:rPr lang="zh-CN" altLang="en-US"/>
               <a:t>五级</a:t>
             </a:r>
+            <a:endParaRPr lang="zh-CN" altLang="en-US"/>
           </a:p>
         </p:txBody>
       </p:sp>
@@ -1291,7 +1403,6 @@
           <a:p>
             <a:fld id="{51FD5836-1B78-4E70-983F-F8F353C30F27}" type="datetimeFigureOut">
               <a:rPr lang="zh-CN" altLang="en-US" smtClean="0"/>
-              <a:t>2024/7/1</a:t>
             </a:fld>
             <a:endParaRPr lang="zh-CN" altLang="en-US"/>
           </a:p>
@@ -1333,7 +1444,6 @@
           <a:p>
             <a:fld id="{AB80B9A9-C03D-4F64-ADE2-7C0EC2978D5F}" type="slidenum">
               <a:rPr lang="zh-CN" altLang="en-US" smtClean="0"/>
-              <a:t>‹#›</a:t>
             </a:fld>
             <a:endParaRPr lang="zh-CN" altLang="en-US"/>
           </a:p>
@@ -1392,6 +1502,7 @@
               <a:rPr lang="zh-CN" altLang="en-US"/>
               <a:t>单击此处编辑母版标题样式</a:t>
             </a:r>
+            <a:endParaRPr lang="zh-CN" altLang="en-US"/>
           </a:p>
         </p:txBody>
       </p:sp>
@@ -1456,6 +1567,7 @@
               <a:rPr lang="zh-CN" altLang="en-US"/>
               <a:t>单击此处编辑母版副标题样式</a:t>
             </a:r>
+            <a:endParaRPr lang="zh-CN" altLang="en-US"/>
           </a:p>
         </p:txBody>
       </p:sp>
@@ -1476,7 +1588,6 @@
           <a:p>
             <a:fld id="{51FD5836-1B78-4E70-983F-F8F353C30F27}" type="datetimeFigureOut">
               <a:rPr lang="zh-CN" altLang="en-US" smtClean="0"/>
-              <a:t>2024/7/1</a:t>
             </a:fld>
             <a:endParaRPr lang="zh-CN" altLang="en-US"/>
           </a:p>
@@ -1518,7 +1629,6 @@
           <a:p>
             <a:fld id="{AB80B9A9-C03D-4F64-ADE2-7C0EC2978D5F}" type="slidenum">
               <a:rPr lang="zh-CN" altLang="en-US" smtClean="0"/>
-              <a:t>‹#›</a:t>
             </a:fld>
             <a:endParaRPr lang="zh-CN" altLang="en-US"/>
           </a:p>
@@ -1568,6 +1678,7 @@
               <a:rPr lang="zh-CN" altLang="en-US"/>
               <a:t>单击此处编辑母版标题样式</a:t>
             </a:r>
+            <a:endParaRPr lang="zh-CN" altLang="en-US"/>
           </a:p>
         </p:txBody>
       </p:sp>
@@ -1591,6 +1702,7 @@
               <a:rPr lang="zh-CN" altLang="en-US"/>
               <a:t>单击此处编辑母版文本样式</a:t>
             </a:r>
+            <a:endParaRPr lang="zh-CN" altLang="en-US"/>
           </a:p>
           <a:p>
             <a:pPr lvl="1"/>
@@ -1598,6 +1710,7 @@
               <a:rPr lang="zh-CN" altLang="en-US"/>
               <a:t>二级</a:t>
             </a:r>
+            <a:endParaRPr lang="zh-CN" altLang="en-US"/>
           </a:p>
           <a:p>
             <a:pPr lvl="2"/>
@@ -1605,6 +1718,7 @@
               <a:rPr lang="zh-CN" altLang="en-US"/>
               <a:t>三级</a:t>
             </a:r>
+            <a:endParaRPr lang="zh-CN" altLang="en-US"/>
           </a:p>
           <a:p>
             <a:pPr lvl="3"/>
@@ -1612,6 +1726,7 @@
               <a:rPr lang="zh-CN" altLang="en-US"/>
               <a:t>四级</a:t>
             </a:r>
+            <a:endParaRPr lang="zh-CN" altLang="en-US"/>
           </a:p>
           <a:p>
             <a:pPr lvl="4"/>
@@ -1619,6 +1734,7 @@
               <a:rPr lang="zh-CN" altLang="en-US"/>
               <a:t>五级</a:t>
             </a:r>
+            <a:endParaRPr lang="zh-CN" altLang="en-US"/>
           </a:p>
         </p:txBody>
       </p:sp>
@@ -1639,7 +1755,6 @@
           <a:p>
             <a:fld id="{51FD5836-1B78-4E70-983F-F8F353C30F27}" type="datetimeFigureOut">
               <a:rPr lang="zh-CN" altLang="en-US" smtClean="0"/>
-              <a:t>2024/7/1</a:t>
             </a:fld>
             <a:endParaRPr lang="zh-CN" altLang="en-US"/>
           </a:p>
@@ -1681,7 +1796,6 @@
           <a:p>
             <a:fld id="{AB80B9A9-C03D-4F64-ADE2-7C0EC2978D5F}" type="slidenum">
               <a:rPr lang="zh-CN" altLang="en-US" smtClean="0"/>
-              <a:t>‹#›</a:t>
             </a:fld>
             <a:endParaRPr lang="zh-CN" altLang="en-US"/>
           </a:p>
@@ -1740,6 +1854,7 @@
               <a:rPr lang="zh-CN" altLang="en-US"/>
               <a:t>单击此处编辑母版标题样式</a:t>
             </a:r>
+            <a:endParaRPr lang="zh-CN" altLang="en-US"/>
           </a:p>
         </p:txBody>
       </p:sp>
@@ -1859,6 +1974,7 @@
               <a:rPr lang="zh-CN" altLang="en-US"/>
               <a:t>单击此处编辑母版文本样式</a:t>
             </a:r>
+            <a:endParaRPr lang="zh-CN" altLang="en-US"/>
           </a:p>
         </p:txBody>
       </p:sp>
@@ -1879,7 +1995,6 @@
           <a:p>
             <a:fld id="{51FD5836-1B78-4E70-983F-F8F353C30F27}" type="datetimeFigureOut">
               <a:rPr lang="zh-CN" altLang="en-US" smtClean="0"/>
-              <a:t>2024/7/1</a:t>
             </a:fld>
             <a:endParaRPr lang="zh-CN" altLang="en-US"/>
           </a:p>
@@ -1921,7 +2036,6 @@
           <a:p>
             <a:fld id="{AB80B9A9-C03D-4F64-ADE2-7C0EC2978D5F}" type="slidenum">
               <a:rPr lang="zh-CN" altLang="en-US" smtClean="0"/>
-              <a:t>‹#›</a:t>
             </a:fld>
             <a:endParaRPr lang="zh-CN" altLang="en-US"/>
           </a:p>
@@ -1971,6 +2085,7 @@
               <a:rPr lang="zh-CN" altLang="en-US"/>
               <a:t>单击此处编辑母版标题样式</a:t>
             </a:r>
+            <a:endParaRPr lang="zh-CN" altLang="en-US"/>
           </a:p>
         </p:txBody>
       </p:sp>
@@ -1999,6 +2114,7 @@
               <a:rPr lang="zh-CN" altLang="en-US"/>
               <a:t>单击此处编辑母版文本样式</a:t>
             </a:r>
+            <a:endParaRPr lang="zh-CN" altLang="en-US"/>
           </a:p>
           <a:p>
             <a:pPr lvl="1"/>
@@ -2006,6 +2122,7 @@
               <a:rPr lang="zh-CN" altLang="en-US"/>
               <a:t>二级</a:t>
             </a:r>
+            <a:endParaRPr lang="zh-CN" altLang="en-US"/>
           </a:p>
           <a:p>
             <a:pPr lvl="2"/>
@@ -2013,6 +2130,7 @@
               <a:rPr lang="zh-CN" altLang="en-US"/>
               <a:t>三级</a:t>
             </a:r>
+            <a:endParaRPr lang="zh-CN" altLang="en-US"/>
           </a:p>
           <a:p>
             <a:pPr lvl="3"/>
@@ -2020,6 +2138,7 @@
               <a:rPr lang="zh-CN" altLang="en-US"/>
               <a:t>四级</a:t>
             </a:r>
+            <a:endParaRPr lang="zh-CN" altLang="en-US"/>
           </a:p>
           <a:p>
             <a:pPr lvl="4"/>
@@ -2027,6 +2146,7 @@
               <a:rPr lang="zh-CN" altLang="en-US"/>
               <a:t>五级</a:t>
             </a:r>
+            <a:endParaRPr lang="zh-CN" altLang="en-US"/>
           </a:p>
         </p:txBody>
       </p:sp>
@@ -2055,6 +2175,7 @@
               <a:rPr lang="zh-CN" altLang="en-US"/>
               <a:t>单击此处编辑母版文本样式</a:t>
             </a:r>
+            <a:endParaRPr lang="zh-CN" altLang="en-US"/>
           </a:p>
           <a:p>
             <a:pPr lvl="1"/>
@@ -2062,6 +2183,7 @@
               <a:rPr lang="zh-CN" altLang="en-US"/>
               <a:t>二级</a:t>
             </a:r>
+            <a:endParaRPr lang="zh-CN" altLang="en-US"/>
           </a:p>
           <a:p>
             <a:pPr lvl="2"/>
@@ -2069,6 +2191,7 @@
               <a:rPr lang="zh-CN" altLang="en-US"/>
               <a:t>三级</a:t>
             </a:r>
+            <a:endParaRPr lang="zh-CN" altLang="en-US"/>
           </a:p>
           <a:p>
             <a:pPr lvl="3"/>
@@ -2076,6 +2199,7 @@
               <a:rPr lang="zh-CN" altLang="en-US"/>
               <a:t>四级</a:t>
             </a:r>
+            <a:endParaRPr lang="zh-CN" altLang="en-US"/>
           </a:p>
           <a:p>
             <a:pPr lvl="4"/>
@@ -2083,6 +2207,7 @@
               <a:rPr lang="zh-CN" altLang="en-US"/>
               <a:t>五级</a:t>
             </a:r>
+            <a:endParaRPr lang="zh-CN" altLang="en-US"/>
           </a:p>
         </p:txBody>
       </p:sp>
@@ -2103,7 +2228,6 @@
           <a:p>
             <a:fld id="{51FD5836-1B78-4E70-983F-F8F353C30F27}" type="datetimeFigureOut">
               <a:rPr lang="zh-CN" altLang="en-US" smtClean="0"/>
-              <a:t>2024/7/1</a:t>
             </a:fld>
             <a:endParaRPr lang="zh-CN" altLang="en-US"/>
           </a:p>
@@ -2145,7 +2269,6 @@
           <a:p>
             <a:fld id="{AB80B9A9-C03D-4F64-ADE2-7C0EC2978D5F}" type="slidenum">
               <a:rPr lang="zh-CN" altLang="en-US" smtClean="0"/>
-              <a:t>‹#›</a:t>
             </a:fld>
             <a:endParaRPr lang="zh-CN" altLang="en-US"/>
           </a:p>
@@ -2200,6 +2323,7 @@
               <a:rPr lang="zh-CN" altLang="en-US"/>
               <a:t>单击此处编辑母版标题样式</a:t>
             </a:r>
+            <a:endParaRPr lang="zh-CN" altLang="en-US"/>
           </a:p>
         </p:txBody>
       </p:sp>
@@ -2265,6 +2389,7 @@
               <a:rPr lang="zh-CN" altLang="en-US"/>
               <a:t>单击此处编辑母版文本样式</a:t>
             </a:r>
+            <a:endParaRPr lang="zh-CN" altLang="en-US"/>
           </a:p>
         </p:txBody>
       </p:sp>
@@ -2293,6 +2418,7 @@
               <a:rPr lang="zh-CN" altLang="en-US"/>
               <a:t>单击此处编辑母版文本样式</a:t>
             </a:r>
+            <a:endParaRPr lang="zh-CN" altLang="en-US"/>
           </a:p>
           <a:p>
             <a:pPr lvl="1"/>
@@ -2300,6 +2426,7 @@
               <a:rPr lang="zh-CN" altLang="en-US"/>
               <a:t>二级</a:t>
             </a:r>
+            <a:endParaRPr lang="zh-CN" altLang="en-US"/>
           </a:p>
           <a:p>
             <a:pPr lvl="2"/>
@@ -2307,6 +2434,7 @@
               <a:rPr lang="zh-CN" altLang="en-US"/>
               <a:t>三级</a:t>
             </a:r>
+            <a:endParaRPr lang="zh-CN" altLang="en-US"/>
           </a:p>
           <a:p>
             <a:pPr lvl="3"/>
@@ -2314,6 +2442,7 @@
               <a:rPr lang="zh-CN" altLang="en-US"/>
               <a:t>四级</a:t>
             </a:r>
+            <a:endParaRPr lang="zh-CN" altLang="en-US"/>
           </a:p>
           <a:p>
             <a:pPr lvl="4"/>
@@ -2321,6 +2450,7 @@
               <a:rPr lang="zh-CN" altLang="en-US"/>
               <a:t>五级</a:t>
             </a:r>
+            <a:endParaRPr lang="zh-CN" altLang="en-US"/>
           </a:p>
         </p:txBody>
       </p:sp>
@@ -2386,6 +2516,7 @@
               <a:rPr lang="zh-CN" altLang="en-US"/>
               <a:t>单击此处编辑母版文本样式</a:t>
             </a:r>
+            <a:endParaRPr lang="zh-CN" altLang="en-US"/>
           </a:p>
         </p:txBody>
       </p:sp>
@@ -2414,6 +2545,7 @@
               <a:rPr lang="zh-CN" altLang="en-US"/>
               <a:t>单击此处编辑母版文本样式</a:t>
             </a:r>
+            <a:endParaRPr lang="zh-CN" altLang="en-US"/>
           </a:p>
           <a:p>
             <a:pPr lvl="1"/>
@@ -2421,6 +2553,7 @@
               <a:rPr lang="zh-CN" altLang="en-US"/>
               <a:t>二级</a:t>
             </a:r>
+            <a:endParaRPr lang="zh-CN" altLang="en-US"/>
           </a:p>
           <a:p>
             <a:pPr lvl="2"/>
@@ -2428,6 +2561,7 @@
               <a:rPr lang="zh-CN" altLang="en-US"/>
               <a:t>三级</a:t>
             </a:r>
+            <a:endParaRPr lang="zh-CN" altLang="en-US"/>
           </a:p>
           <a:p>
             <a:pPr lvl="3"/>
@@ -2435,6 +2569,7 @@
               <a:rPr lang="zh-CN" altLang="en-US"/>
               <a:t>四级</a:t>
             </a:r>
+            <a:endParaRPr lang="zh-CN" altLang="en-US"/>
           </a:p>
           <a:p>
             <a:pPr lvl="4"/>
@@ -2442,6 +2577,7 @@
               <a:rPr lang="zh-CN" altLang="en-US"/>
               <a:t>五级</a:t>
             </a:r>
+            <a:endParaRPr lang="zh-CN" altLang="en-US"/>
           </a:p>
         </p:txBody>
       </p:sp>
@@ -2462,7 +2598,6 @@
           <a:p>
             <a:fld id="{51FD5836-1B78-4E70-983F-F8F353C30F27}" type="datetimeFigureOut">
               <a:rPr lang="zh-CN" altLang="en-US" smtClean="0"/>
-              <a:t>2024/7/1</a:t>
             </a:fld>
             <a:endParaRPr lang="zh-CN" altLang="en-US"/>
           </a:p>
@@ -2504,7 +2639,6 @@
           <a:p>
             <a:fld id="{AB80B9A9-C03D-4F64-ADE2-7C0EC2978D5F}" type="slidenum">
               <a:rPr lang="zh-CN" altLang="en-US" smtClean="0"/>
-              <a:t>‹#›</a:t>
             </a:fld>
             <a:endParaRPr lang="zh-CN" altLang="en-US"/>
           </a:p>
@@ -2554,6 +2688,7 @@
               <a:rPr lang="zh-CN" altLang="en-US"/>
               <a:t>单击此处编辑母版标题样式</a:t>
             </a:r>
+            <a:endParaRPr lang="zh-CN" altLang="en-US"/>
           </a:p>
         </p:txBody>
       </p:sp>
@@ -2574,7 +2709,6 @@
           <a:p>
             <a:fld id="{51FD5836-1B78-4E70-983F-F8F353C30F27}" type="datetimeFigureOut">
               <a:rPr lang="zh-CN" altLang="en-US" smtClean="0"/>
-              <a:t>2024/7/1</a:t>
             </a:fld>
             <a:endParaRPr lang="zh-CN" altLang="en-US"/>
           </a:p>
@@ -2616,7 +2750,6 @@
           <a:p>
             <a:fld id="{AB80B9A9-C03D-4F64-ADE2-7C0EC2978D5F}" type="slidenum">
               <a:rPr lang="zh-CN" altLang="en-US" smtClean="0"/>
-              <a:t>‹#›</a:t>
             </a:fld>
             <a:endParaRPr lang="zh-CN" altLang="en-US"/>
           </a:p>
@@ -2664,7 +2797,6 @@
           <a:p>
             <a:fld id="{51FD5836-1B78-4E70-983F-F8F353C30F27}" type="datetimeFigureOut">
               <a:rPr lang="zh-CN" altLang="en-US" smtClean="0"/>
-              <a:t>2024/7/1</a:t>
             </a:fld>
             <a:endParaRPr lang="zh-CN" altLang="en-US"/>
           </a:p>
@@ -2706,7 +2838,6 @@
           <a:p>
             <a:fld id="{AB80B9A9-C03D-4F64-ADE2-7C0EC2978D5F}" type="slidenum">
               <a:rPr lang="zh-CN" altLang="en-US" smtClean="0"/>
-              <a:t>‹#›</a:t>
             </a:fld>
             <a:endParaRPr lang="zh-CN" altLang="en-US"/>
           </a:p>
@@ -2765,6 +2896,7 @@
               <a:rPr lang="zh-CN" altLang="en-US"/>
               <a:t>单击此处编辑母版标题样式</a:t>
             </a:r>
+            <a:endParaRPr lang="zh-CN" altLang="en-US"/>
           </a:p>
         </p:txBody>
       </p:sp>
@@ -2821,6 +2953,7 @@
               <a:rPr lang="zh-CN" altLang="en-US"/>
               <a:t>单击此处编辑母版文本样式</a:t>
             </a:r>
+            <a:endParaRPr lang="zh-CN" altLang="en-US"/>
           </a:p>
           <a:p>
             <a:pPr lvl="1"/>
@@ -2828,6 +2961,7 @@
               <a:rPr lang="zh-CN" altLang="en-US"/>
               <a:t>二级</a:t>
             </a:r>
+            <a:endParaRPr lang="zh-CN" altLang="en-US"/>
           </a:p>
           <a:p>
             <a:pPr lvl="2"/>
@@ -2835,6 +2969,7 @@
               <a:rPr lang="zh-CN" altLang="en-US"/>
               <a:t>三级</a:t>
             </a:r>
+            <a:endParaRPr lang="zh-CN" altLang="en-US"/>
           </a:p>
           <a:p>
             <a:pPr lvl="3"/>
@@ -2842,6 +2977,7 @@
               <a:rPr lang="zh-CN" altLang="en-US"/>
               <a:t>四级</a:t>
             </a:r>
+            <a:endParaRPr lang="zh-CN" altLang="en-US"/>
           </a:p>
           <a:p>
             <a:pPr lvl="4"/>
@@ -2849,6 +2985,7 @@
               <a:rPr lang="zh-CN" altLang="en-US"/>
               <a:t>五级</a:t>
             </a:r>
+            <a:endParaRPr lang="zh-CN" altLang="en-US"/>
           </a:p>
         </p:txBody>
       </p:sp>
@@ -2914,6 +3051,7 @@
               <a:rPr lang="zh-CN" altLang="en-US"/>
               <a:t>单击此处编辑母版文本样式</a:t>
             </a:r>
+            <a:endParaRPr lang="zh-CN" altLang="en-US"/>
           </a:p>
         </p:txBody>
       </p:sp>
@@ -2934,7 +3072,6 @@
           <a:p>
             <a:fld id="{51FD5836-1B78-4E70-983F-F8F353C30F27}" type="datetimeFigureOut">
               <a:rPr lang="zh-CN" altLang="en-US" smtClean="0"/>
-              <a:t>2024/7/1</a:t>
             </a:fld>
             <a:endParaRPr lang="zh-CN" altLang="en-US"/>
           </a:p>
@@ -2976,7 +3113,6 @@
           <a:p>
             <a:fld id="{AB80B9A9-C03D-4F64-ADE2-7C0EC2978D5F}" type="slidenum">
               <a:rPr lang="zh-CN" altLang="en-US" smtClean="0"/>
-              <a:t>‹#›</a:t>
             </a:fld>
             <a:endParaRPr lang="zh-CN" altLang="en-US"/>
           </a:p>
@@ -3026,6 +3162,7 @@
               <a:rPr lang="zh-CN" altLang="en-US"/>
               <a:t>单击此处编辑母版标题样式</a:t>
             </a:r>
+            <a:endParaRPr lang="zh-CN" altLang="en-US"/>
           </a:p>
         </p:txBody>
       </p:sp>
@@ -3049,6 +3186,7 @@
               <a:rPr lang="zh-CN" altLang="en-US"/>
               <a:t>单击此处编辑母版文本样式</a:t>
             </a:r>
+            <a:endParaRPr lang="zh-CN" altLang="en-US"/>
           </a:p>
           <a:p>
             <a:pPr lvl="1"/>
@@ -3056,6 +3194,7 @@
               <a:rPr lang="zh-CN" altLang="en-US"/>
               <a:t>二级</a:t>
             </a:r>
+            <a:endParaRPr lang="zh-CN" altLang="en-US"/>
           </a:p>
           <a:p>
             <a:pPr lvl="2"/>
@@ -3063,6 +3202,7 @@
               <a:rPr lang="zh-CN" altLang="en-US"/>
               <a:t>三级</a:t>
             </a:r>
+            <a:endParaRPr lang="zh-CN" altLang="en-US"/>
           </a:p>
           <a:p>
             <a:pPr lvl="3"/>
@@ -3070,6 +3210,7 @@
               <a:rPr lang="zh-CN" altLang="en-US"/>
               <a:t>四级</a:t>
             </a:r>
+            <a:endParaRPr lang="zh-CN" altLang="en-US"/>
           </a:p>
           <a:p>
             <a:pPr lvl="4"/>
@@ -3077,6 +3218,7 @@
               <a:rPr lang="zh-CN" altLang="en-US"/>
               <a:t>五级</a:t>
             </a:r>
+            <a:endParaRPr lang="zh-CN" altLang="en-US"/>
           </a:p>
         </p:txBody>
       </p:sp>
@@ -3097,7 +3239,6 @@
           <a:p>
             <a:fld id="{51FD5836-1B78-4E70-983F-F8F353C30F27}" type="datetimeFigureOut">
               <a:rPr lang="zh-CN" altLang="en-US" smtClean="0"/>
-              <a:t>2024/7/1</a:t>
             </a:fld>
             <a:endParaRPr lang="zh-CN" altLang="en-US"/>
           </a:p>
@@ -3139,7 +3280,6 @@
           <a:p>
             <a:fld id="{AB80B9A9-C03D-4F64-ADE2-7C0EC2978D5F}" type="slidenum">
               <a:rPr lang="zh-CN" altLang="en-US" smtClean="0"/>
-              <a:t>‹#›</a:t>
             </a:fld>
             <a:endParaRPr lang="zh-CN" altLang="en-US"/>
           </a:p>
@@ -3198,6 +3338,7 @@
               <a:rPr lang="zh-CN" altLang="en-US"/>
               <a:t>单击此处编辑母版标题样式</a:t>
             </a:r>
+            <a:endParaRPr lang="zh-CN" altLang="en-US"/>
           </a:p>
         </p:txBody>
       </p:sp>
@@ -3324,6 +3465,7 @@
               <a:rPr lang="zh-CN" altLang="en-US"/>
               <a:t>单击此处编辑母版文本样式</a:t>
             </a:r>
+            <a:endParaRPr lang="zh-CN" altLang="en-US"/>
           </a:p>
         </p:txBody>
       </p:sp>
@@ -3344,7 +3486,6 @@
           <a:p>
             <a:fld id="{51FD5836-1B78-4E70-983F-F8F353C30F27}" type="datetimeFigureOut">
               <a:rPr lang="zh-CN" altLang="en-US" smtClean="0"/>
-              <a:t>2024/7/1</a:t>
             </a:fld>
             <a:endParaRPr lang="zh-CN" altLang="en-US"/>
           </a:p>
@@ -3386,7 +3527,6 @@
           <a:p>
             <a:fld id="{AB80B9A9-C03D-4F64-ADE2-7C0EC2978D5F}" type="slidenum">
               <a:rPr lang="zh-CN" altLang="en-US" smtClean="0"/>
-              <a:t>‹#›</a:t>
             </a:fld>
             <a:endParaRPr lang="zh-CN" altLang="en-US"/>
           </a:p>
@@ -3436,6 +3576,7 @@
               <a:rPr lang="zh-CN" altLang="en-US"/>
               <a:t>单击此处编辑母版标题样式</a:t>
             </a:r>
+            <a:endParaRPr lang="zh-CN" altLang="en-US"/>
           </a:p>
         </p:txBody>
       </p:sp>
@@ -3459,6 +3600,7 @@
               <a:rPr lang="zh-CN" altLang="en-US"/>
               <a:t>单击此处编辑母版文本样式</a:t>
             </a:r>
+            <a:endParaRPr lang="zh-CN" altLang="en-US"/>
           </a:p>
           <a:p>
             <a:pPr lvl="1"/>
@@ -3466,6 +3608,7 @@
               <a:rPr lang="zh-CN" altLang="en-US"/>
               <a:t>二级</a:t>
             </a:r>
+            <a:endParaRPr lang="zh-CN" altLang="en-US"/>
           </a:p>
           <a:p>
             <a:pPr lvl="2"/>
@@ -3473,6 +3616,7 @@
               <a:rPr lang="zh-CN" altLang="en-US"/>
               <a:t>三级</a:t>
             </a:r>
+            <a:endParaRPr lang="zh-CN" altLang="en-US"/>
           </a:p>
           <a:p>
             <a:pPr lvl="3"/>
@@ -3480,6 +3624,7 @@
               <a:rPr lang="zh-CN" altLang="en-US"/>
               <a:t>四级</a:t>
             </a:r>
+            <a:endParaRPr lang="zh-CN" altLang="en-US"/>
           </a:p>
           <a:p>
             <a:pPr lvl="4"/>
@@ -3487,6 +3632,7 @@
               <a:rPr lang="zh-CN" altLang="en-US"/>
               <a:t>五级</a:t>
             </a:r>
+            <a:endParaRPr lang="zh-CN" altLang="en-US"/>
           </a:p>
         </p:txBody>
       </p:sp>
@@ -3507,7 +3653,6 @@
           <a:p>
             <a:fld id="{51FD5836-1B78-4E70-983F-F8F353C30F27}" type="datetimeFigureOut">
               <a:rPr lang="zh-CN" altLang="en-US" smtClean="0"/>
-              <a:t>2024/7/1</a:t>
             </a:fld>
             <a:endParaRPr lang="zh-CN" altLang="en-US"/>
           </a:p>
@@ -3549,7 +3694,6 @@
           <a:p>
             <a:fld id="{AB80B9A9-C03D-4F64-ADE2-7C0EC2978D5F}" type="slidenum">
               <a:rPr lang="zh-CN" altLang="en-US" smtClean="0"/>
-              <a:t>‹#›</a:t>
             </a:fld>
             <a:endParaRPr lang="zh-CN" altLang="en-US"/>
           </a:p>
@@ -3604,6 +3748,7 @@
               <a:rPr lang="zh-CN" altLang="en-US"/>
               <a:t>单击此处编辑母版标题样式</a:t>
             </a:r>
+            <a:endParaRPr lang="zh-CN" altLang="en-US"/>
           </a:p>
         </p:txBody>
       </p:sp>
@@ -3632,6 +3777,7 @@
               <a:rPr lang="zh-CN" altLang="en-US"/>
               <a:t>单击此处编辑母版文本样式</a:t>
             </a:r>
+            <a:endParaRPr lang="zh-CN" altLang="en-US"/>
           </a:p>
           <a:p>
             <a:pPr lvl="1"/>
@@ -3639,6 +3785,7 @@
               <a:rPr lang="zh-CN" altLang="en-US"/>
               <a:t>二级</a:t>
             </a:r>
+            <a:endParaRPr lang="zh-CN" altLang="en-US"/>
           </a:p>
           <a:p>
             <a:pPr lvl="2"/>
@@ -3646,6 +3793,7 @@
               <a:rPr lang="zh-CN" altLang="en-US"/>
               <a:t>三级</a:t>
             </a:r>
+            <a:endParaRPr lang="zh-CN" altLang="en-US"/>
           </a:p>
           <a:p>
             <a:pPr lvl="3"/>
@@ -3653,6 +3801,7 @@
               <a:rPr lang="zh-CN" altLang="en-US"/>
               <a:t>四级</a:t>
             </a:r>
+            <a:endParaRPr lang="zh-CN" altLang="en-US"/>
           </a:p>
           <a:p>
             <a:pPr lvl="4"/>
@@ -3660,6 +3809,7 @@
               <a:rPr lang="zh-CN" altLang="en-US"/>
               <a:t>五级</a:t>
             </a:r>
+            <a:endParaRPr lang="zh-CN" altLang="en-US"/>
           </a:p>
         </p:txBody>
       </p:sp>
@@ -3680,7 +3830,6 @@
           <a:p>
             <a:fld id="{51FD5836-1B78-4E70-983F-F8F353C30F27}" type="datetimeFigureOut">
               <a:rPr lang="zh-CN" altLang="en-US" smtClean="0"/>
-              <a:t>2024/7/1</a:t>
             </a:fld>
             <a:endParaRPr lang="zh-CN" altLang="en-US"/>
           </a:p>
@@ -3722,7 +3871,6 @@
           <a:p>
             <a:fld id="{AB80B9A9-C03D-4F64-ADE2-7C0EC2978D5F}" type="slidenum">
               <a:rPr lang="zh-CN" altLang="en-US" smtClean="0"/>
-              <a:t>‹#›</a:t>
             </a:fld>
             <a:endParaRPr lang="zh-CN" altLang="en-US"/>
           </a:p>
@@ -3781,6 +3929,7 @@
               <a:rPr lang="zh-CN" altLang="en-US"/>
               <a:t>单击此处编辑母版标题样式</a:t>
             </a:r>
+            <a:endParaRPr lang="zh-CN" altLang="en-US"/>
           </a:p>
         </p:txBody>
       </p:sp>
@@ -3900,6 +4049,7 @@
               <a:rPr lang="zh-CN" altLang="en-US"/>
               <a:t>单击此处编辑母版文本样式</a:t>
             </a:r>
+            <a:endParaRPr lang="zh-CN" altLang="en-US"/>
           </a:p>
         </p:txBody>
       </p:sp>
@@ -3920,7 +4070,6 @@
           <a:p>
             <a:fld id="{51FD5836-1B78-4E70-983F-F8F353C30F27}" type="datetimeFigureOut">
               <a:rPr lang="zh-CN" altLang="en-US" smtClean="0"/>
-              <a:t>2024/7/1</a:t>
             </a:fld>
             <a:endParaRPr lang="zh-CN" altLang="en-US"/>
           </a:p>
@@ -3962,7 +4111,6 @@
           <a:p>
             <a:fld id="{AB80B9A9-C03D-4F64-ADE2-7C0EC2978D5F}" type="slidenum">
               <a:rPr lang="zh-CN" altLang="en-US" smtClean="0"/>
-              <a:t>‹#›</a:t>
             </a:fld>
             <a:endParaRPr lang="zh-CN" altLang="en-US"/>
           </a:p>
@@ -4012,6 +4160,7 @@
               <a:rPr lang="zh-CN" altLang="en-US"/>
               <a:t>单击此处编辑母版标题样式</a:t>
             </a:r>
+            <a:endParaRPr lang="zh-CN" altLang="en-US"/>
           </a:p>
         </p:txBody>
       </p:sp>
@@ -4040,6 +4189,7 @@
               <a:rPr lang="zh-CN" altLang="en-US"/>
               <a:t>单击此处编辑母版文本样式</a:t>
             </a:r>
+            <a:endParaRPr lang="zh-CN" altLang="en-US"/>
           </a:p>
           <a:p>
             <a:pPr lvl="1"/>
@@ -4047,6 +4197,7 @@
               <a:rPr lang="zh-CN" altLang="en-US"/>
               <a:t>二级</a:t>
             </a:r>
+            <a:endParaRPr lang="zh-CN" altLang="en-US"/>
           </a:p>
           <a:p>
             <a:pPr lvl="2"/>
@@ -4054,6 +4205,7 @@
               <a:rPr lang="zh-CN" altLang="en-US"/>
               <a:t>三级</a:t>
             </a:r>
+            <a:endParaRPr lang="zh-CN" altLang="en-US"/>
           </a:p>
           <a:p>
             <a:pPr lvl="3"/>
@@ -4061,6 +4213,7 @@
               <a:rPr lang="zh-CN" altLang="en-US"/>
               <a:t>四级</a:t>
             </a:r>
+            <a:endParaRPr lang="zh-CN" altLang="en-US"/>
           </a:p>
           <a:p>
             <a:pPr lvl="4"/>
@@ -4068,6 +4221,7 @@
               <a:rPr lang="zh-CN" altLang="en-US"/>
               <a:t>五级</a:t>
             </a:r>
+            <a:endParaRPr lang="zh-CN" altLang="en-US"/>
           </a:p>
         </p:txBody>
       </p:sp>
@@ -4096,6 +4250,7 @@
               <a:rPr lang="zh-CN" altLang="en-US"/>
               <a:t>单击此处编辑母版文本样式</a:t>
             </a:r>
+            <a:endParaRPr lang="zh-CN" altLang="en-US"/>
           </a:p>
           <a:p>
             <a:pPr lvl="1"/>
@@ -4103,6 +4258,7 @@
               <a:rPr lang="zh-CN" altLang="en-US"/>
               <a:t>二级</a:t>
             </a:r>
+            <a:endParaRPr lang="zh-CN" altLang="en-US"/>
           </a:p>
           <a:p>
             <a:pPr lvl="2"/>
@@ -4110,6 +4266,7 @@
               <a:rPr lang="zh-CN" altLang="en-US"/>
               <a:t>三级</a:t>
             </a:r>
+            <a:endParaRPr lang="zh-CN" altLang="en-US"/>
           </a:p>
           <a:p>
             <a:pPr lvl="3"/>
@@ -4117,6 +4274,7 @@
               <a:rPr lang="zh-CN" altLang="en-US"/>
               <a:t>四级</a:t>
             </a:r>
+            <a:endParaRPr lang="zh-CN" altLang="en-US"/>
           </a:p>
           <a:p>
             <a:pPr lvl="4"/>
@@ -4124,6 +4282,7 @@
               <a:rPr lang="zh-CN" altLang="en-US"/>
               <a:t>五级</a:t>
             </a:r>
+            <a:endParaRPr lang="zh-CN" altLang="en-US"/>
           </a:p>
         </p:txBody>
       </p:sp>
@@ -4144,7 +4303,6 @@
           <a:p>
             <a:fld id="{51FD5836-1B78-4E70-983F-F8F353C30F27}" type="datetimeFigureOut">
               <a:rPr lang="zh-CN" altLang="en-US" smtClean="0"/>
-              <a:t>2024/7/1</a:t>
             </a:fld>
             <a:endParaRPr lang="zh-CN" altLang="en-US"/>
           </a:p>
@@ -4186,7 +4344,6 @@
           <a:p>
             <a:fld id="{AB80B9A9-C03D-4F64-ADE2-7C0EC2978D5F}" type="slidenum">
               <a:rPr lang="zh-CN" altLang="en-US" smtClean="0"/>
-              <a:t>‹#›</a:t>
             </a:fld>
             <a:endParaRPr lang="zh-CN" altLang="en-US"/>
           </a:p>
@@ -4241,6 +4398,7 @@
               <a:rPr lang="zh-CN" altLang="en-US"/>
               <a:t>单击此处编辑母版标题样式</a:t>
             </a:r>
+            <a:endParaRPr lang="zh-CN" altLang="en-US"/>
           </a:p>
         </p:txBody>
       </p:sp>
@@ -4306,6 +4464,7 @@
               <a:rPr lang="zh-CN" altLang="en-US"/>
               <a:t>单击此处编辑母版文本样式</a:t>
             </a:r>
+            <a:endParaRPr lang="zh-CN" altLang="en-US"/>
           </a:p>
         </p:txBody>
       </p:sp>
@@ -4334,6 +4493,7 @@
               <a:rPr lang="zh-CN" altLang="en-US"/>
               <a:t>单击此处编辑母版文本样式</a:t>
             </a:r>
+            <a:endParaRPr lang="zh-CN" altLang="en-US"/>
           </a:p>
           <a:p>
             <a:pPr lvl="1"/>
@@ -4341,6 +4501,7 @@
               <a:rPr lang="zh-CN" altLang="en-US"/>
               <a:t>二级</a:t>
             </a:r>
+            <a:endParaRPr lang="zh-CN" altLang="en-US"/>
           </a:p>
           <a:p>
             <a:pPr lvl="2"/>
@@ -4348,6 +4509,7 @@
               <a:rPr lang="zh-CN" altLang="en-US"/>
               <a:t>三级</a:t>
             </a:r>
+            <a:endParaRPr lang="zh-CN" altLang="en-US"/>
           </a:p>
           <a:p>
             <a:pPr lvl="3"/>
@@ -4355,6 +4517,7 @@
               <a:rPr lang="zh-CN" altLang="en-US"/>
               <a:t>四级</a:t>
             </a:r>
+            <a:endParaRPr lang="zh-CN" altLang="en-US"/>
           </a:p>
           <a:p>
             <a:pPr lvl="4"/>
@@ -4362,6 +4525,7 @@
               <a:rPr lang="zh-CN" altLang="en-US"/>
               <a:t>五级</a:t>
             </a:r>
+            <a:endParaRPr lang="zh-CN" altLang="en-US"/>
           </a:p>
         </p:txBody>
       </p:sp>
@@ -4427,6 +4591,7 @@
               <a:rPr lang="zh-CN" altLang="en-US"/>
               <a:t>单击此处编辑母版文本样式</a:t>
             </a:r>
+            <a:endParaRPr lang="zh-CN" altLang="en-US"/>
           </a:p>
         </p:txBody>
       </p:sp>
@@ -4455,6 +4620,7 @@
               <a:rPr lang="zh-CN" altLang="en-US"/>
               <a:t>单击此处编辑母版文本样式</a:t>
             </a:r>
+            <a:endParaRPr lang="zh-CN" altLang="en-US"/>
           </a:p>
           <a:p>
             <a:pPr lvl="1"/>
@@ -4462,6 +4628,7 @@
               <a:rPr lang="zh-CN" altLang="en-US"/>
               <a:t>二级</a:t>
             </a:r>
+            <a:endParaRPr lang="zh-CN" altLang="en-US"/>
           </a:p>
           <a:p>
             <a:pPr lvl="2"/>
@@ -4469,6 +4636,7 @@
               <a:rPr lang="zh-CN" altLang="en-US"/>
               <a:t>三级</a:t>
             </a:r>
+            <a:endParaRPr lang="zh-CN" altLang="en-US"/>
           </a:p>
           <a:p>
             <a:pPr lvl="3"/>
@@ -4476,6 +4644,7 @@
               <a:rPr lang="zh-CN" altLang="en-US"/>
               <a:t>四级</a:t>
             </a:r>
+            <a:endParaRPr lang="zh-CN" altLang="en-US"/>
           </a:p>
           <a:p>
             <a:pPr lvl="4"/>
@@ -4483,6 +4652,7 @@
               <a:rPr lang="zh-CN" altLang="en-US"/>
               <a:t>五级</a:t>
             </a:r>
+            <a:endParaRPr lang="zh-CN" altLang="en-US"/>
           </a:p>
         </p:txBody>
       </p:sp>
@@ -4503,7 +4673,6 @@
           <a:p>
             <a:fld id="{51FD5836-1B78-4E70-983F-F8F353C30F27}" type="datetimeFigureOut">
               <a:rPr lang="zh-CN" altLang="en-US" smtClean="0"/>
-              <a:t>2024/7/1</a:t>
             </a:fld>
             <a:endParaRPr lang="zh-CN" altLang="en-US"/>
           </a:p>
@@ -4545,7 +4714,6 @@
           <a:p>
             <a:fld id="{AB80B9A9-C03D-4F64-ADE2-7C0EC2978D5F}" type="slidenum">
               <a:rPr lang="zh-CN" altLang="en-US" smtClean="0"/>
-              <a:t>‹#›</a:t>
             </a:fld>
             <a:endParaRPr lang="zh-CN" altLang="en-US"/>
           </a:p>
@@ -4595,6 +4763,7 @@
               <a:rPr lang="zh-CN" altLang="en-US"/>
               <a:t>单击此处编辑母版标题样式</a:t>
             </a:r>
+            <a:endParaRPr lang="zh-CN" altLang="en-US"/>
           </a:p>
         </p:txBody>
       </p:sp>
@@ -4615,7 +4784,6 @@
           <a:p>
             <a:fld id="{51FD5836-1B78-4E70-983F-F8F353C30F27}" type="datetimeFigureOut">
               <a:rPr lang="zh-CN" altLang="en-US" smtClean="0"/>
-              <a:t>2024/7/1</a:t>
             </a:fld>
             <a:endParaRPr lang="zh-CN" altLang="en-US"/>
           </a:p>
@@ -4657,7 +4825,6 @@
           <a:p>
             <a:fld id="{AB80B9A9-C03D-4F64-ADE2-7C0EC2978D5F}" type="slidenum">
               <a:rPr lang="zh-CN" altLang="en-US" smtClean="0"/>
-              <a:t>‹#›</a:t>
             </a:fld>
             <a:endParaRPr lang="zh-CN" altLang="en-US"/>
           </a:p>
@@ -4705,7 +4872,6 @@
           <a:p>
             <a:fld id="{51FD5836-1B78-4E70-983F-F8F353C30F27}" type="datetimeFigureOut">
               <a:rPr lang="zh-CN" altLang="en-US" smtClean="0"/>
-              <a:t>2024/7/1</a:t>
             </a:fld>
             <a:endParaRPr lang="zh-CN" altLang="en-US"/>
           </a:p>
@@ -4747,7 +4913,6 @@
           <a:p>
             <a:fld id="{AB80B9A9-C03D-4F64-ADE2-7C0EC2978D5F}" type="slidenum">
               <a:rPr lang="zh-CN" altLang="en-US" smtClean="0"/>
-              <a:t>‹#›</a:t>
             </a:fld>
             <a:endParaRPr lang="zh-CN" altLang="en-US"/>
           </a:p>
@@ -4806,6 +4971,7 @@
               <a:rPr lang="zh-CN" altLang="en-US"/>
               <a:t>单击此处编辑母版标题样式</a:t>
             </a:r>
+            <a:endParaRPr lang="zh-CN" altLang="en-US"/>
           </a:p>
         </p:txBody>
       </p:sp>
@@ -4862,6 +5028,7 @@
               <a:rPr lang="zh-CN" altLang="en-US"/>
               <a:t>单击此处编辑母版文本样式</a:t>
             </a:r>
+            <a:endParaRPr lang="zh-CN" altLang="en-US"/>
           </a:p>
           <a:p>
             <a:pPr lvl="1"/>
@@ -4869,6 +5036,7 @@
               <a:rPr lang="zh-CN" altLang="en-US"/>
               <a:t>二级</a:t>
             </a:r>
+            <a:endParaRPr lang="zh-CN" altLang="en-US"/>
           </a:p>
           <a:p>
             <a:pPr lvl="2"/>
@@ -4876,6 +5044,7 @@
               <a:rPr lang="zh-CN" altLang="en-US"/>
               <a:t>三级</a:t>
             </a:r>
+            <a:endParaRPr lang="zh-CN" altLang="en-US"/>
           </a:p>
           <a:p>
             <a:pPr lvl="3"/>
@@ -4883,6 +5052,7 @@
               <a:rPr lang="zh-CN" altLang="en-US"/>
               <a:t>四级</a:t>
             </a:r>
+            <a:endParaRPr lang="zh-CN" altLang="en-US"/>
           </a:p>
           <a:p>
             <a:pPr lvl="4"/>
@@ -4890,6 +5060,7 @@
               <a:rPr lang="zh-CN" altLang="en-US"/>
               <a:t>五级</a:t>
             </a:r>
+            <a:endParaRPr lang="zh-CN" altLang="en-US"/>
           </a:p>
         </p:txBody>
       </p:sp>
@@ -4955,6 +5126,7 @@
               <a:rPr lang="zh-CN" altLang="en-US"/>
               <a:t>单击此处编辑母版文本样式</a:t>
             </a:r>
+            <a:endParaRPr lang="zh-CN" altLang="en-US"/>
           </a:p>
         </p:txBody>
       </p:sp>
@@ -4975,7 +5147,6 @@
           <a:p>
             <a:fld id="{51FD5836-1B78-4E70-983F-F8F353C30F27}" type="datetimeFigureOut">
               <a:rPr lang="zh-CN" altLang="en-US" smtClean="0"/>
-              <a:t>2024/7/1</a:t>
             </a:fld>
             <a:endParaRPr lang="zh-CN" altLang="en-US"/>
           </a:p>
@@ -5017,7 +5188,6 @@
           <a:p>
             <a:fld id="{AB80B9A9-C03D-4F64-ADE2-7C0EC2978D5F}" type="slidenum">
               <a:rPr lang="zh-CN" altLang="en-US" smtClean="0"/>
-              <a:t>‹#›</a:t>
             </a:fld>
             <a:endParaRPr lang="zh-CN" altLang="en-US"/>
           </a:p>
@@ -5076,6 +5246,7 @@
               <a:rPr lang="zh-CN" altLang="en-US"/>
               <a:t>单击此处编辑母版标题样式</a:t>
             </a:r>
+            <a:endParaRPr lang="zh-CN" altLang="en-US"/>
           </a:p>
         </p:txBody>
       </p:sp>
@@ -5202,6 +5373,7 @@
               <a:rPr lang="zh-CN" altLang="en-US"/>
               <a:t>单击此处编辑母版文本样式</a:t>
             </a:r>
+            <a:endParaRPr lang="zh-CN" altLang="en-US"/>
           </a:p>
         </p:txBody>
       </p:sp>
@@ -5222,7 +5394,6 @@
           <a:p>
             <a:fld id="{51FD5836-1B78-4E70-983F-F8F353C30F27}" type="datetimeFigureOut">
               <a:rPr lang="zh-CN" altLang="en-US" smtClean="0"/>
-              <a:t>2024/7/1</a:t>
             </a:fld>
             <a:endParaRPr lang="zh-CN" altLang="en-US"/>
           </a:p>
@@ -5264,7 +5435,6 @@
           <a:p>
             <a:fld id="{AB80B9A9-C03D-4F64-ADE2-7C0EC2978D5F}" type="slidenum">
               <a:rPr lang="zh-CN" altLang="en-US" smtClean="0"/>
-              <a:t>‹#›</a:t>
             </a:fld>
             <a:endParaRPr lang="zh-CN" altLang="en-US"/>
           </a:p>
@@ -5329,6 +5499,7 @@
               <a:rPr lang="zh-CN" altLang="en-US"/>
               <a:t>单击此处编辑母版标题样式</a:t>
             </a:r>
+            <a:endParaRPr lang="zh-CN" altLang="en-US"/>
           </a:p>
         </p:txBody>
       </p:sp>
@@ -5362,6 +5533,7 @@
               <a:rPr lang="zh-CN" altLang="en-US"/>
               <a:t>单击此处编辑母版文本样式</a:t>
             </a:r>
+            <a:endParaRPr lang="zh-CN" altLang="en-US"/>
           </a:p>
           <a:p>
             <a:pPr lvl="1"/>
@@ -5369,6 +5541,7 @@
               <a:rPr lang="zh-CN" altLang="en-US"/>
               <a:t>二级</a:t>
             </a:r>
+            <a:endParaRPr lang="zh-CN" altLang="en-US"/>
           </a:p>
           <a:p>
             <a:pPr lvl="2"/>
@@ -5376,6 +5549,7 @@
               <a:rPr lang="zh-CN" altLang="en-US"/>
               <a:t>三级</a:t>
             </a:r>
+            <a:endParaRPr lang="zh-CN" altLang="en-US"/>
           </a:p>
           <a:p>
             <a:pPr lvl="3"/>
@@ -5383,6 +5557,7 @@
               <a:rPr lang="zh-CN" altLang="en-US"/>
               <a:t>四级</a:t>
             </a:r>
+            <a:endParaRPr lang="zh-CN" altLang="en-US"/>
           </a:p>
           <a:p>
             <a:pPr lvl="4"/>
@@ -5390,6 +5565,7 @@
               <a:rPr lang="zh-CN" altLang="en-US"/>
               <a:t>五级</a:t>
             </a:r>
+            <a:endParaRPr lang="zh-CN" altLang="en-US"/>
           </a:p>
         </p:txBody>
       </p:sp>
@@ -5428,7 +5604,6 @@
           <a:p>
             <a:fld id="{51FD5836-1B78-4E70-983F-F8F353C30F27}" type="datetimeFigureOut">
               <a:rPr lang="zh-CN" altLang="en-US" smtClean="0"/>
-              <a:t>2024/7/1</a:t>
             </a:fld>
             <a:endParaRPr lang="zh-CN" altLang="en-US"/>
           </a:p>
@@ -5506,7 +5681,6 @@
           <a:p>
             <a:fld id="{AB80B9A9-C03D-4F64-ADE2-7C0EC2978D5F}" type="slidenum">
               <a:rPr lang="zh-CN" altLang="en-US" smtClean="0"/>
-              <a:t>‹#›</a:t>
             </a:fld>
             <a:endParaRPr lang="zh-CN" altLang="en-US"/>
           </a:p>
@@ -5862,6 +6036,7 @@
               <a:rPr lang="zh-CN" altLang="en-US"/>
               <a:t>单击此处编辑母版标题样式</a:t>
             </a:r>
+            <a:endParaRPr lang="zh-CN" altLang="en-US"/>
           </a:p>
         </p:txBody>
       </p:sp>
@@ -5895,6 +6070,7 @@
               <a:rPr lang="zh-CN" altLang="en-US"/>
               <a:t>单击此处编辑母版文本样式</a:t>
             </a:r>
+            <a:endParaRPr lang="zh-CN" altLang="en-US"/>
           </a:p>
           <a:p>
             <a:pPr lvl="1"/>
@@ -5902,6 +6078,7 @@
               <a:rPr lang="zh-CN" altLang="en-US"/>
               <a:t>二级</a:t>
             </a:r>
+            <a:endParaRPr lang="zh-CN" altLang="en-US"/>
           </a:p>
           <a:p>
             <a:pPr lvl="2"/>
@@ -5909,6 +6086,7 @@
               <a:rPr lang="zh-CN" altLang="en-US"/>
               <a:t>三级</a:t>
             </a:r>
+            <a:endParaRPr lang="zh-CN" altLang="en-US"/>
           </a:p>
           <a:p>
             <a:pPr lvl="3"/>
@@ -5916,6 +6094,7 @@
               <a:rPr lang="zh-CN" altLang="en-US"/>
               <a:t>四级</a:t>
             </a:r>
+            <a:endParaRPr lang="zh-CN" altLang="en-US"/>
           </a:p>
           <a:p>
             <a:pPr lvl="4"/>
@@ -5923,6 +6102,7 @@
               <a:rPr lang="zh-CN" altLang="en-US"/>
               <a:t>五级</a:t>
             </a:r>
+            <a:endParaRPr lang="zh-CN" altLang="en-US"/>
           </a:p>
         </p:txBody>
       </p:sp>
@@ -5961,7 +6141,6 @@
           <a:p>
             <a:fld id="{51FD5836-1B78-4E70-983F-F8F353C30F27}" type="datetimeFigureOut">
               <a:rPr lang="zh-CN" altLang="en-US" smtClean="0"/>
-              <a:t>2024/7/1</a:t>
             </a:fld>
             <a:endParaRPr lang="zh-CN" altLang="en-US"/>
           </a:p>
@@ -6039,7 +6218,6 @@
           <a:p>
             <a:fld id="{AB80B9A9-C03D-4F64-ADE2-7C0EC2978D5F}" type="slidenum">
               <a:rPr lang="zh-CN" altLang="en-US" smtClean="0"/>
-              <a:t>‹#›</a:t>
             </a:fld>
             <a:endParaRPr lang="zh-CN" altLang="en-US"/>
           </a:p>
@@ -6450,11 +6628,29 @@
           </a:bodyPr>
           <a:lstStyle/>
           <a:p>
-            <a:r>
-              <a:rPr lang="en-US" altLang="zh-CN" dirty="0"/>
-              <a:t>Architecture</a:t>
-            </a:r>
-            <a:endParaRPr lang="zh-CN" altLang="en-US" dirty="0"/>
+            <a:pPr>
+              <a:lnSpc>
+                <a:spcPct val="110000"/>
+              </a:lnSpc>
+            </a:pPr>
+            <a:r>
+              <a:rPr lang="en-US" altLang="zh-CN" dirty="0">
+                <a:latin typeface="微软雅黑" charset="0"/>
+                <a:ea typeface="微软雅黑" charset="0"/>
+              </a:rPr>
+              <a:t>Benchmark &amp;</a:t>
+            </a:r>
+            <a:r>
+              <a:rPr lang="en-US" altLang="zh-CN" dirty="0">
+                <a:latin typeface="微软雅黑" charset="0"/>
+                <a:ea typeface="微软雅黑" charset="0"/>
+              </a:rPr>
+              <a:t> ROS2</a:t>
+            </a:r>
+            <a:endParaRPr lang="en-US" altLang="zh-CN" dirty="0">
+              <a:latin typeface="微软雅黑" charset="0"/>
+              <a:ea typeface="微软雅黑" charset="0"/>
+            </a:endParaRPr>
           </a:p>
         </p:txBody>
       </p:sp>
@@ -6481,168 +6677,13 @@
           <a:lstStyle/>
           <a:p>
             <a:r>
-              <a:rPr lang="en-US" altLang="zh-CN" sz="2000" b="1" dirty="0"/>
-              <a:t>Callback</a:t>
-            </a:r>
-            <a:r>
               <a:rPr lang="en-US" altLang="zh-CN" sz="2000" dirty="0"/>
-              <a:t>: Minimum scheduling entity</a:t>
-            </a:r>
-          </a:p>
-          <a:p>
-            <a:pPr lvl="1"/>
-            <a:r>
-              <a:rPr lang="en-US" altLang="zh-CN" sz="1600" dirty="0"/>
-              <a:t>Four types: timer, subscription, service, and client.</a:t>
-            </a:r>
-          </a:p>
-          <a:p>
-            <a:pPr lvl="1"/>
-            <a:r>
-              <a:rPr lang="en-US" altLang="zh-CN" sz="1600" b="1" dirty="0"/>
-              <a:t>Timer callbacks have a period (time trigger).</a:t>
-            </a:r>
-            <a:r>
-              <a:rPr lang="en-US" altLang="zh-CN" sz="1600" dirty="0"/>
-              <a:t> </a:t>
-            </a:r>
-          </a:p>
-          <a:p>
-            <a:pPr lvl="1"/>
-            <a:r>
-              <a:rPr lang="en-US" altLang="zh-CN" sz="1600" b="1" dirty="0"/>
-              <a:t>Others are regular callbacks (event trigger)</a:t>
-            </a:r>
-          </a:p>
-          <a:p>
-            <a:pPr lvl="1"/>
-            <a:r>
-              <a:rPr lang="en-US" altLang="zh-CN" sz="1600" dirty="0">
-                <a:solidFill>
-                  <a:schemeClr val="accent1"/>
-                </a:solidFill>
-              </a:rPr>
-              <a:t>With priority: Timer&gt;Subscription&gt;Service&gt;Client</a:t>
-            </a:r>
-          </a:p>
-          <a:p>
-            <a:r>
-              <a:rPr lang="en-US" altLang="zh-CN" sz="2000" b="1" dirty="0"/>
-              <a:t>Node</a:t>
-            </a:r>
-            <a:r>
-              <a:rPr lang="en-US" altLang="zh-CN" sz="2000" dirty="0"/>
-              <a:t>: publish-subscribe communication</a:t>
-            </a:r>
-          </a:p>
-          <a:p>
-            <a:pPr lvl="1"/>
-            <a:r>
-              <a:rPr lang="en-US" altLang="zh-CN" sz="1600" dirty="0"/>
-              <a:t>Nodes publish messages on a topic, and other nodes subscribed to the topic process each message by activating a callback.</a:t>
-            </a:r>
-            <a:r>
-              <a:rPr lang="zh-CN" altLang="en-US" sz="1600" dirty="0"/>
-              <a:t> </a:t>
-            </a:r>
-            <a:endParaRPr lang="en-US" altLang="zh-CN" sz="1600" dirty="0"/>
-          </a:p>
-          <a:p>
-            <a:pPr lvl="1"/>
-            <a:r>
-              <a:rPr lang="en-US" altLang="zh-CN" sz="1600" b="1" dirty="0"/>
-              <a:t>Can only running on the only executor</a:t>
-            </a:r>
-            <a:endParaRPr lang="en-US" altLang="zh-CN" sz="1330" b="1" dirty="0"/>
-          </a:p>
-          <a:p>
-            <a:pPr lvl="1"/>
-            <a:r>
-              <a:rPr lang="en-US" altLang="zh-CN" sz="1600" dirty="0"/>
-              <a:t>ROS executes callbacks in the order in which messages are received.</a:t>
-            </a:r>
-            <a:r>
-              <a:rPr lang="zh-CN" altLang="en-US" sz="1600" dirty="0"/>
-              <a:t> </a:t>
-            </a:r>
-            <a:endParaRPr lang="en-US" altLang="zh-CN" sz="1600" dirty="0"/>
-          </a:p>
-          <a:p>
-            <a:pPr lvl="1"/>
-            <a:r>
-              <a:rPr lang="en-US" altLang="zh-CN" sz="1600" dirty="0"/>
-              <a:t>Messages published to multiple topics are concurrently</a:t>
-            </a:r>
-          </a:p>
-          <a:p>
-            <a:r>
-              <a:rPr lang="en-US" altLang="zh-CN" sz="2000" b="1" dirty="0"/>
-              <a:t>Executor</a:t>
-            </a:r>
-            <a:r>
-              <a:rPr lang="en-US" altLang="zh-CN" sz="2000" dirty="0"/>
-              <a:t>: Schedule and execute callbacks</a:t>
-            </a:r>
-          </a:p>
-          <a:p>
-            <a:pPr lvl="1"/>
-            <a:r>
-              <a:rPr lang="en-US" altLang="zh-CN" sz="1600" dirty="0"/>
-              <a:t>Nodes are assigned to different executors, and all callbacks within the node are scheduled by same executor.</a:t>
-            </a:r>
-          </a:p>
-          <a:p>
-            <a:pPr lvl="1"/>
-            <a:r>
-              <a:rPr lang="en-US" altLang="zh-CN" sz="1600" dirty="0">
-                <a:solidFill>
-                  <a:schemeClr val="accent1"/>
-                </a:solidFill>
-              </a:rPr>
-              <a:t>Single-threaded executor: handle all callbacks in a single thread</a:t>
-            </a:r>
-          </a:p>
-          <a:p>
-            <a:pPr lvl="1"/>
-            <a:r>
-              <a:rPr lang="en-US" altLang="zh-CN" sz="1600" dirty="0"/>
-              <a:t>Multi-threaded executor: multiple threads handle callbacks</a:t>
-            </a:r>
-          </a:p>
-          <a:p>
-            <a:pPr lvl="1"/>
-            <a:endParaRPr lang="en-US" altLang="zh-CN" sz="1600" dirty="0"/>
-          </a:p>
-          <a:p>
-            <a:pPr lvl="1"/>
-            <a:endParaRPr lang="en-US" altLang="zh-CN" sz="1600" dirty="0"/>
-          </a:p>
-        </p:txBody>
-      </p:sp>
-      <p:pic>
-        <p:nvPicPr>
-          <p:cNvPr id="9" name="图片 8"/>
-          <p:cNvPicPr>
-            <a:picLocks noChangeAspect="1"/>
-          </p:cNvPicPr>
-          <p:nvPr/>
-        </p:nvPicPr>
-        <p:blipFill>
-          <a:blip r:embed="rId3"/>
-          <a:stretch>
-            <a:fillRect/>
-          </a:stretch>
-        </p:blipFill>
-        <p:spPr>
-          <a:xfrm>
-            <a:off x="6863445" y="1314228"/>
-            <a:ext cx="5185663" cy="3961156"/>
-          </a:xfrm>
-          <a:prstGeom prst="rect">
-            <a:avLst/>
-          </a:prstGeom>
-        </p:spPr>
-      </p:pic>
+              <a:t>https://github.com/ros2/performance_test/</a:t>
+            </a:r>
+            <a:endParaRPr lang="en-US" altLang="zh-CN" sz="2000" dirty="0"/>
+          </a:p>
+        </p:txBody>
+      </p:sp>
     </p:spTree>
   </p:cSld>
   <p:clrMapOvr>
@@ -6680,7 +6721,7 @@
         </p:nvSpPr>
         <p:spPr>
           <a:xfrm>
-            <a:off x="0" y="8793"/>
+            <a:off x="0" y="0"/>
             <a:ext cx="10515600" cy="575652"/>
           </a:xfrm>
         </p:spPr>
@@ -6690,11 +6731,29 @@
           </a:bodyPr>
           <a:lstStyle/>
           <a:p>
-            <a:r>
-              <a:rPr lang="en-US" altLang="zh-CN" dirty="0"/>
-              <a:t>Scheduling</a:t>
-            </a:r>
-            <a:endParaRPr lang="zh-CN" altLang="en-US" dirty="0"/>
+            <a:pPr>
+              <a:lnSpc>
+                <a:spcPct val="110000"/>
+              </a:lnSpc>
+            </a:pPr>
+            <a:r>
+              <a:rPr lang="en-US" altLang="zh-CN" dirty="0">
+                <a:latin typeface="微软雅黑" charset="0"/>
+                <a:ea typeface="微软雅黑" charset="0"/>
+              </a:rPr>
+              <a:t>Benchmark &amp;</a:t>
+            </a:r>
+            <a:r>
+              <a:rPr lang="en-US" altLang="zh-CN" dirty="0">
+                <a:latin typeface="微软雅黑" charset="0"/>
+                <a:ea typeface="微软雅黑" charset="0"/>
+              </a:rPr>
+              <a:t> ROS2</a:t>
+            </a:r>
+            <a:endParaRPr lang="en-US" altLang="zh-CN" dirty="0">
+              <a:latin typeface="微软雅黑" charset="0"/>
+              <a:ea typeface="微软雅黑" charset="0"/>
+            </a:endParaRPr>
           </a:p>
         </p:txBody>
       </p:sp>
@@ -6710,8 +6769,8 @@
         </p:nvSpPr>
         <p:spPr>
           <a:xfrm>
-            <a:off x="0" y="584445"/>
-            <a:ext cx="6304085" cy="5753344"/>
+            <a:off x="0" y="575652"/>
+            <a:ext cx="6611815" cy="5753344"/>
           </a:xfrm>
         </p:spPr>
         <p:txBody>
@@ -6721,146 +6780,38 @@
           <a:lstStyle/>
           <a:p>
             <a:r>
-              <a:rPr lang="en-US" altLang="zh-CN" sz="2000" b="1" dirty="0"/>
-              <a:t>Polling point</a:t>
-            </a:r>
-            <a:r>
               <a:rPr lang="en-US" altLang="zh-CN" sz="2000" dirty="0"/>
-              <a:t>: </a:t>
-            </a:r>
-            <a:r>
-              <a:rPr lang="en-US" altLang="zh-CN" sz="1800" dirty="0"/>
-              <a:t>The time when no instances are available and the executor selects the next instance to execute.</a:t>
-            </a:r>
-            <a:r>
-              <a:rPr lang="zh-CN" altLang="en-US" sz="1800" dirty="0"/>
-              <a:t> </a:t>
-            </a:r>
-            <a:endParaRPr lang="zh-CN" altLang="en-US" sz="2000" dirty="0"/>
-          </a:p>
-          <a:p>
-            <a:r>
-              <a:rPr lang="en-US" altLang="zh-CN" sz="2000" b="1" dirty="0"/>
-              <a:t>Processing window</a:t>
-            </a:r>
-            <a:r>
-              <a:rPr lang="en-US" altLang="zh-CN" sz="2000" dirty="0"/>
-              <a:t>: between two polling points.</a:t>
-            </a:r>
-          </a:p>
-          <a:p>
-            <a:r>
-              <a:rPr lang="en-US" altLang="zh-CN" sz="2000" b="1" dirty="0"/>
-              <a:t>Single-threaded executor process</a:t>
-            </a:r>
-          </a:p>
-          <a:p>
-            <a:pPr lvl="1"/>
-            <a:r>
-              <a:rPr lang="en-US" altLang="zh-CN" sz="1600" dirty="0" err="1"/>
-              <a:t>Readyset</a:t>
-            </a:r>
-            <a:r>
-              <a:rPr lang="en-US" altLang="zh-CN" sz="1600" dirty="0"/>
-              <a:t> is empty, polling point is available</a:t>
-            </a:r>
-          </a:p>
-          <a:p>
-            <a:pPr lvl="1"/>
-            <a:r>
-              <a:rPr lang="en-US" altLang="zh-CN" sz="1600" dirty="0"/>
-              <a:t>All ready regular callbacks are added to </a:t>
-            </a:r>
-            <a:r>
-              <a:rPr lang="en-US" altLang="zh-CN" sz="1600" dirty="0" err="1"/>
-              <a:t>readyset</a:t>
-            </a:r>
-            <a:endParaRPr lang="en-US" altLang="zh-CN" sz="1600" dirty="0"/>
-          </a:p>
-          <a:p>
-            <a:pPr lvl="1"/>
-            <a:r>
-              <a:rPr lang="en-US" altLang="zh-CN" sz="1600" b="1" dirty="0">
-                <a:solidFill>
-                  <a:schemeClr val="accent1"/>
-                </a:solidFill>
+              <a:t>fifo</a:t>
+            </a:r>
+            <a:r>
+              <a:rPr lang="zh-CN" altLang="en-US" sz="2000" dirty="0">
+                <a:ea typeface="宋体" charset="0"/>
               </a:rPr>
-              <a:t>note</a:t>
-            </a:r>
-            <a:r>
-              <a:rPr lang="zh-CN" altLang="en-US" sz="1600" b="1" dirty="0">
-                <a:solidFill>
-                  <a:schemeClr val="accent1"/>
-                </a:solidFill>
+              <a:t>，满负载，改一次</a:t>
+            </a:r>
+            <a:r>
+              <a:rPr lang="zh-CN" altLang="en-US" sz="2000" dirty="0">
+                <a:ea typeface="宋体" charset="0"/>
               </a:rPr>
-              <a:t>：</a:t>
-            </a:r>
-            <a:r>
-              <a:rPr lang="en-US" altLang="zh-CN" sz="1600" b="1" dirty="0">
-                <a:solidFill>
-                  <a:schemeClr val="accent1"/>
-                </a:solidFill>
-              </a:rPr>
-              <a:t>The timer callback does not need to wait for the polling point, only needs to wait for timer</a:t>
-            </a:r>
-          </a:p>
-          <a:p>
-            <a:pPr lvl="1"/>
-            <a:r>
-              <a:rPr lang="en-US" altLang="zh-CN" sz="1600" dirty="0"/>
-              <a:t>In a processing window, </a:t>
-            </a:r>
-            <a:r>
-              <a:rPr lang="en-US" altLang="zh-CN" sz="1600" b="1" dirty="0">
-                <a:solidFill>
-                  <a:schemeClr val="accent1"/>
-                </a:solidFill>
-              </a:rPr>
-              <a:t>only the first instance of the callback is processed</a:t>
-            </a:r>
-          </a:p>
-          <a:p>
-            <a:pPr lvl="1"/>
-            <a:r>
-              <a:rPr lang="en-US" altLang="zh-CN" sz="1600" dirty="0"/>
-              <a:t>The order in which instances are executed by type priority</a:t>
-            </a:r>
-          </a:p>
-          <a:p>
-            <a:pPr lvl="1"/>
-            <a:r>
-              <a:rPr lang="en-US" altLang="zh-CN" sz="1600" dirty="0"/>
-              <a:t>When the priorities are the same, compare the callback registration time, and the earlier has higher priority.</a:t>
-            </a:r>
-          </a:p>
-          <a:p>
-            <a:pPr lvl="1"/>
-            <a:r>
-              <a:rPr lang="en-US" altLang="zh-CN" sz="1600" dirty="0"/>
-              <a:t>The first instance of all ready callbacks has been executed and </a:t>
-            </a:r>
-            <a:r>
-              <a:rPr lang="en-US" altLang="zh-CN" sz="1600" dirty="0" err="1"/>
-              <a:t>readyset</a:t>
-            </a:r>
-            <a:r>
-              <a:rPr lang="en-US" altLang="zh-CN" sz="1600" dirty="0"/>
-              <a:t> is empty.</a:t>
-            </a:r>
-          </a:p>
-          <a:p>
-            <a:pPr lvl="1"/>
-            <a:endParaRPr lang="en-US" altLang="zh-CN" sz="1600" dirty="0"/>
+              <a:t>优先级</a:t>
+            </a:r>
+            <a:endParaRPr lang="zh-CN" altLang="en-US" sz="2000" dirty="0">
+              <a:ea typeface="宋体" charset="0"/>
+            </a:endParaRPr>
           </a:p>
         </p:txBody>
       </p:sp>
       <p:pic>
         <p:nvPicPr>
-          <p:cNvPr id="5" name="图片 4"/>
+          <p:cNvPr id="4" name="图片 3"/>
           <p:cNvPicPr>
             <a:picLocks noChangeAspect="1"/>
           </p:cNvPicPr>
-          <p:nvPr/>
+          <p:nvPr>
+            <p:custDataLst>
+              <p:tags r:id="rId1"/>
+            </p:custDataLst>
+          </p:nvPr>
         </p:nvPicPr>
         <p:blipFill>
           <a:blip r:embed="rId2"/>
@@ -6870,8 +6821,8 @@
         </p:blipFill>
         <p:spPr>
           <a:xfrm>
-            <a:off x="6460786" y="773724"/>
-            <a:ext cx="5483175" cy="4743115"/>
+            <a:off x="1344295" y="1183005"/>
+            <a:ext cx="8682355" cy="4958715"/>
           </a:xfrm>
           <a:prstGeom prst="rect">
             <a:avLst/>
@@ -6925,601 +6876,98 @@
           </a:bodyPr>
           <a:lstStyle/>
           <a:p>
-            <a:r>
-              <a:rPr lang="en-US" altLang="zh-CN" dirty="0"/>
-              <a:t>Callback chain model</a:t>
-            </a:r>
-            <a:endParaRPr lang="zh-CN" altLang="en-US" dirty="0"/>
-          </a:p>
-        </p:txBody>
-      </p:sp>
-      <mc:AlternateContent xmlns:mc="http://schemas.openxmlformats.org/markup-compatibility/2006">
-        <mc:Choice xmlns:a14="http://schemas.microsoft.com/office/drawing/2010/main" Requires="a14">
-          <p:sp>
-            <p:nvSpPr>
-              <p:cNvPr id="3" name="内容占位符 2"/>
-              <p:cNvSpPr>
-                <a:spLocks noGrp="1"/>
-              </p:cNvSpPr>
-              <p:nvPr>
-                <p:ph idx="1"/>
-              </p:nvPr>
-            </p:nvSpPr>
-            <p:spPr>
-              <a:xfrm>
-                <a:off x="0" y="575652"/>
-                <a:ext cx="12192000" cy="5753344"/>
-              </a:xfrm>
-            </p:spPr>
-            <p:txBody>
-              <a:bodyPr>
-                <a:normAutofit/>
-              </a:bodyPr>
-              <a:lstStyle/>
-              <a:p>
-                <a:r>
-                  <a:rPr lang="en-US" altLang="zh-CN" sz="2000" dirty="0"/>
-                  <a:t>The triggering relationship between callbacks constitutes the </a:t>
-                </a:r>
-                <a:r>
-                  <a:rPr lang="en-US" altLang="zh-CN" sz="2000" b="1" dirty="0"/>
-                  <a:t>callback chain</a:t>
-                </a:r>
-                <a:endParaRPr lang="en-US" altLang="zh-CN" sz="2000" dirty="0"/>
-              </a:p>
-              <a:p>
-                <a:r>
-                  <a:rPr lang="en-US" altLang="zh-CN" sz="2000" dirty="0"/>
-                  <a:t>A callback chain can exist within a single executor, or multiple executors.</a:t>
-                </a:r>
-              </a:p>
-              <a:p>
-                <a:pPr lvl="1"/>
-                <a:r>
-                  <a:rPr lang="en-US" altLang="zh-CN" sz="1600" dirty="0"/>
-                  <a:t>Similar to a chain of tasks (callbacks) scheduled , instances of tasks are similar to instances of callbacks</a:t>
-                </a:r>
-              </a:p>
-              <a:p>
-                <a:r>
-                  <a:rPr lang="en-US" altLang="zh-CN" sz="2000" b="1" dirty="0">
-                    <a:solidFill>
-                      <a:schemeClr val="accent1"/>
-                    </a:solidFill>
-                  </a:rPr>
-                  <a:t>The callback chain usually starts with a timer callback, followed by regular callbacks.</a:t>
-                </a:r>
-              </a:p>
-              <a:p>
-                <a14:m>
-                  <m:oMath xmlns:m="http://schemas.openxmlformats.org/officeDocument/2006/math">
-                    <m:r>
-                      <a:rPr lang="en-US" altLang="zh-CN" sz="1600" i="1" dirty="0">
-                        <a:latin typeface="DejaVu Math TeX Gyre" panose="02000503000000000000" charset="0"/>
-                        <a:cs typeface="DejaVu Math TeX Gyre" panose="02000503000000000000" charset="0"/>
-                      </a:rPr>
-                      <m:t>𝐶</m:t>
-                    </m:r>
-                    <m:r>
-                      <a:rPr lang="en-US" altLang="zh-CN" sz="1600" i="1" dirty="0">
-                        <a:latin typeface="DejaVu Math TeX Gyre" panose="02000503000000000000" charset="0"/>
-                        <a:cs typeface="DejaVu Math TeX Gyre" panose="02000503000000000000" charset="0"/>
-                      </a:rPr>
-                      <m:t>={</m:t>
-                    </m:r>
-                    <m:sSubSup>
-                      <m:sSubSupPr>
-                        <m:ctrlPr>
-                          <a:rPr lang="en-US" altLang="zh-CN" sz="1600" i="1" dirty="0">
-                            <a:latin typeface="Cambria Math" panose="02040503050406030204" pitchFamily="18" charset="0"/>
-                            <a:cs typeface="DejaVu Math TeX Gyre" panose="02000503000000000000" charset="0"/>
-                          </a:rPr>
-                        </m:ctrlPr>
-                      </m:sSubSupPr>
-                      <m:e>
-                        <m:r>
-                          <a:rPr lang="en-US" altLang="zh-CN" sz="1600" i="1" dirty="0">
-                            <a:latin typeface="DejaVu Math TeX Gyre" panose="02000503000000000000" charset="0"/>
-                            <a:cs typeface="DejaVu Math TeX Gyre" panose="02000503000000000000" charset="0"/>
-                          </a:rPr>
-                          <m:t>𝐶</m:t>
-                        </m:r>
-                      </m:e>
-                      <m:sub>
-                        <m:r>
-                          <a:rPr lang="en-US" altLang="zh-CN" sz="1600" i="1" dirty="0">
-                            <a:latin typeface="DejaVu Math TeX Gyre" panose="02000503000000000000" charset="0"/>
-                            <a:cs typeface="DejaVu Math TeX Gyre" panose="02000503000000000000" charset="0"/>
-                          </a:rPr>
-                          <m:t>𝑡𝑚</m:t>
-                        </m:r>
-                      </m:sub>
-                      <m:sup/>
-                    </m:sSubSup>
-                    <m:r>
-                      <a:rPr lang="en-US" altLang="zh-CN" sz="1600" i="1" dirty="0">
-                        <a:latin typeface="DejaVu Math TeX Gyre" panose="02000503000000000000" charset="0"/>
-                        <a:cs typeface="DejaVu Math TeX Gyre" panose="02000503000000000000" charset="0"/>
-                      </a:rPr>
-                      <m:t>,</m:t>
-                    </m:r>
-                    <m:sSubSup>
-                      <m:sSubSupPr>
-                        <m:ctrlPr>
-                          <a:rPr lang="en-US" altLang="zh-CN" sz="1600" i="1" dirty="0">
-                            <a:latin typeface="Cambria Math" panose="02040503050406030204" pitchFamily="18" charset="0"/>
-                            <a:cs typeface="DejaVu Math TeX Gyre" panose="02000503000000000000" charset="0"/>
-                          </a:rPr>
-                        </m:ctrlPr>
-                      </m:sSubSupPr>
-                      <m:e>
-                        <m:r>
-                          <a:rPr lang="en-US" altLang="zh-CN" sz="1600" i="1" dirty="0">
-                            <a:latin typeface="DejaVu Math TeX Gyre" panose="02000503000000000000" charset="0"/>
-                            <a:cs typeface="DejaVu Math TeX Gyre" panose="02000503000000000000" charset="0"/>
-                          </a:rPr>
-                          <m:t>𝐶</m:t>
-                        </m:r>
-                      </m:e>
-                      <m:sub>
-                        <m:r>
-                          <a:rPr lang="en-US" altLang="zh-CN" sz="1600" i="1" dirty="0">
-                            <a:latin typeface="DejaVu Math TeX Gyre" panose="02000503000000000000" charset="0"/>
-                            <a:cs typeface="DejaVu Math TeX Gyre" panose="02000503000000000000" charset="0"/>
-                          </a:rPr>
-                          <m:t>1</m:t>
-                        </m:r>
-                      </m:sub>
-                      <m:sup/>
-                    </m:sSubSup>
-                    <m:r>
-                      <a:rPr lang="en-US" altLang="zh-CN" sz="1600" i="1" dirty="0">
-                        <a:latin typeface="DejaVu Math TeX Gyre" panose="02000503000000000000" charset="0"/>
-                        <a:cs typeface="DejaVu Math TeX Gyre" panose="02000503000000000000" charset="0"/>
-                      </a:rPr>
-                      <m:t>,...,</m:t>
-                    </m:r>
-                    <m:sSubSup>
-                      <m:sSubSupPr>
-                        <m:ctrlPr>
-                          <a:rPr lang="en-US" altLang="zh-CN" sz="1600" i="1" dirty="0">
-                            <a:latin typeface="Cambria Math" panose="02040503050406030204" pitchFamily="18" charset="0"/>
-                            <a:cs typeface="DejaVu Math TeX Gyre" panose="02000503000000000000" charset="0"/>
-                          </a:rPr>
-                        </m:ctrlPr>
-                      </m:sSubSupPr>
-                      <m:e>
-                        <m:r>
-                          <a:rPr lang="en-US" altLang="zh-CN" sz="1600" i="1" dirty="0">
-                            <a:latin typeface="DejaVu Math TeX Gyre" panose="02000503000000000000" charset="0"/>
-                            <a:cs typeface="DejaVu Math TeX Gyre" panose="02000503000000000000" charset="0"/>
-                          </a:rPr>
-                          <m:t>𝐶</m:t>
-                        </m:r>
-                      </m:e>
-                      <m:sub>
-                        <m:r>
-                          <a:rPr lang="en-US" altLang="zh-CN" sz="1600" i="1" dirty="0">
-                            <a:latin typeface="DejaVu Math TeX Gyre" panose="02000503000000000000" charset="0"/>
-                            <a:cs typeface="DejaVu Math TeX Gyre" panose="02000503000000000000" charset="0"/>
-                          </a:rPr>
-                          <m:t>𝑛</m:t>
-                        </m:r>
-                      </m:sub>
-                      <m:sup/>
-                    </m:sSubSup>
-                    <m:r>
-                      <a:rPr lang="en-US" altLang="zh-CN" sz="1600" i="1" dirty="0">
-                        <a:latin typeface="DejaVu Math TeX Gyre" panose="02000503000000000000" charset="0"/>
-                        <a:cs typeface="DejaVu Math TeX Gyre" panose="02000503000000000000" charset="0"/>
-                      </a:rPr>
-                      <m:t>}</m:t>
-                    </m:r>
-                  </m:oMath>
-                </a14:m>
-                <a:r>
-                  <a:rPr lang="en-US" altLang="zh-CN" sz="1600" dirty="0"/>
-                  <a:t>,        </a:t>
-                </a:r>
-                <a14:m>
-                  <m:oMath xmlns:m="http://schemas.openxmlformats.org/officeDocument/2006/math">
-                    <m:sSubSup>
-                      <m:sSubSupPr>
-                        <m:ctrlPr>
-                          <a:rPr lang="en-US" altLang="zh-CN" sz="1600" i="1" dirty="0">
-                            <a:latin typeface="Cambria Math" panose="02040503050406030204" pitchFamily="18" charset="0"/>
-                            <a:cs typeface="DejaVu Math TeX Gyre" panose="02000503000000000000" charset="0"/>
-                          </a:rPr>
-                        </m:ctrlPr>
-                      </m:sSubSupPr>
-                      <m:e>
-                        <m:r>
-                          <a:rPr lang="en-US" altLang="zh-CN" sz="1600" i="1" dirty="0">
-                            <a:latin typeface="DejaVu Math TeX Gyre" panose="02000503000000000000" charset="0"/>
-                            <a:cs typeface="DejaVu Math TeX Gyre" panose="02000503000000000000" charset="0"/>
-                          </a:rPr>
-                          <m:t>𝐶</m:t>
-                        </m:r>
-                      </m:e>
-                      <m:sub>
-                        <m:r>
-                          <a:rPr lang="en-US" altLang="zh-CN" sz="1600" i="1" dirty="0">
-                            <a:latin typeface="DejaVu Math TeX Gyre" panose="02000503000000000000" charset="0"/>
-                            <a:cs typeface="DejaVu Math TeX Gyre" panose="02000503000000000000" charset="0"/>
-                          </a:rPr>
-                          <m:t>1</m:t>
-                        </m:r>
-                      </m:sub>
-                      <m:sup>
-                        <m:r>
-                          <a:rPr lang="en-US" altLang="zh-CN" sz="1600" i="1" dirty="0">
-                            <a:latin typeface="DejaVu Math TeX Gyre" panose="02000503000000000000" charset="0"/>
-                            <a:cs typeface="DejaVu Math TeX Gyre" panose="02000503000000000000" charset="0"/>
-                          </a:rPr>
-                          <m:t>𝑖</m:t>
-                        </m:r>
-                      </m:sup>
-                    </m:sSubSup>
-                  </m:oMath>
-                </a14:m>
-                <a:r>
-                  <a:rPr lang="en-US" altLang="zh-CN" sz="1600" dirty="0"/>
-                  <a:t>, </a:t>
-                </a:r>
-                <a:r>
-                  <a:rPr lang="en-US" altLang="zh-CN" sz="1600" dirty="0" err="1"/>
-                  <a:t>i-th</a:t>
-                </a:r>
-                <a:r>
-                  <a:rPr lang="en-US" altLang="zh-CN" sz="1600" dirty="0"/>
-                  <a:t> instance of </a:t>
-                </a:r>
-                <a14:m>
-                  <m:oMath xmlns:m="http://schemas.openxmlformats.org/officeDocument/2006/math">
-                    <m:sSub>
-                      <m:sSubPr>
-                        <m:ctrlPr>
-                          <a:rPr lang="en-US" altLang="zh-CN" sz="1600" i="1" dirty="0">
-                            <a:latin typeface="Cambria Math" panose="02040503050406030204" pitchFamily="18" charset="0"/>
-                            <a:cs typeface="DejaVu Math TeX Gyre" panose="02000503000000000000" charset="0"/>
-                          </a:rPr>
-                        </m:ctrlPr>
-                      </m:sSubPr>
-                      <m:e>
-                        <m:r>
-                          <a:rPr lang="en-US" altLang="zh-CN" sz="1600" i="1" dirty="0">
-                            <a:latin typeface="DejaVu Math TeX Gyre" panose="02000503000000000000" charset="0"/>
-                            <a:cs typeface="DejaVu Math TeX Gyre" panose="02000503000000000000" charset="0"/>
-                          </a:rPr>
-                          <m:t>𝐶</m:t>
-                        </m:r>
-                      </m:e>
-                      <m:sub>
-                        <m:r>
-                          <a:rPr lang="en-US" altLang="zh-CN" sz="1600" i="1" dirty="0">
-                            <a:latin typeface="DejaVu Math TeX Gyre" panose="02000503000000000000" charset="0"/>
-                            <a:cs typeface="DejaVu Math TeX Gyre" panose="02000503000000000000" charset="0"/>
-                          </a:rPr>
-                          <m:t>1</m:t>
-                        </m:r>
-                      </m:sub>
-                    </m:sSub>
-                  </m:oMath>
-                </a14:m>
-                <a:r>
-                  <a:rPr lang="en-US" altLang="zh-CN" sz="1600" dirty="0"/>
-                  <a:t> callback</a:t>
-                </a:r>
-              </a:p>
-              <a:p>
-                <a:r>
-                  <a:rPr lang="en-US" altLang="zh-CN" sz="2000" dirty="0"/>
-                  <a:t>External events (e.g. sensors) are not constructs in ROS2 systems, but can be modeled as pseudo-callbacks</a:t>
-                </a:r>
-              </a:p>
-              <a:p>
-                <a:pPr lvl="1"/>
-                <a:r>
-                  <a:rPr lang="en-US" altLang="zh-CN" sz="1600" dirty="0"/>
-                  <a:t>Add publish-subscribe interface for external events.</a:t>
-                </a:r>
-              </a:p>
-              <a:p>
-                <a:r>
-                  <a:rPr lang="en-US" altLang="zh-CN" sz="2000" dirty="0"/>
-                  <a:t>Attributes:</a:t>
-                </a:r>
-              </a:p>
-              <a:p>
-                <a:pPr lvl="1"/>
-                <a:r>
-                  <a:rPr lang="en-US" altLang="zh-CN" sz="1600" dirty="0"/>
-                  <a:t>Different instances of the same callback are executed in the order of activation. </a:t>
-                </a:r>
-                <a14:m>
-                  <m:oMath xmlns:m="http://schemas.openxmlformats.org/officeDocument/2006/math">
-                    <m:sSubSup>
-                      <m:sSubSupPr>
-                        <m:ctrlPr>
-                          <a:rPr lang="en-US" altLang="zh-CN" sz="1600" i="1" dirty="0">
-                            <a:latin typeface="Cambria Math" panose="02040503050406030204" pitchFamily="18" charset="0"/>
-                            <a:cs typeface="DejaVu Math TeX Gyre" panose="02000503000000000000" charset="0"/>
-                          </a:rPr>
-                        </m:ctrlPr>
-                      </m:sSubSupPr>
-                      <m:e>
-                        <m:r>
-                          <a:rPr lang="en-US" altLang="zh-CN" sz="1600" i="1" dirty="0">
-                            <a:latin typeface="DejaVu Math TeX Gyre" panose="02000503000000000000" charset="0"/>
-                            <a:cs typeface="DejaVu Math TeX Gyre" panose="02000503000000000000" charset="0"/>
-                          </a:rPr>
-                          <m:t>𝐶</m:t>
-                        </m:r>
-                      </m:e>
-                      <m:sub>
-                        <m:r>
-                          <a:rPr lang="en-US" altLang="zh-CN" sz="1600" i="1" dirty="0">
-                            <a:latin typeface="DejaVu Math TeX Gyre" panose="02000503000000000000" charset="0"/>
-                            <a:cs typeface="DejaVu Math TeX Gyre" panose="02000503000000000000" charset="0"/>
-                          </a:rPr>
-                          <m:t>𝑧</m:t>
-                        </m:r>
-                      </m:sub>
-                      <m:sup>
-                        <m:r>
-                          <a:rPr lang="en-US" altLang="zh-CN" sz="1600" i="1" dirty="0">
-                            <a:latin typeface="DejaVu Math TeX Gyre" panose="02000503000000000000" charset="0"/>
-                            <a:cs typeface="DejaVu Math TeX Gyre" panose="02000503000000000000" charset="0"/>
-                          </a:rPr>
-                          <m:t>𝑖</m:t>
-                        </m:r>
-                        <m:r>
-                          <a:rPr lang="en-US" altLang="zh-CN" sz="1600" i="1" dirty="0">
-                            <a:latin typeface="DejaVu Math TeX Gyre" panose="02000503000000000000" charset="0"/>
-                            <a:cs typeface="DejaVu Math TeX Gyre" panose="02000503000000000000" charset="0"/>
-                          </a:rPr>
-                          <m:t>−1</m:t>
-                        </m:r>
-                      </m:sup>
-                    </m:sSubSup>
-                  </m:oMath>
-                </a14:m>
-                <a:r>
-                  <a:rPr lang="en-US" altLang="zh-CN" sz="1600" dirty="0"/>
-                  <a:t> must be completed before </a:t>
-                </a:r>
-                <a14:m>
-                  <m:oMath xmlns:m="http://schemas.openxmlformats.org/officeDocument/2006/math">
-                    <m:sSubSup>
-                      <m:sSubSupPr>
-                        <m:ctrlPr>
-                          <a:rPr lang="en-US" altLang="zh-CN" sz="1600" i="1" dirty="0">
-                            <a:latin typeface="Cambria Math" panose="02040503050406030204" pitchFamily="18" charset="0"/>
-                            <a:cs typeface="DejaVu Math TeX Gyre" panose="02000503000000000000" charset="0"/>
-                          </a:rPr>
-                        </m:ctrlPr>
-                      </m:sSubSupPr>
-                      <m:e>
-                        <m:r>
-                          <a:rPr lang="en-US" altLang="zh-CN" sz="1600" i="1" dirty="0">
-                            <a:latin typeface="DejaVu Math TeX Gyre" panose="02000503000000000000" charset="0"/>
-                            <a:cs typeface="DejaVu Math TeX Gyre" panose="02000503000000000000" charset="0"/>
-                          </a:rPr>
-                          <m:t>𝐶</m:t>
-                        </m:r>
-                      </m:e>
-                      <m:sub>
-                        <m:r>
-                          <a:rPr lang="en-US" altLang="zh-CN" sz="1600" i="1" dirty="0">
-                            <a:latin typeface="DejaVu Math TeX Gyre" panose="02000503000000000000" charset="0"/>
-                            <a:cs typeface="DejaVu Math TeX Gyre" panose="02000503000000000000" charset="0"/>
-                          </a:rPr>
-                          <m:t>𝑧</m:t>
-                        </m:r>
-                      </m:sub>
-                      <m:sup>
-                        <m:r>
-                          <a:rPr lang="en-US" altLang="zh-CN" sz="1600" i="1" dirty="0">
-                            <a:latin typeface="DejaVu Math TeX Gyre" panose="02000503000000000000" charset="0"/>
-                            <a:cs typeface="DejaVu Math TeX Gyre" panose="02000503000000000000" charset="0"/>
-                          </a:rPr>
-                          <m:t>𝑖</m:t>
-                        </m:r>
-                      </m:sup>
-                    </m:sSubSup>
-                  </m:oMath>
-                </a14:m>
-                <a:r>
-                  <a:rPr lang="en-US" altLang="zh-CN" sz="1600" dirty="0"/>
-                  <a:t> can continue. </a:t>
-                </a:r>
-                <a:endParaRPr lang="en-US" altLang="zh-CN" sz="1200" dirty="0"/>
-              </a:p>
-              <a:p>
-                <a:pPr lvl="1"/>
-                <a:r>
-                  <a:rPr lang="en-US" altLang="zh-CN" sz="1600" dirty="0"/>
-                  <a:t>The executor selects a new instance only after the previous instance has completed. </a:t>
-                </a:r>
-                <a14:m>
-                  <m:oMath xmlns:m="http://schemas.openxmlformats.org/officeDocument/2006/math">
-                    <m:sSubSup>
-                      <m:sSubSupPr>
-                        <m:ctrlPr>
-                          <a:rPr lang="en-US" altLang="zh-CN" sz="1600" i="1" dirty="0">
-                            <a:latin typeface="Cambria Math" panose="02040503050406030204" pitchFamily="18" charset="0"/>
-                            <a:cs typeface="DejaVu Math TeX Gyre" panose="02000503000000000000" charset="0"/>
-                          </a:rPr>
-                        </m:ctrlPr>
-                      </m:sSubSupPr>
-                      <m:e>
-                        <m:r>
-                          <a:rPr lang="en-US" altLang="zh-CN" sz="1600" i="1" dirty="0">
-                            <a:latin typeface="DejaVu Math TeX Gyre" panose="02000503000000000000" charset="0"/>
-                            <a:cs typeface="DejaVu Math TeX Gyre" panose="02000503000000000000" charset="0"/>
-                          </a:rPr>
-                          <m:t>𝐶</m:t>
-                        </m:r>
-                      </m:e>
-                      <m:sub>
-                        <m:r>
-                          <a:rPr lang="en-US" altLang="zh-CN" sz="1600" i="1" dirty="0">
-                            <a:latin typeface="DejaVu Math TeX Gyre" panose="02000503000000000000" charset="0"/>
-                            <a:cs typeface="DejaVu Math TeX Gyre" panose="02000503000000000000" charset="0"/>
-                          </a:rPr>
-                          <m:t>𝑧</m:t>
-                        </m:r>
-                        <m:r>
-                          <a:rPr lang="en-US" altLang="zh-CN" sz="1600" i="1" dirty="0">
-                            <a:latin typeface="DejaVu Math TeX Gyre" panose="02000503000000000000" charset="0"/>
-                            <a:cs typeface="DejaVu Math TeX Gyre" panose="02000503000000000000" charset="0"/>
-                          </a:rPr>
-                          <m:t>−1</m:t>
-                        </m:r>
-                      </m:sub>
-                      <m:sup>
-                        <m:r>
-                          <a:rPr lang="en-US" altLang="zh-CN" sz="1600" i="1" dirty="0">
-                            <a:latin typeface="DejaVu Math TeX Gyre" panose="02000503000000000000" charset="0"/>
-                            <a:cs typeface="DejaVu Math TeX Gyre" panose="02000503000000000000" charset="0"/>
-                          </a:rPr>
-                          <m:t>𝑖</m:t>
-                        </m:r>
-                      </m:sup>
-                    </m:sSubSup>
-                  </m:oMath>
-                </a14:m>
-                <a:r>
-                  <a:rPr lang="en-US" altLang="zh-CN" sz="1600" dirty="0"/>
-                  <a:t> is completed and can continue </a:t>
-                </a:r>
-                <a14:m>
-                  <m:oMath xmlns:m="http://schemas.openxmlformats.org/officeDocument/2006/math">
-                    <m:sSubSup>
-                      <m:sSubSupPr>
-                        <m:ctrlPr>
-                          <a:rPr lang="en-US" altLang="zh-CN" sz="1600" i="1" dirty="0">
-                            <a:latin typeface="Cambria Math" panose="02040503050406030204" pitchFamily="18" charset="0"/>
-                            <a:cs typeface="DejaVu Math TeX Gyre" panose="02000503000000000000" charset="0"/>
-                          </a:rPr>
-                        </m:ctrlPr>
-                      </m:sSubSupPr>
-                      <m:e>
-                        <m:r>
-                          <a:rPr lang="en-US" altLang="zh-CN" sz="1600" i="1" dirty="0">
-                            <a:latin typeface="DejaVu Math TeX Gyre" panose="02000503000000000000" charset="0"/>
-                            <a:cs typeface="DejaVu Math TeX Gyre" panose="02000503000000000000" charset="0"/>
-                          </a:rPr>
-                          <m:t>𝐶</m:t>
-                        </m:r>
-                      </m:e>
-                      <m:sub>
-                        <m:r>
-                          <a:rPr lang="en-US" altLang="zh-CN" sz="1600" i="1" dirty="0">
-                            <a:latin typeface="DejaVu Math TeX Gyre" panose="02000503000000000000" charset="0"/>
-                            <a:cs typeface="DejaVu Math TeX Gyre" panose="02000503000000000000" charset="0"/>
-                          </a:rPr>
-                          <m:t>𝑧</m:t>
-                        </m:r>
-                      </m:sub>
-                      <m:sup>
-                        <m:r>
-                          <a:rPr lang="en-US" altLang="zh-CN" sz="1600" i="1" dirty="0">
-                            <a:latin typeface="DejaVu Math TeX Gyre" panose="02000503000000000000" charset="0"/>
-                            <a:cs typeface="DejaVu Math TeX Gyre" panose="02000503000000000000" charset="0"/>
-                          </a:rPr>
-                          <m:t>𝑖</m:t>
-                        </m:r>
-                      </m:sup>
-                    </m:sSubSup>
-                  </m:oMath>
-                </a14:m>
-                <a:endParaRPr lang="en-US" altLang="zh-CN" sz="1600" dirty="0"/>
-              </a:p>
-            </p:txBody>
-          </p:sp>
-        </mc:Choice>
-        <mc:Fallback>
-          <p:sp>
-            <p:nvSpPr>
-              <p:cNvPr id="3" name="内容占位符 2"/>
-              <p:cNvSpPr>
-                <a:spLocks noGrp="1" noRot="1" noChangeAspect="1" noMove="1" noResize="1" noEditPoints="1" noAdjustHandles="1" noChangeArrowheads="1" noChangeShapeType="1" noTextEdit="1"/>
-              </p:cNvSpPr>
-              <p:nvPr>
-                <p:ph idx="1"/>
-              </p:nvPr>
-            </p:nvSpPr>
-            <p:spPr>
-              <a:xfrm>
-                <a:off x="0" y="575652"/>
-                <a:ext cx="12192000" cy="5753344"/>
-              </a:xfrm>
-              <a:blipFill>
-                <a:blip r:embed="rId2"/>
-                <a:stretch>
-                  <a:fillRect l="-450" t="-1059"/>
-                </a:stretch>
-              </a:blipFill>
-            </p:spPr>
-            <p:txBody>
-              <a:bodyPr/>
-              <a:lstStyle/>
-              <a:p>
-                <a:r>
-                  <a:rPr lang="zh-CN" altLang="en-US">
-                    <a:noFill/>
-                  </a:rPr>
-                  <a:t> </a:t>
-                </a:r>
-              </a:p>
-            </p:txBody>
-          </p:sp>
-        </mc:Fallback>
-      </mc:AlternateContent>
+            <a:pPr>
+              <a:lnSpc>
+                <a:spcPct val="110000"/>
+              </a:lnSpc>
+            </a:pPr>
+            <a:r>
+              <a:rPr lang="en-US" altLang="zh-CN" dirty="0">
+                <a:latin typeface="微软雅黑" charset="0"/>
+                <a:ea typeface="微软雅黑" charset="0"/>
+              </a:rPr>
+              <a:t>Benchmark &amp;</a:t>
+            </a:r>
+            <a:r>
+              <a:rPr lang="en-US" altLang="zh-CN" dirty="0">
+                <a:latin typeface="微软雅黑" charset="0"/>
+                <a:ea typeface="微软雅黑" charset="0"/>
+              </a:rPr>
+              <a:t> ROS2</a:t>
+            </a:r>
+            <a:endParaRPr lang="en-US" altLang="zh-CN" dirty="0">
+              <a:latin typeface="微软雅黑" charset="0"/>
+              <a:ea typeface="微软雅黑" charset="0"/>
+            </a:endParaRPr>
+          </a:p>
+        </p:txBody>
+      </p:sp>
+      <p:sp>
+        <p:nvSpPr>
+          <p:cNvPr id="3" name="内容占位符 2"/>
+          <p:cNvSpPr>
+            <a:spLocks noGrp="1"/>
+          </p:cNvSpPr>
+          <p:nvPr>
+            <p:ph idx="1"/>
+          </p:nvPr>
+        </p:nvSpPr>
+        <p:spPr>
+          <a:xfrm>
+            <a:off x="0" y="575652"/>
+            <a:ext cx="6611815" cy="5753344"/>
+          </a:xfrm>
+        </p:spPr>
+        <p:txBody>
+          <a:bodyPr>
+            <a:normAutofit/>
+          </a:bodyPr>
+          <a:lstStyle/>
+          <a:p>
+            <a:r>
+              <a:rPr lang="en-US" altLang="zh-CN" sz="2000" dirty="0"/>
+              <a:t>ddl</a:t>
+            </a:r>
+            <a:r>
+              <a:rPr lang="zh-CN" altLang="en-US" sz="2000" dirty="0">
+                <a:ea typeface="宋体" charset="0"/>
+              </a:rPr>
+              <a:t>，满负载，改一次</a:t>
+            </a:r>
+            <a:r>
+              <a:rPr lang="zh-CN" altLang="en-US" sz="2000" dirty="0">
+                <a:ea typeface="宋体" charset="0"/>
+              </a:rPr>
+              <a:t>优先级</a:t>
+            </a:r>
+            <a:endParaRPr lang="zh-CN" altLang="en-US" sz="2000" dirty="0">
+              <a:ea typeface="宋体" charset="0"/>
+            </a:endParaRPr>
+          </a:p>
+        </p:txBody>
+      </p:sp>
       <p:pic>
         <p:nvPicPr>
           <p:cNvPr id="5" name="图片 4"/>
           <p:cNvPicPr>
             <a:picLocks noChangeAspect="1"/>
           </p:cNvPicPr>
-          <p:nvPr/>
+          <p:nvPr>
+            <p:custDataLst>
+              <p:tags r:id="rId1"/>
+            </p:custDataLst>
+          </p:nvPr>
         </p:nvPicPr>
-        <p:blipFill rotWithShape="1">
-          <a:blip r:embed="rId3"/>
-          <a:srcRect l="3516"/>
+        <p:blipFill>
+          <a:blip r:embed="rId2"/>
           <a:stretch>
             <a:fillRect/>
           </a:stretch>
         </p:blipFill>
         <p:spPr>
           <a:xfrm>
-            <a:off x="2113806" y="4938283"/>
-            <a:ext cx="2638653" cy="1096229"/>
-          </a:xfrm>
-          <a:prstGeom prst="rect">
-            <a:avLst/>
-          </a:prstGeom>
-        </p:spPr>
-      </p:pic>
-      <p:pic>
-        <p:nvPicPr>
-          <p:cNvPr id="7" name="图片 6"/>
-          <p:cNvPicPr>
-            <a:picLocks noChangeAspect="1"/>
-          </p:cNvPicPr>
-          <p:nvPr/>
-        </p:nvPicPr>
-        <p:blipFill>
-          <a:blip r:embed="rId4"/>
-          <a:stretch>
-            <a:fillRect/>
-          </a:stretch>
-        </p:blipFill>
-        <p:spPr>
-          <a:xfrm>
-            <a:off x="6676781" y="4643422"/>
-            <a:ext cx="4288155" cy="1487805"/>
+            <a:off x="393700" y="1546860"/>
+            <a:ext cx="9917430" cy="4428490"/>
           </a:xfrm>
           <a:prstGeom prst="rect">
             <a:avLst/>
@@ -7573,11 +7021,29 @@
           </a:bodyPr>
           <a:lstStyle/>
           <a:p>
-            <a:r>
-              <a:rPr lang="en-US" altLang="zh-CN" dirty="0"/>
-              <a:t>Kernel+ros2</a:t>
-            </a:r>
-            <a:endParaRPr lang="zh-CN" altLang="en-US" dirty="0"/>
+            <a:pPr>
+              <a:lnSpc>
+                <a:spcPct val="110000"/>
+              </a:lnSpc>
+            </a:pPr>
+            <a:r>
+              <a:rPr lang="en-US" altLang="zh-CN" dirty="0">
+                <a:latin typeface="微软雅黑" charset="0"/>
+                <a:ea typeface="微软雅黑" charset="0"/>
+              </a:rPr>
+              <a:t>Benchmark &amp;</a:t>
+            </a:r>
+            <a:r>
+              <a:rPr lang="en-US" altLang="zh-CN" dirty="0">
+                <a:latin typeface="微软雅黑" charset="0"/>
+                <a:ea typeface="微软雅黑" charset="0"/>
+              </a:rPr>
+              <a:t> ROS2</a:t>
+            </a:r>
+            <a:endParaRPr lang="en-US" altLang="zh-CN" dirty="0">
+              <a:latin typeface="微软雅黑" charset="0"/>
+              <a:ea typeface="微软雅黑" charset="0"/>
+            </a:endParaRPr>
           </a:p>
         </p:txBody>
       </p:sp>
@@ -7589,732 +7055,70 @@
           </p:cNvSpPr>
           <p:nvPr>
             <p:ph idx="1"/>
+          </p:nvPr>
+        </p:nvSpPr>
+        <p:spPr>
+          <a:xfrm>
+            <a:off x="0" y="575652"/>
+            <a:ext cx="6611815" cy="5753344"/>
+          </a:xfrm>
+        </p:spPr>
+        <p:txBody>
+          <a:bodyPr>
+            <a:normAutofit/>
+          </a:bodyPr>
+          <a:lstStyle/>
+          <a:p>
+            <a:r>
+              <a:rPr lang="en-US" altLang="zh-CN" sz="2000" dirty="0"/>
+              <a:t>fifo</a:t>
+            </a:r>
+            <a:r>
+              <a:rPr lang="zh-CN" altLang="en-US" sz="2000" dirty="0">
+                <a:ea typeface="宋体" charset="0"/>
+              </a:rPr>
+              <a:t>，满负载，两种</a:t>
+            </a:r>
+            <a:r>
+              <a:rPr lang="zh-CN" altLang="en-US" sz="2000" dirty="0">
+                <a:ea typeface="宋体" charset="0"/>
+              </a:rPr>
+              <a:t>优先级</a:t>
+            </a:r>
+            <a:endParaRPr lang="zh-CN" altLang="en-US" sz="2000" dirty="0">
+              <a:ea typeface="宋体" charset="0"/>
+            </a:endParaRPr>
+          </a:p>
+        </p:txBody>
+      </p:sp>
+      <p:pic>
+        <p:nvPicPr>
+          <p:cNvPr id="6" name="图片 5"/>
+          <p:cNvPicPr>
+            <a:picLocks noChangeAspect="1"/>
+          </p:cNvPicPr>
+          <p:nvPr>
             <p:custDataLst>
               <p:tags r:id="rId1"/>
             </p:custDataLst>
           </p:nvPr>
-        </p:nvSpPr>
-        <p:spPr>
-          <a:xfrm>
-            <a:off x="0" y="575652"/>
-            <a:ext cx="12192000" cy="1965325"/>
-          </a:xfrm>
-        </p:spPr>
-        <p:txBody>
-          <a:bodyPr>
-            <a:normAutofit fontScale="47500" lnSpcReduction="20000"/>
-          </a:bodyPr>
-          <a:lstStyle/>
-          <a:p>
-            <a:r>
-              <a:rPr lang="en-US" altLang="zh-CN" sz="4000" dirty="0"/>
-              <a:t>Test setup:</a:t>
-            </a:r>
-          </a:p>
-          <a:p>
-            <a:pPr lvl="1"/>
-            <a:r>
-              <a:rPr lang="en-US" altLang="zh-CN" sz="4000" dirty="0"/>
-              <a:t>Ros2 program: a simple single-threaded executor with one node containing a callback chain (the callback chain consists of a timer and two callbacks)</a:t>
-            </a:r>
-          </a:p>
-          <a:p>
-            <a:pPr lvl="1"/>
-            <a:r>
-              <a:rPr lang="en-US" altLang="zh-CN" sz="4000" dirty="0"/>
-              <a:t>The ros2 timer is triggered </a:t>
-            </a:r>
-            <a:r>
-              <a:rPr lang="en-US" altLang="zh-CN" sz="4000"/>
-              <a:t>with 1ms.</a:t>
-            </a:r>
-            <a:endParaRPr lang="en-US" altLang="zh-CN" sz="4000" dirty="0"/>
-          </a:p>
-          <a:p>
-            <a:pPr lvl="1"/>
-            <a:r>
-              <a:rPr lang="en-US" altLang="zh-CN" sz="4000" dirty="0"/>
-              <a:t>Non-real-time kernel</a:t>
-            </a:r>
-          </a:p>
-          <a:p>
-            <a:pPr lvl="1"/>
-            <a:r>
-              <a:rPr lang="en-US" altLang="zh-CN" sz="4000" dirty="0"/>
-              <a:t>Full load and </a:t>
-            </a:r>
-            <a:r>
-              <a:rPr lang="fr-FR" altLang="zh-CN" sz="4000" dirty="0"/>
-              <a:t>Change ros2 process cycle.</a:t>
-            </a:r>
-            <a:endParaRPr lang="en-US" altLang="zh-CN" sz="4000" dirty="0"/>
-          </a:p>
-          <a:p>
-            <a:pPr lvl="1"/>
-            <a:r>
-              <a:rPr lang="en-US" altLang="zh-CN" sz="4000" dirty="0"/>
-              <a:t>Trace-</a:t>
-            </a:r>
-            <a:r>
-              <a:rPr lang="en-US" altLang="zh-CN" sz="4000" dirty="0" err="1"/>
-              <a:t>cmd</a:t>
-            </a:r>
-            <a:r>
-              <a:rPr lang="en-US" altLang="zh-CN" sz="4000" dirty="0"/>
-              <a:t> tool to track "</a:t>
-            </a:r>
-            <a:r>
-              <a:rPr lang="en-US" altLang="zh-CN" sz="4000" dirty="0" err="1"/>
-              <a:t>sched_switch</a:t>
-            </a:r>
-            <a:r>
-              <a:rPr lang="en-US" altLang="zh-CN" sz="4000" dirty="0"/>
-              <a:t>“ event, </a:t>
-            </a:r>
-            <a:r>
-              <a:rPr lang="en-US" altLang="zh-CN" sz="4000" dirty="0" err="1"/>
-              <a:t>kernelshark</a:t>
-            </a:r>
-            <a:r>
-              <a:rPr lang="en-US" altLang="zh-CN" sz="4000" dirty="0"/>
-              <a:t> to view</a:t>
-            </a:r>
-          </a:p>
-          <a:p>
-            <a:pPr marL="457200" lvl="1" indent="0">
-              <a:buNone/>
-            </a:pPr>
-            <a:endParaRPr lang="en-US" altLang="zh-CN" sz="1200" dirty="0"/>
-          </a:p>
-        </p:txBody>
-      </p:sp>
-      <p:pic>
-        <p:nvPicPr>
-          <p:cNvPr id="5" name="图片 4">
-            <a:extLst>
-              <a:ext uri="{FF2B5EF4-FFF2-40B4-BE49-F238E27FC236}">
-                <a16:creationId xmlns:a16="http://schemas.microsoft.com/office/drawing/2014/main" id="{41ED5DAF-420D-B830-C005-8FB511C2542D}"/>
-              </a:ext>
-            </a:extLst>
-          </p:cNvPr>
-          <p:cNvPicPr>
-            <a:picLocks noChangeAspect="1"/>
-          </p:cNvPicPr>
-          <p:nvPr/>
         </p:nvPicPr>
         <p:blipFill>
-          <a:blip r:embed="rId4">
-            <a:extLst>
-              <a:ext uri="{28A0092B-C50C-407E-A947-70E740481C1C}">
-                <a14:useLocalDpi xmlns:a14="http://schemas.microsoft.com/office/drawing/2010/main" val="0"/>
-              </a:ext>
-            </a:extLst>
-          </a:blip>
+          <a:blip r:embed="rId2"/>
           <a:stretch>
             <a:fillRect/>
           </a:stretch>
         </p:blipFill>
         <p:spPr>
           <a:xfrm>
-            <a:off x="459278" y="3657710"/>
-            <a:ext cx="5151382" cy="2799769"/>
+            <a:off x="1383665" y="1591945"/>
+            <a:ext cx="7620635" cy="4178300"/>
           </a:xfrm>
           <a:prstGeom prst="rect">
             <a:avLst/>
           </a:prstGeom>
         </p:spPr>
       </p:pic>
-      <p:pic>
-        <p:nvPicPr>
-          <p:cNvPr id="7" name="图片 6">
-            <a:extLst>
-              <a:ext uri="{FF2B5EF4-FFF2-40B4-BE49-F238E27FC236}">
-                <a16:creationId xmlns:a16="http://schemas.microsoft.com/office/drawing/2014/main" id="{64ECF388-D975-34E4-9C70-0597979BE4BE}"/>
-              </a:ext>
-            </a:extLst>
-          </p:cNvPr>
-          <p:cNvPicPr>
-            <a:picLocks noChangeAspect="1"/>
-          </p:cNvPicPr>
-          <p:nvPr/>
-        </p:nvPicPr>
-        <p:blipFill>
-          <a:blip r:embed="rId5">
-            <a:extLst>
-              <a:ext uri="{28A0092B-C50C-407E-A947-70E740481C1C}">
-                <a14:useLocalDpi xmlns:a14="http://schemas.microsoft.com/office/drawing/2010/main" val="0"/>
-              </a:ext>
-            </a:extLst>
-          </a:blip>
-          <a:stretch>
-            <a:fillRect/>
-          </a:stretch>
-        </p:blipFill>
-        <p:spPr>
-          <a:xfrm>
-            <a:off x="6288039" y="3575537"/>
-            <a:ext cx="5903961" cy="2799769"/>
-          </a:xfrm>
-          <a:prstGeom prst="rect">
-            <a:avLst/>
-          </a:prstGeom>
-        </p:spPr>
-      </p:pic>
-      <p:sp>
-        <p:nvSpPr>
-          <p:cNvPr id="9" name="文本框 8">
-            <a:extLst>
-              <a:ext uri="{FF2B5EF4-FFF2-40B4-BE49-F238E27FC236}">
-                <a16:creationId xmlns:a16="http://schemas.microsoft.com/office/drawing/2014/main" id="{C501A025-F854-D902-4131-6FC91DD7710E}"/>
-              </a:ext>
-            </a:extLst>
-          </p:cNvPr>
-          <p:cNvSpPr txBox="1"/>
-          <p:nvPr/>
-        </p:nvSpPr>
-        <p:spPr>
-          <a:xfrm>
-            <a:off x="6288039" y="2646292"/>
-            <a:ext cx="5097999" cy="338554"/>
-          </a:xfrm>
-          <a:prstGeom prst="rect">
-            <a:avLst/>
-          </a:prstGeom>
-          <a:noFill/>
-        </p:spPr>
-        <p:txBody>
-          <a:bodyPr wrap="square" rtlCol="0">
-            <a:spAutoFit/>
-          </a:bodyPr>
-          <a:lstStyle/>
-          <a:p>
-            <a:r>
-              <a:rPr lang="zh-CN" altLang="en-US" sz="1600" dirty="0"/>
-              <a:t> </a:t>
-            </a:r>
-            <a:r>
-              <a:rPr lang="en-US" altLang="zh-CN" sz="1600" dirty="0"/>
-              <a:t>2. Full load is often disturbed</a:t>
-            </a:r>
-            <a:endParaRPr lang="zh-CN" altLang="en-US" sz="1600" dirty="0"/>
-          </a:p>
-        </p:txBody>
-      </p:sp>
-      <p:sp>
-        <p:nvSpPr>
-          <p:cNvPr id="10" name="文本框 9">
-            <a:extLst>
-              <a:ext uri="{FF2B5EF4-FFF2-40B4-BE49-F238E27FC236}">
-                <a16:creationId xmlns:a16="http://schemas.microsoft.com/office/drawing/2014/main" id="{32F37C2A-14C0-09F5-9684-9109CC10B162}"/>
-              </a:ext>
-            </a:extLst>
-          </p:cNvPr>
-          <p:cNvSpPr txBox="1"/>
-          <p:nvPr/>
-        </p:nvSpPr>
-        <p:spPr>
-          <a:xfrm>
-            <a:off x="0" y="2646292"/>
-            <a:ext cx="6122062" cy="1107996"/>
-          </a:xfrm>
-          <a:prstGeom prst="rect">
-            <a:avLst/>
-          </a:prstGeom>
-          <a:noFill/>
-        </p:spPr>
-        <p:txBody>
-          <a:bodyPr wrap="square" rtlCol="0">
-            <a:spAutoFit/>
-          </a:bodyPr>
-          <a:lstStyle/>
-          <a:p>
-            <a:pPr marL="457200" lvl="1" indent="0">
-              <a:buNone/>
-            </a:pPr>
-            <a:r>
-              <a:rPr lang="en-US" altLang="zh-CN" sz="1600" dirty="0"/>
-              <a:t>1. Without full load, the callback chain period can basically maintain 1ms</a:t>
-            </a:r>
-          </a:p>
-          <a:p>
-            <a:pPr marL="457200" lvl="1" indent="0">
-              <a:buNone/>
-            </a:pPr>
-            <a:r>
-              <a:rPr lang="en-US" altLang="zh-CN" sz="1600" dirty="0"/>
-              <a:t> (timer configuration = 1ms</a:t>
-            </a:r>
-            <a:r>
-              <a:rPr lang="zh-CN" altLang="en-US" sz="1600" dirty="0"/>
-              <a:t>）</a:t>
-            </a:r>
-            <a:endParaRPr lang="en-US" altLang="zh-CN" sz="1600" dirty="0"/>
-          </a:p>
-          <a:p>
-            <a:endParaRPr lang="zh-CN" altLang="en-US" sz="1600" dirty="0"/>
-          </a:p>
-        </p:txBody>
-      </p:sp>
-    </p:spTree>
-  </p:cSld>
-  <p:clrMapOvr>
-    <a:masterClrMapping/>
-  </p:clrMapOvr>
-</p:sld>
-</file>
-
-<file path=ppt/slides/slide6.xml><?xml version="1.0" encoding="utf-8"?>
-<p:sld xmlns:a="http://schemas.openxmlformats.org/drawingml/2006/main" xmlns:r="http://schemas.openxmlformats.org/officeDocument/2006/relationships" xmlns:p="http://schemas.openxmlformats.org/presentationml/2006/main">
-  <p:cSld>
-    <p:spTree>
-      <p:nvGrpSpPr>
-        <p:cNvPr id="1" name=""/>
-        <p:cNvGrpSpPr/>
-        <p:nvPr/>
-      </p:nvGrpSpPr>
-      <p:grpSpPr>
-        <a:xfrm>
-          <a:off x="0" y="0"/>
-          <a:ext cx="0" cy="0"/>
-          <a:chOff x="0" y="0"/>
-          <a:chExt cx="0" cy="0"/>
-        </a:xfrm>
-      </p:grpSpPr>
-      <p:sp>
-        <p:nvSpPr>
-          <p:cNvPr id="2" name="标题 1"/>
-          <p:cNvSpPr>
-            <a:spLocks noGrp="1"/>
-          </p:cNvSpPr>
-          <p:nvPr>
-            <p:ph type="title"/>
-          </p:nvPr>
-        </p:nvSpPr>
-        <p:spPr>
-          <a:xfrm>
-            <a:off x="0" y="-48"/>
-            <a:ext cx="10515600" cy="575652"/>
-          </a:xfrm>
-        </p:spPr>
-        <p:txBody>
-          <a:bodyPr>
-            <a:normAutofit fontScale="90000"/>
-          </a:bodyPr>
-          <a:lstStyle/>
-          <a:p>
-            <a:r>
-              <a:rPr lang="en-US" altLang="zh-CN" dirty="0"/>
-              <a:t>Kernel+ros2</a:t>
-            </a:r>
-            <a:endParaRPr lang="zh-CN" altLang="en-US" dirty="0"/>
-          </a:p>
-        </p:txBody>
-      </p:sp>
-      <p:sp>
-        <p:nvSpPr>
-          <p:cNvPr id="3" name="内容占位符 2"/>
-          <p:cNvSpPr>
-            <a:spLocks noGrp="1"/>
-          </p:cNvSpPr>
-          <p:nvPr>
-            <p:ph idx="1"/>
-          </p:nvPr>
-        </p:nvSpPr>
-        <p:spPr>
-          <a:xfrm>
-            <a:off x="0" y="575066"/>
-            <a:ext cx="6194612" cy="5753344"/>
-          </a:xfrm>
-        </p:spPr>
-        <p:txBody>
-          <a:bodyPr>
-            <a:normAutofit/>
-          </a:bodyPr>
-          <a:lstStyle/>
-          <a:p>
-            <a:r>
-              <a:rPr lang="en-US" altLang="zh-CN" sz="1600" dirty="0"/>
-              <a:t>3.Modify the period to 50ms. Then the load is full and the number of delays in the period become high.</a:t>
-            </a:r>
-          </a:p>
-          <a:p>
-            <a:r>
-              <a:rPr lang="fr-FR" altLang="zh-CN" sz="1600" dirty="0"/>
-              <a:t>sudo chrt -d -p  -T 10000000 -D 50000000 -P 50000000 0 </a:t>
-            </a:r>
-            <a:endParaRPr lang="en-US" altLang="zh-CN" sz="1600" dirty="0"/>
-          </a:p>
-        </p:txBody>
-      </p:sp>
-      <p:pic>
-        <p:nvPicPr>
-          <p:cNvPr id="5" name="图片 4">
-            <a:extLst>
-              <a:ext uri="{FF2B5EF4-FFF2-40B4-BE49-F238E27FC236}">
-                <a16:creationId xmlns:a16="http://schemas.microsoft.com/office/drawing/2014/main" id="{516CEF55-722B-E3EC-10DA-D84FB81386A0}"/>
-              </a:ext>
-            </a:extLst>
-          </p:cNvPr>
-          <p:cNvPicPr>
-            <a:picLocks noChangeAspect="1"/>
-          </p:cNvPicPr>
-          <p:nvPr/>
-        </p:nvPicPr>
-        <p:blipFill>
-          <a:blip r:embed="rId3" cstate="print">
-            <a:extLst>
-              <a:ext uri="{28A0092B-C50C-407E-A947-70E740481C1C}">
-                <a14:useLocalDpi xmlns:a14="http://schemas.microsoft.com/office/drawing/2010/main" val="0"/>
-              </a:ext>
-            </a:extLst>
-          </a:blip>
-          <a:stretch>
-            <a:fillRect/>
-          </a:stretch>
-        </p:blipFill>
-        <p:spPr>
-          <a:xfrm>
-            <a:off x="401947" y="1846729"/>
-            <a:ext cx="5694053" cy="2827637"/>
-          </a:xfrm>
-          <a:prstGeom prst="rect">
-            <a:avLst/>
-          </a:prstGeom>
-        </p:spPr>
-      </p:pic>
-      <p:sp>
-        <p:nvSpPr>
-          <p:cNvPr id="6" name="内容占位符 2">
-            <a:extLst>
-              <a:ext uri="{FF2B5EF4-FFF2-40B4-BE49-F238E27FC236}">
-                <a16:creationId xmlns:a16="http://schemas.microsoft.com/office/drawing/2014/main" id="{7D1600AE-104B-9843-1689-6EBB67D7570D}"/>
-              </a:ext>
-            </a:extLst>
-          </p:cNvPr>
-          <p:cNvSpPr txBox="1">
-            <a:spLocks/>
-          </p:cNvSpPr>
-          <p:nvPr/>
-        </p:nvSpPr>
-        <p:spPr>
-          <a:xfrm>
-            <a:off x="6096000" y="529590"/>
-            <a:ext cx="6194612" cy="5753344"/>
-          </a:xfrm>
-          <a:prstGeom prst="rect">
-            <a:avLst/>
-          </a:prstGeom>
-        </p:spPr>
-        <p:txBody>
-          <a:bodyPr vert="horz" lIns="91440" tIns="45720" rIns="91440" bIns="45720" rtlCol="0">
-            <a:normAutofit/>
-          </a:bodyPr>
-          <a:lstStyle>
-            <a:lvl1pPr marL="228600" indent="-228600" algn="l" defTabSz="914400" rtl="0" eaLnBrk="1" latinLnBrk="0" hangingPunct="1">
-              <a:lnSpc>
-                <a:spcPct val="90000"/>
-              </a:lnSpc>
-              <a:spcBef>
-                <a:spcPts val="1000"/>
-              </a:spcBef>
-              <a:buFont typeface="Arial" panose="020B0604020202090204" pitchFamily="34" charset="0"/>
-              <a:buChar char="•"/>
-              <a:defRPr sz="2800" kern="1200">
-                <a:solidFill>
-                  <a:schemeClr val="tx1"/>
-                </a:solidFill>
-                <a:latin typeface="+mn-lt"/>
-                <a:ea typeface="+mn-ea"/>
-                <a:cs typeface="+mn-cs"/>
-              </a:defRPr>
-            </a:lvl1pPr>
-            <a:lvl2pPr marL="685800" indent="-228600" algn="l" defTabSz="914400" rtl="0" eaLnBrk="1" latinLnBrk="0" hangingPunct="1">
-              <a:lnSpc>
-                <a:spcPct val="90000"/>
-              </a:lnSpc>
-              <a:spcBef>
-                <a:spcPts val="500"/>
-              </a:spcBef>
-              <a:buFont typeface="Arial" panose="020B0604020202090204" pitchFamily="34" charset="0"/>
-              <a:buChar char="•"/>
-              <a:defRPr sz="2400" kern="1200">
-                <a:solidFill>
-                  <a:schemeClr val="tx1"/>
-                </a:solidFill>
-                <a:latin typeface="+mn-lt"/>
-                <a:ea typeface="+mn-ea"/>
-                <a:cs typeface="+mn-cs"/>
-              </a:defRPr>
-            </a:lvl2pPr>
-            <a:lvl3pPr marL="1143000" indent="-228600" algn="l" defTabSz="914400" rtl="0" eaLnBrk="1" latinLnBrk="0" hangingPunct="1">
-              <a:lnSpc>
-                <a:spcPct val="90000"/>
-              </a:lnSpc>
-              <a:spcBef>
-                <a:spcPts val="500"/>
-              </a:spcBef>
-              <a:buFont typeface="Arial" panose="020B0604020202090204" pitchFamily="34" charset="0"/>
-              <a:buChar char="•"/>
-              <a:defRPr sz="2000" kern="1200">
-                <a:solidFill>
-                  <a:schemeClr val="tx1"/>
-                </a:solidFill>
-                <a:latin typeface="+mn-lt"/>
-                <a:ea typeface="+mn-ea"/>
-                <a:cs typeface="+mn-cs"/>
-              </a:defRPr>
-            </a:lvl3pPr>
-            <a:lvl4pPr marL="1600200" indent="-228600" algn="l" defTabSz="914400" rtl="0" eaLnBrk="1" latinLnBrk="0" hangingPunct="1">
-              <a:lnSpc>
-                <a:spcPct val="90000"/>
-              </a:lnSpc>
-              <a:spcBef>
-                <a:spcPts val="500"/>
-              </a:spcBef>
-              <a:buFont typeface="Arial" panose="020B0604020202090204" pitchFamily="34" charset="0"/>
-              <a:buChar char="•"/>
-              <a:defRPr sz="1800" kern="1200">
-                <a:solidFill>
-                  <a:schemeClr val="tx1"/>
-                </a:solidFill>
-                <a:latin typeface="+mn-lt"/>
-                <a:ea typeface="+mn-ea"/>
-                <a:cs typeface="+mn-cs"/>
-              </a:defRPr>
-            </a:lvl4pPr>
-            <a:lvl5pPr marL="2057400" indent="-228600" algn="l" defTabSz="914400" rtl="0" eaLnBrk="1" latinLnBrk="0" hangingPunct="1">
-              <a:lnSpc>
-                <a:spcPct val="90000"/>
-              </a:lnSpc>
-              <a:spcBef>
-                <a:spcPts val="500"/>
-              </a:spcBef>
-              <a:buFont typeface="Arial" panose="020B0604020202090204" pitchFamily="34" charset="0"/>
-              <a:buChar char="•"/>
-              <a:defRPr sz="1800" kern="1200">
-                <a:solidFill>
-                  <a:schemeClr val="tx1"/>
-                </a:solidFill>
-                <a:latin typeface="+mn-lt"/>
-                <a:ea typeface="+mn-ea"/>
-                <a:cs typeface="+mn-cs"/>
-              </a:defRPr>
-            </a:lvl5pPr>
-            <a:lvl6pPr marL="2514600" indent="-228600" algn="l" defTabSz="914400" rtl="0" eaLnBrk="1" latinLnBrk="0" hangingPunct="1">
-              <a:lnSpc>
-                <a:spcPct val="90000"/>
-              </a:lnSpc>
-              <a:spcBef>
-                <a:spcPts val="500"/>
-              </a:spcBef>
-              <a:buFont typeface="Arial" panose="020B0604020202090204" pitchFamily="34" charset="0"/>
-              <a:buChar char="•"/>
-              <a:defRPr sz="1800" kern="1200">
-                <a:solidFill>
-                  <a:schemeClr val="tx1"/>
-                </a:solidFill>
-                <a:latin typeface="+mn-lt"/>
-                <a:ea typeface="+mn-ea"/>
-                <a:cs typeface="+mn-cs"/>
-              </a:defRPr>
-            </a:lvl6pPr>
-            <a:lvl7pPr marL="2971800" indent="-228600" algn="l" defTabSz="914400" rtl="0" eaLnBrk="1" latinLnBrk="0" hangingPunct="1">
-              <a:lnSpc>
-                <a:spcPct val="90000"/>
-              </a:lnSpc>
-              <a:spcBef>
-                <a:spcPts val="500"/>
-              </a:spcBef>
-              <a:buFont typeface="Arial" panose="020B0604020202090204" pitchFamily="34" charset="0"/>
-              <a:buChar char="•"/>
-              <a:defRPr sz="1800" kern="1200">
-                <a:solidFill>
-                  <a:schemeClr val="tx1"/>
-                </a:solidFill>
-                <a:latin typeface="+mn-lt"/>
-                <a:ea typeface="+mn-ea"/>
-                <a:cs typeface="+mn-cs"/>
-              </a:defRPr>
-            </a:lvl7pPr>
-            <a:lvl8pPr marL="3429000" indent="-228600" algn="l" defTabSz="914400" rtl="0" eaLnBrk="1" latinLnBrk="0" hangingPunct="1">
-              <a:lnSpc>
-                <a:spcPct val="90000"/>
-              </a:lnSpc>
-              <a:spcBef>
-                <a:spcPts val="500"/>
-              </a:spcBef>
-              <a:buFont typeface="Arial" panose="020B0604020202090204" pitchFamily="34" charset="0"/>
-              <a:buChar char="•"/>
-              <a:defRPr sz="1800" kern="1200">
-                <a:solidFill>
-                  <a:schemeClr val="tx1"/>
-                </a:solidFill>
-                <a:latin typeface="+mn-lt"/>
-                <a:ea typeface="+mn-ea"/>
-                <a:cs typeface="+mn-cs"/>
-              </a:defRPr>
-            </a:lvl8pPr>
-            <a:lvl9pPr marL="3886200" indent="-228600" algn="l" defTabSz="914400" rtl="0" eaLnBrk="1" latinLnBrk="0" hangingPunct="1">
-              <a:lnSpc>
-                <a:spcPct val="90000"/>
-              </a:lnSpc>
-              <a:spcBef>
-                <a:spcPts val="500"/>
-              </a:spcBef>
-              <a:buFont typeface="Arial" panose="020B0604020202090204" pitchFamily="34" charset="0"/>
-              <a:buChar char="•"/>
-              <a:defRPr sz="1800" kern="1200">
-                <a:solidFill>
-                  <a:schemeClr val="tx1"/>
-                </a:solidFill>
-                <a:latin typeface="+mn-lt"/>
-                <a:ea typeface="+mn-ea"/>
-                <a:cs typeface="+mn-cs"/>
-              </a:defRPr>
-            </a:lvl9pPr>
-          </a:lstStyle>
-          <a:p>
-            <a:r>
-              <a:rPr lang="en-US" altLang="zh-CN" sz="1600" dirty="0"/>
-              <a:t>4.When the load is not full, modify the priority and period, and keep the period basically at 50ms</a:t>
-            </a:r>
-          </a:p>
-        </p:txBody>
-      </p:sp>
-      <p:pic>
-        <p:nvPicPr>
-          <p:cNvPr id="8" name="图片 7">
-            <a:extLst>
-              <a:ext uri="{FF2B5EF4-FFF2-40B4-BE49-F238E27FC236}">
-                <a16:creationId xmlns:a16="http://schemas.microsoft.com/office/drawing/2014/main" id="{B19FE92D-FC74-9D33-BD09-11F424CEACDE}"/>
-              </a:ext>
-            </a:extLst>
-          </p:cNvPr>
-          <p:cNvPicPr>
-            <a:picLocks noChangeAspect="1"/>
-          </p:cNvPicPr>
-          <p:nvPr/>
-        </p:nvPicPr>
-        <p:blipFill>
-          <a:blip r:embed="rId4">
-            <a:extLst>
-              <a:ext uri="{28A0092B-C50C-407E-A947-70E740481C1C}">
-                <a14:useLocalDpi xmlns:a14="http://schemas.microsoft.com/office/drawing/2010/main" val="0"/>
-              </a:ext>
-            </a:extLst>
-          </a:blip>
-          <a:stretch>
-            <a:fillRect/>
-          </a:stretch>
-        </p:blipFill>
-        <p:spPr>
-          <a:xfrm>
-            <a:off x="6497947" y="1760429"/>
-            <a:ext cx="5477372" cy="3291665"/>
-          </a:xfrm>
-          <a:prstGeom prst="rect">
-            <a:avLst/>
-          </a:prstGeom>
-        </p:spPr>
-      </p:pic>
-      <p:sp>
-        <p:nvSpPr>
-          <p:cNvPr id="9" name="文本框 8">
-            <a:extLst>
-              <a:ext uri="{FF2B5EF4-FFF2-40B4-BE49-F238E27FC236}">
-                <a16:creationId xmlns:a16="http://schemas.microsoft.com/office/drawing/2014/main" id="{DC1F06B3-0D45-8827-5585-F73DDF821E60}"/>
-              </a:ext>
-            </a:extLst>
-          </p:cNvPr>
-          <p:cNvSpPr txBox="1"/>
-          <p:nvPr/>
-        </p:nvSpPr>
-        <p:spPr>
-          <a:xfrm>
-            <a:off x="614170" y="5268382"/>
-            <a:ext cx="8973670" cy="1354217"/>
-          </a:xfrm>
-          <a:prstGeom prst="rect">
-            <a:avLst/>
-          </a:prstGeom>
-          <a:noFill/>
-        </p:spPr>
-        <p:txBody>
-          <a:bodyPr wrap="square" rtlCol="0">
-            <a:spAutoFit/>
-          </a:bodyPr>
-          <a:lstStyle/>
-          <a:p>
-            <a:r>
-              <a:rPr lang="en-US" altLang="zh-CN" sz="1600" dirty="0">
-                <a:solidFill>
-                  <a:srgbClr val="FF0000"/>
-                </a:solidFill>
-              </a:rPr>
-              <a:t>Under the non-real-time kernel, the DEADLINE policy priority is only 0, and only the period, execution time, and deadline can be modified.</a:t>
-            </a:r>
-          </a:p>
-          <a:p>
-            <a:endParaRPr lang="en-US" altLang="zh-CN" sz="1600" dirty="0">
-              <a:solidFill>
-                <a:srgbClr val="FF0000"/>
-              </a:solidFill>
-            </a:endParaRPr>
-          </a:p>
-          <a:p>
-            <a:r>
-              <a:rPr lang="en-US" altLang="zh-CN" sz="1600" dirty="0">
-                <a:solidFill>
-                  <a:srgbClr val="FF0000"/>
-                </a:solidFill>
-              </a:rPr>
-              <a:t>There are related work tests, and the </a:t>
-            </a:r>
-            <a:r>
-              <a:rPr lang="en-US" altLang="zh-CN" sz="1600" dirty="0" err="1">
-                <a:solidFill>
-                  <a:srgbClr val="FF0000"/>
-                </a:solidFill>
-              </a:rPr>
-              <a:t>preempt_RT</a:t>
-            </a:r>
-            <a:r>
-              <a:rPr lang="en-US" altLang="zh-CN" sz="1600" dirty="0">
-                <a:solidFill>
-                  <a:srgbClr val="FF0000"/>
-                </a:solidFill>
-              </a:rPr>
-              <a:t> patch has a significant effect on reducing delays.</a:t>
-            </a:r>
-          </a:p>
-          <a:p>
-            <a:r>
-              <a:rPr lang="zh-CN" altLang="en-US" sz="1600" dirty="0">
-                <a:solidFill>
-                  <a:srgbClr val="FF0000"/>
-                </a:solidFill>
-              </a:rPr>
-              <a:t>“</a:t>
-            </a:r>
-            <a:r>
-              <a:rPr lang="en-US" altLang="zh-CN" sz="1600" dirty="0">
-                <a:solidFill>
-                  <a:srgbClr val="FF0000"/>
-                </a:solidFill>
-              </a:rPr>
-              <a:t>ROS2 Real-time Performance Optimization and Evaluation</a:t>
-            </a:r>
-            <a:r>
-              <a:rPr lang="zh-CN" altLang="en-US" sz="1600" dirty="0">
-                <a:solidFill>
-                  <a:srgbClr val="FF0000"/>
-                </a:solidFill>
-              </a:rPr>
-              <a:t>”</a:t>
-            </a:r>
-          </a:p>
-        </p:txBody>
-      </p:sp>
     </p:spTree>
   </p:cSld>
   <p:clrMapOvr>
@@ -8324,7 +7128,19 @@
 </file>
 
 <file path=ppt/tags/tag1.xml><?xml version="1.0" encoding="utf-8"?>
-<p:tagLst xmlns:a="http://schemas.openxmlformats.org/drawingml/2006/main" xmlns:r="http://schemas.openxmlformats.org/officeDocument/2006/relationships" xmlns:p="http://schemas.openxmlformats.org/presentationml/2006/main">
+<p:tagLst xmlns:p="http://schemas.openxmlformats.org/presentationml/2006/main">
+  <p:tag name="KSO_WM_BEAUTIFY_FLAG" val=""/>
+</p:tagLst>
+</file>
+
+<file path=ppt/tags/tag2.xml><?xml version="1.0" encoding="utf-8"?>
+<p:tagLst xmlns:p="http://schemas.openxmlformats.org/presentationml/2006/main">
+  <p:tag name="KSO_WM_BEAUTIFY_FLAG" val=""/>
+</p:tagLst>
+</file>
+
+<file path=ppt/tags/tag3.xml><?xml version="1.0" encoding="utf-8"?>
+<p:tagLst xmlns:p="http://schemas.openxmlformats.org/presentationml/2006/main">
   <p:tag name="KSO_WM_BEAUTIFY_FLAG" val=""/>
 </p:tagLst>
 </file>
@@ -8580,8 +7396,6 @@
       </a:bgFillStyleLst>
     </a:fmtScheme>
   </a:themeElements>
-  <a:objectDefaults/>
-  <a:extraClrSchemeLst/>
   <a:extLst>
     <a:ext uri="{05A4C25C-085E-4340-85A3-A5531E510DB2}">
       <thm15:themeFamily xmlns:thm15="http://schemas.microsoft.com/office/thememl/2012/main" name="Office Theme" id="{62F939B6-93AF-4DB8-9C6B-D6C7DFDC589F}" vid="{4A3C46E8-61CC-4603-A589-7422A47A8E4A}"/>
@@ -8841,8 +7655,6 @@
       </a:bgFillStyleLst>
     </a:fmtScheme>
   </a:themeElements>
-  <a:objectDefaults/>
-  <a:extraClrSchemeLst/>
   <a:extLst>
     <a:ext uri="{05A4C25C-085E-4340-85A3-A5531E510DB2}">
       <thm15:themeFamily xmlns:thm15="http://schemas.microsoft.com/office/thememl/2012/main" name="Office Theme" id="{62F939B6-93AF-4DB8-9C6B-D6C7DFDC589F}" vid="{4A3C46E8-61CC-4603-A589-7422A47A8E4A}"/>
@@ -8894,7 +7706,7 @@
     </a:clrScheme>
     <a:fontScheme name="Office">
       <a:majorFont>
-        <a:latin typeface="等线 Light" panose="020F0302020204030204"/>
+        <a:latin typeface="等线 Light"/>
         <a:ea typeface=""/>
         <a:cs typeface=""/>
         <a:font script="Jpan" typeface="游ゴシック Light"/>
@@ -8927,26 +7739,9 @@
         <a:font script="Viet" typeface="Times New Roman"/>
         <a:font script="Uigh" typeface="Microsoft Uighur"/>
         <a:font script="Geor" typeface="Sylfaen"/>
-        <a:font script="Armn" typeface="Arial"/>
-        <a:font script="Bugi" typeface="Leelawadee UI"/>
-        <a:font script="Bopo" typeface="Microsoft JhengHei"/>
-        <a:font script="Java" typeface="Javanese Text"/>
-        <a:font script="Lisu" typeface="Segoe UI"/>
-        <a:font script="Mymr" typeface="Myanmar Text"/>
-        <a:font script="Nkoo" typeface="Ebrima"/>
-        <a:font script="Olck" typeface="Nirmala UI"/>
-        <a:font script="Osma" typeface="Ebrima"/>
-        <a:font script="Phag" typeface="Phagspa"/>
-        <a:font script="Syrn" typeface="Estrangelo Edessa"/>
-        <a:font script="Syrj" typeface="Estrangelo Edessa"/>
-        <a:font script="Syre" typeface="Estrangelo Edessa"/>
-        <a:font script="Sora" typeface="Nirmala UI"/>
-        <a:font script="Tale" typeface="Microsoft Tai Le"/>
-        <a:font script="Talu" typeface="Microsoft New Tai Lue"/>
-        <a:font script="Tfng" typeface="Ebrima"/>
       </a:majorFont>
       <a:minorFont>
-        <a:latin typeface="等线" panose="020F0502020204030204"/>
+        <a:latin typeface="等线"/>
         <a:ea typeface=""/>
         <a:cs typeface=""/>
         <a:font script="Jpan" typeface="游ゴシック"/>
@@ -8979,23 +7774,6 @@
         <a:font script="Viet" typeface="Arial"/>
         <a:font script="Uigh" typeface="Microsoft Uighur"/>
         <a:font script="Geor" typeface="Sylfaen"/>
-        <a:font script="Armn" typeface="Arial"/>
-        <a:font script="Bugi" typeface="Leelawadee UI"/>
-        <a:font script="Bopo" typeface="Microsoft JhengHei"/>
-        <a:font script="Java" typeface="Javanese Text"/>
-        <a:font script="Lisu" typeface="Segoe UI"/>
-        <a:font script="Mymr" typeface="Myanmar Text"/>
-        <a:font script="Nkoo" typeface="Ebrima"/>
-        <a:font script="Olck" typeface="Nirmala UI"/>
-        <a:font script="Osma" typeface="Ebrima"/>
-        <a:font script="Phag" typeface="Phagspa"/>
-        <a:font script="Syrn" typeface="Estrangelo Edessa"/>
-        <a:font script="Syrj" typeface="Estrangelo Edessa"/>
-        <a:font script="Syre" typeface="Estrangelo Edessa"/>
-        <a:font script="Sora" typeface="Nirmala UI"/>
-        <a:font script="Tale" typeface="Microsoft Tai Le"/>
-        <a:font script="Talu" typeface="Microsoft New Tai Lue"/>
-        <a:font script="Tfng" typeface="Ebrima"/>
       </a:minorFont>
     </a:fontScheme>
     <a:fmtScheme name="Office">
@@ -9136,8 +7914,6 @@
       </a:bgFillStyleLst>
     </a:fmtScheme>
   </a:themeElements>
-  <a:objectDefaults/>
-  <a:extraClrSchemeLst/>
   <a:extLst>
     <a:ext uri="{05A4C25C-085E-4340-85A3-A5531E510DB2}">
       <thm15:themeFamily xmlns:thm15="http://schemas.microsoft.com/office/thememl/2012/main" name="Office Theme" id="{62F939B6-93AF-4DB8-9C6B-D6C7DFDC589F}" vid="{4A3C46E8-61CC-4603-A589-7422A47A8E4A}"/>

</xml_diff>

<commit_message>
vault backup: 2024-07-18 16:00:58
</commit_message>
<xml_diff>
--- a/06-ppt/discussion/0719.pptx
+++ b/06-ppt/discussion/0719.pptx
@@ -12,17 +12,11 @@
     <p:sldId id="256" r:id="rId4"/>
     <p:sldId id="264" r:id="rId5"/>
     <p:sldId id="270" r:id="rId7"/>
-    <p:sldId id="271" r:id="rId8"/>
-    <p:sldId id="269" r:id="rId9"/>
+    <p:sldId id="269" r:id="rId8"/>
+    <p:sldId id="271" r:id="rId9"/>
   </p:sldIdLst>
   <p:sldSz cx="12192000" cy="6858000"/>
   <p:notesSz cx="6858000" cy="9144000"/>
-  <p:embeddedFontLst>
-    <p:embeddedFont>
-      <p:font typeface="等线" charset="0"/>
-      <p:regular r:id="rId13"/>
-    </p:embeddedFont>
-  </p:embeddedFontLst>
   <p:defaultTextStyle>
     <a:defPPr>
       <a:defRPr lang="zh-CN"/>
@@ -6769,8 +6763,8 @@
         </p:nvSpPr>
         <p:spPr>
           <a:xfrm>
-            <a:off x="0" y="575652"/>
-            <a:ext cx="6611815" cy="5753344"/>
+            <a:off x="0" y="575945"/>
+            <a:ext cx="11877675" cy="5753100"/>
           </a:xfrm>
         </p:spPr>
         <p:txBody>
@@ -6780,20 +6774,87 @@
           <a:lstStyle/>
           <a:p>
             <a:r>
+              <a:rPr lang="zh-CN" altLang="en-US" sz="2000" dirty="0"/>
+              <a:t>修改调度策略为</a:t>
+            </a:r>
+            <a:r>
               <a:rPr lang="en-US" altLang="zh-CN" sz="2000" dirty="0"/>
-              <a:t>fifo</a:t>
-            </a:r>
+              <a:t>FIFO</a:t>
+            </a:r>
+            <a:r>
+              <a:rPr lang="zh-CN" altLang="en-US" sz="2000" dirty="0"/>
+              <a:t>，优先级为</a:t>
+            </a:r>
+            <a:r>
+              <a:rPr lang="en-US" altLang="zh-CN" sz="2000" dirty="0"/>
+              <a:t>9</a:t>
+            </a:r>
+            <a:endParaRPr lang="en-US" altLang="zh-CN" sz="2000" dirty="0"/>
+          </a:p>
+          <a:p>
             <a:r>
               <a:rPr lang="zh-CN" altLang="en-US" sz="2000" dirty="0">
                 <a:ea typeface="宋体" charset="0"/>
               </a:rPr>
-              <a:t>，满负载，改一次</a:t>
-            </a:r>
+              <a:t>始终满负载的情况下，</a:t>
+            </a:r>
+            <a:endParaRPr lang="zh-CN" altLang="en-US" sz="2000" dirty="0">
+              <a:ea typeface="宋体" charset="0"/>
+            </a:endParaRPr>
+          </a:p>
+          <a:p>
             <a:r>
               <a:rPr lang="zh-CN" altLang="en-US" sz="2000" dirty="0">
                 <a:ea typeface="宋体" charset="0"/>
               </a:rPr>
-              <a:t>优先级</a:t>
+              <a:t>默认调度策略：</a:t>
+            </a:r>
+            <a:r>
+              <a:rPr lang="en-US" altLang="zh-CN" sz="2000" dirty="0">
+                <a:ea typeface="宋体" charset="0"/>
+              </a:rPr>
+              <a:t>ROS2</a:t>
+            </a:r>
+            <a:r>
+              <a:rPr lang="zh-CN" altLang="en-US" sz="2000" dirty="0">
+                <a:ea typeface="宋体" charset="0"/>
+              </a:rPr>
+              <a:t>程序会被干扰，出现较多延迟的现象。</a:t>
+            </a:r>
+            <a:endParaRPr lang="zh-CN" altLang="en-US" sz="2000" dirty="0">
+              <a:ea typeface="宋体" charset="0"/>
+            </a:endParaRPr>
+          </a:p>
+          <a:p>
+            <a:r>
+              <a:rPr lang="en-US" altLang="zh-CN" sz="2000" dirty="0">
+                <a:ea typeface="宋体" charset="0"/>
+              </a:rPr>
+              <a:t>FIFO</a:t>
+            </a:r>
+            <a:r>
+              <a:rPr lang="zh-CN" altLang="en-US" sz="2000" dirty="0">
+                <a:ea typeface="宋体" charset="0"/>
+              </a:rPr>
+              <a:t>调度策略：</a:t>
+            </a:r>
+            <a:r>
+              <a:rPr lang="en-US" altLang="zh-CN" sz="2000" dirty="0">
+                <a:ea typeface="宋体" charset="0"/>
+              </a:rPr>
+              <a:t>ROS2</a:t>
+            </a:r>
+            <a:r>
+              <a:rPr lang="zh-CN" altLang="en-US" sz="2000" dirty="0">
+                <a:ea typeface="宋体" charset="0"/>
+              </a:rPr>
+              <a:t>程序延迟明显</a:t>
+            </a:r>
+            <a:r>
+              <a:rPr lang="zh-CN" altLang="en-US" sz="2000" dirty="0">
+                <a:ea typeface="宋体" charset="0"/>
+              </a:rPr>
+              <a:t>减少</a:t>
             </a:r>
             <a:endParaRPr lang="zh-CN" altLang="en-US" sz="2000" dirty="0">
               <a:ea typeface="宋体" charset="0"/>
@@ -6821,8 +6882,8 @@
         </p:blipFill>
         <p:spPr>
           <a:xfrm>
-            <a:off x="1344295" y="1183005"/>
-            <a:ext cx="8682355" cy="4958715"/>
+            <a:off x="1434465" y="2248535"/>
+            <a:ext cx="7258050" cy="4145280"/>
           </a:xfrm>
           <a:prstGeom prst="rect">
             <a:avLst/>
@@ -6914,8 +6975,8 @@
         </p:nvSpPr>
         <p:spPr>
           <a:xfrm>
-            <a:off x="0" y="575652"/>
-            <a:ext cx="6611815" cy="5753344"/>
+            <a:off x="0" y="575945"/>
+            <a:ext cx="11858625" cy="5753100"/>
           </a:xfrm>
         </p:spPr>
         <p:txBody>
@@ -6925,20 +6986,85 @@
           <a:lstStyle/>
           <a:p>
             <a:r>
-              <a:rPr lang="en-US" altLang="zh-CN" sz="2000" dirty="0"/>
-              <a:t>ddl</a:t>
-            </a:r>
+              <a:rPr lang="zh-CN" altLang="en-US" sz="2000" dirty="0">
+                <a:sym typeface="+mn-ea"/>
+              </a:rPr>
+              <a:t>修改调度策略为</a:t>
+            </a:r>
+            <a:r>
+              <a:rPr lang="en-US" altLang="zh-CN" sz="2000" dirty="0">
+                <a:sym typeface="+mn-ea"/>
+              </a:rPr>
+              <a:t>FIFO</a:t>
+            </a:r>
+            <a:r>
+              <a:rPr lang="zh-CN" altLang="en-US" sz="2000" dirty="0">
+                <a:sym typeface="+mn-ea"/>
+              </a:rPr>
+              <a:t>，优先级为</a:t>
+            </a:r>
+            <a:r>
+              <a:rPr lang="en-US" altLang="zh-CN" sz="2000" dirty="0">
+                <a:sym typeface="+mn-ea"/>
+              </a:rPr>
+              <a:t>9</a:t>
+            </a:r>
+            <a:r>
+              <a:rPr lang="zh-CN" altLang="en-US" sz="2000" dirty="0">
+                <a:sym typeface="+mn-ea"/>
+              </a:rPr>
+              <a:t>和</a:t>
+            </a:r>
+            <a:r>
+              <a:rPr lang="en-US" altLang="zh-CN" sz="2000" dirty="0">
+                <a:sym typeface="+mn-ea"/>
+              </a:rPr>
+              <a:t>89</a:t>
+            </a:r>
+            <a:endParaRPr lang="en-US" altLang="zh-CN" sz="2000" dirty="0"/>
+          </a:p>
+          <a:p>
+            <a:r>
+              <a:rPr lang="zh-CN" altLang="en-US" sz="2000" dirty="0">
+                <a:ea typeface="宋体" charset="0"/>
+                <a:sym typeface="+mn-ea"/>
+              </a:rPr>
+              <a:t>始终满负载的情况下，</a:t>
+            </a:r>
+            <a:endParaRPr lang="zh-CN" altLang="en-US" sz="2000" dirty="0">
+              <a:ea typeface="宋体" charset="0"/>
+            </a:endParaRPr>
+          </a:p>
+          <a:p>
             <a:r>
               <a:rPr lang="zh-CN" altLang="en-US" sz="2000" dirty="0">
                 <a:ea typeface="宋体" charset="0"/>
               </a:rPr>
-              <a:t>，满负载，改一次</a:t>
+              <a:t>优先级的改变对</a:t>
+            </a:r>
+            <a:r>
+              <a:rPr lang="en-US" altLang="zh-CN" sz="2000" dirty="0">
+                <a:ea typeface="宋体" charset="0"/>
+              </a:rPr>
+              <a:t>ROS2</a:t>
             </a:r>
             <a:r>
               <a:rPr lang="zh-CN" altLang="en-US" sz="2000" dirty="0">
                 <a:ea typeface="宋体" charset="0"/>
               </a:rPr>
-              <a:t>优先级</a:t>
+              <a:t>程序的运行（例如</a:t>
+            </a:r>
+            <a:r>
+              <a:rPr lang="zh-CN" altLang="en-US" sz="2000" dirty="0">
+                <a:ea typeface="宋体" charset="0"/>
+              </a:rPr>
+              <a:t>延迟）并没有产生明显的</a:t>
+            </a:r>
+            <a:r>
+              <a:rPr lang="zh-CN" altLang="en-US" sz="2000" dirty="0">
+                <a:ea typeface="宋体" charset="0"/>
+              </a:rPr>
+              <a:t>影响</a:t>
             </a:r>
             <a:endParaRPr lang="zh-CN" altLang="en-US" sz="2000" dirty="0">
               <a:ea typeface="宋体" charset="0"/>
@@ -6948,7 +7074,7 @@
       </p:sp>
       <p:pic>
         <p:nvPicPr>
-          <p:cNvPr id="5" name="图片 4"/>
+          <p:cNvPr id="6" name="图片 5"/>
           <p:cNvPicPr>
             <a:picLocks noChangeAspect="1"/>
           </p:cNvPicPr>
@@ -6966,8 +7092,8 @@
         </p:blipFill>
         <p:spPr>
           <a:xfrm>
-            <a:off x="393700" y="1546860"/>
-            <a:ext cx="9917430" cy="4428490"/>
+            <a:off x="1907540" y="2125980"/>
+            <a:ext cx="8433435" cy="4624070"/>
           </a:xfrm>
           <a:prstGeom prst="rect">
             <a:avLst/>
@@ -7059,8 +7185,8 @@
         </p:nvSpPr>
         <p:spPr>
           <a:xfrm>
-            <a:off x="0" y="575652"/>
-            <a:ext cx="6611815" cy="5753344"/>
+            <a:off x="0" y="575945"/>
+            <a:ext cx="11958955" cy="5753100"/>
           </a:xfrm>
         </p:spPr>
         <p:txBody>
@@ -7070,20 +7196,62 @@
           <a:lstStyle/>
           <a:p>
             <a:r>
-              <a:rPr lang="en-US" altLang="zh-CN" sz="2000" dirty="0"/>
-              <a:t>fifo</a:t>
+              <a:rPr lang="zh-CN" altLang="en-US" sz="2000" dirty="0">
+                <a:sym typeface="+mn-ea"/>
+              </a:rPr>
+              <a:t>修改调度策略为</a:t>
+            </a:r>
+            <a:r>
+              <a:rPr lang="en-US" altLang="zh-CN" sz="2000" dirty="0">
+                <a:sym typeface="+mn-ea"/>
+              </a:rPr>
+              <a:t>DDL</a:t>
+            </a:r>
+            <a:endParaRPr lang="en-US" altLang="zh-CN" sz="2000" dirty="0"/>
+          </a:p>
+          <a:p>
+            <a:r>
+              <a:rPr lang="zh-CN" altLang="en-US" sz="2000" dirty="0">
+                <a:ea typeface="宋体" charset="0"/>
+                <a:sym typeface="+mn-ea"/>
+              </a:rPr>
+              <a:t>始终满负载的情况下，</a:t>
+            </a:r>
+            <a:endParaRPr lang="zh-CN" altLang="en-US" sz="2000" dirty="0">
+              <a:ea typeface="宋体" charset="0"/>
+              <a:sym typeface="+mn-ea"/>
+            </a:endParaRPr>
+          </a:p>
+          <a:p>
+            <a:r>
+              <a:rPr lang="en-US" altLang="zh-CN" sz="2000" dirty="0">
+                <a:ea typeface="宋体" charset="0"/>
+              </a:rPr>
+              <a:t>ROS2</a:t>
             </a:r>
             <a:r>
               <a:rPr lang="zh-CN" altLang="en-US" sz="2000" dirty="0">
                 <a:ea typeface="宋体" charset="0"/>
               </a:rPr>
-              <a:t>，满负载，两种</a:t>
+              <a:t>程序在</a:t>
+            </a:r>
+            <a:r>
+              <a:rPr lang="en-US" altLang="zh-CN" sz="2000" dirty="0">
+                <a:ea typeface="宋体" charset="0"/>
+              </a:rPr>
+              <a:t>DDL</a:t>
             </a:r>
             <a:r>
               <a:rPr lang="zh-CN" altLang="en-US" sz="2000" dirty="0">
                 <a:ea typeface="宋体" charset="0"/>
               </a:rPr>
-              <a:t>优先级</a:t>
+              <a:t>调度策略下受到更少的</a:t>
+            </a:r>
+            <a:r>
+              <a:rPr lang="zh-CN" altLang="en-US" sz="2000" dirty="0">
+                <a:ea typeface="宋体" charset="0"/>
+              </a:rPr>
+              <a:t>干扰</a:t>
             </a:r>
             <a:endParaRPr lang="zh-CN" altLang="en-US" sz="2000" dirty="0">
               <a:ea typeface="宋体" charset="0"/>
@@ -7093,7 +7261,7 @@
       </p:sp>
       <p:pic>
         <p:nvPicPr>
-          <p:cNvPr id="6" name="图片 5"/>
+          <p:cNvPr id="5" name="图片 4"/>
           <p:cNvPicPr>
             <a:picLocks noChangeAspect="1"/>
           </p:cNvPicPr>
@@ -7111,8 +7279,8 @@
         </p:blipFill>
         <p:spPr>
           <a:xfrm>
-            <a:off x="1383665" y="1591945"/>
-            <a:ext cx="7620635" cy="4178300"/>
+            <a:off x="699770" y="2025015"/>
+            <a:ext cx="9917430" cy="4428490"/>
           </a:xfrm>
           <a:prstGeom prst="rect">
             <a:avLst/>

</xml_diff>

<commit_message>
vault backup: 2024-07-19 09:22:24
</commit_message>
<xml_diff>
--- a/06-ppt/discussion/0719.pptx
+++ b/06-ppt/discussion/0719.pptx
@@ -14,6 +14,8 @@
     <p:sldId id="270" r:id="rId7"/>
     <p:sldId id="269" r:id="rId8"/>
     <p:sldId id="271" r:id="rId9"/>
+    <p:sldId id="273" r:id="rId10"/>
+    <p:sldId id="274" r:id="rId11"/>
   </p:sldIdLst>
   <p:sldSz cx="12192000" cy="6858000"/>
   <p:notesSz cx="6858000" cy="9144000"/>
@@ -545,7 +547,7 @@
                 <a:ea typeface="宋体" pitchFamily="2" charset="-122"/>
                 <a:cs typeface="Times New Roman" panose="02020503050405090304" pitchFamily="18" charset="0"/>
               </a:rPr>
-              <a:t>ROS2 consists of three basic units</a:t>
+              <a:t>Many nodes in the reference system are actually doing some pseudo-work, namely finding prime numbers up to some maximum value. Depending on the platform, this maximum value needs to be changed so that these nodes don't spend too much time</a:t>
             </a:r>
             <a:endParaRPr lang="en-US" altLang="zh-CN" sz="1800" kern="100" dirty="0">
               <a:effectLst/>
@@ -553,9 +555,6 @@
               <a:ea typeface="宋体" pitchFamily="2" charset="-122"/>
               <a:cs typeface="Times New Roman" panose="02020503050405090304" pitchFamily="18" charset="0"/>
             </a:endParaRPr>
-          </a:p>
-          <a:p>
-            <a:endParaRPr lang="zh-CN" altLang="en-US" dirty="0"/>
           </a:p>
         </p:txBody>
       </p:sp>
@@ -633,39 +632,6 @@
           <a:bodyPr/>
           <a:lstStyle/>
           <a:p>
-            <a:pPr marL="0" marR="0" lvl="0" indent="0" algn="l" defTabSz="914400" rtl="0" eaLnBrk="1" fontAlgn="auto" latinLnBrk="0" hangingPunct="1">
-              <a:lnSpc>
-                <a:spcPct val="100000"/>
-              </a:lnSpc>
-              <a:spcBef>
-                <a:spcPts val="0"/>
-              </a:spcBef>
-              <a:spcAft>
-                <a:spcPts val="0"/>
-              </a:spcAft>
-              <a:buClrTx/>
-              <a:buSzTx/>
-              <a:buFontTx/>
-              <a:buNone/>
-              <a:defRPr/>
-            </a:pPr>
-            <a:r>
-              <a:rPr lang="en-US" altLang="zh-CN" sz="1800" kern="100" dirty="0">
-                <a:effectLst/>
-                <a:latin typeface="Calibri" panose="020F0502020204030204" pitchFamily="34" charset="0"/>
-                <a:ea typeface="宋体" pitchFamily="2" charset="-122"/>
-                <a:cs typeface="Times New Roman" panose="02020503050405090304" pitchFamily="18" charset="0"/>
-              </a:rPr>
-              <a:t>ROS2 consists of three basic units</a:t>
-            </a:r>
-            <a:endParaRPr lang="en-US" altLang="zh-CN" sz="1800" kern="100" dirty="0">
-              <a:effectLst/>
-              <a:latin typeface="Calibri" panose="020F0502020204030204" pitchFamily="34" charset="0"/>
-              <a:ea typeface="宋体" pitchFamily="2" charset="-122"/>
-              <a:cs typeface="Times New Roman" panose="02020503050405090304" pitchFamily="18" charset="0"/>
-            </a:endParaRPr>
-          </a:p>
-          <a:p>
             <a:endParaRPr lang="zh-CN" altLang="en-US" dirty="0"/>
           </a:p>
         </p:txBody>
@@ -744,39 +710,6 @@
           <a:bodyPr/>
           <a:lstStyle/>
           <a:p>
-            <a:pPr marL="0" marR="0" lvl="0" indent="0" algn="l" defTabSz="914400" rtl="0" eaLnBrk="1" fontAlgn="auto" latinLnBrk="0" hangingPunct="1">
-              <a:lnSpc>
-                <a:spcPct val="100000"/>
-              </a:lnSpc>
-              <a:spcBef>
-                <a:spcPts val="0"/>
-              </a:spcBef>
-              <a:spcAft>
-                <a:spcPts val="0"/>
-              </a:spcAft>
-              <a:buClrTx/>
-              <a:buSzTx/>
-              <a:buFontTx/>
-              <a:buNone/>
-              <a:defRPr/>
-            </a:pPr>
-            <a:r>
-              <a:rPr lang="en-US" altLang="zh-CN" sz="1800" kern="100" dirty="0">
-                <a:effectLst/>
-                <a:latin typeface="Calibri" panose="020F0502020204030204" pitchFamily="34" charset="0"/>
-                <a:ea typeface="宋体" pitchFamily="2" charset="-122"/>
-                <a:cs typeface="Times New Roman" panose="02020503050405090304" pitchFamily="18" charset="0"/>
-              </a:rPr>
-              <a:t>ROS2 consists of three basic units</a:t>
-            </a:r>
-            <a:endParaRPr lang="en-US" altLang="zh-CN" sz="1800" kern="100" dirty="0">
-              <a:effectLst/>
-              <a:latin typeface="Calibri" panose="020F0502020204030204" pitchFamily="34" charset="0"/>
-              <a:ea typeface="宋体" pitchFamily="2" charset="-122"/>
-              <a:cs typeface="Times New Roman" panose="02020503050405090304" pitchFamily="18" charset="0"/>
-            </a:endParaRPr>
-          </a:p>
-          <a:p>
             <a:endParaRPr lang="zh-CN" altLang="en-US" dirty="0"/>
           </a:p>
         </p:txBody>
@@ -855,38 +788,83 @@
           <a:bodyPr/>
           <a:lstStyle/>
           <a:p>
-            <a:pPr marL="0" marR="0" lvl="0" indent="0" algn="l" defTabSz="914400" rtl="0" eaLnBrk="1" fontAlgn="auto" latinLnBrk="0" hangingPunct="1">
-              <a:lnSpc>
-                <a:spcPct val="100000"/>
-              </a:lnSpc>
-              <a:spcBef>
-                <a:spcPts val="0"/>
-              </a:spcBef>
-              <a:spcAft>
-                <a:spcPts val="0"/>
-              </a:spcAft>
-              <a:buClrTx/>
-              <a:buSzTx/>
-              <a:buFontTx/>
-              <a:buNone/>
-              <a:defRPr/>
-            </a:pPr>
-            <a:r>
-              <a:rPr lang="en-US" altLang="zh-CN" sz="1800" kern="100" dirty="0">
-                <a:effectLst/>
-                <a:latin typeface="Calibri" panose="020F0502020204030204" pitchFamily="34" charset="0"/>
-                <a:ea typeface="宋体" pitchFamily="2" charset="-122"/>
-                <a:cs typeface="Times New Roman" panose="02020503050405090304" pitchFamily="18" charset="0"/>
-              </a:rPr>
-              <a:t>ROS2 consists of three basic units</a:t>
-            </a:r>
-            <a:endParaRPr lang="en-US" altLang="zh-CN" sz="1800" kern="100" dirty="0">
-              <a:effectLst/>
-              <a:latin typeface="Calibri" panose="020F0502020204030204" pitchFamily="34" charset="0"/>
-              <a:ea typeface="宋体" pitchFamily="2" charset="-122"/>
-              <a:cs typeface="Times New Roman" panose="02020503050405090304" pitchFamily="18" charset="0"/>
-            </a:endParaRPr>
-          </a:p>
+            <a:endParaRPr lang="zh-CN" altLang="en-US" dirty="0"/>
+          </a:p>
+        </p:txBody>
+      </p:sp>
+      <p:sp>
+        <p:nvSpPr>
+          <p:cNvPr id="4" name="灯片编号占位符 3"/>
+          <p:cNvSpPr>
+            <a:spLocks noGrp="1"/>
+          </p:cNvSpPr>
+          <p:nvPr>
+            <p:ph type="sldNum" sz="quarter" idx="5"/>
+          </p:nvPr>
+        </p:nvSpPr>
+        <p:spPr/>
+        <p:txBody>
+          <a:bodyPr/>
+          <a:lstStyle/>
+          <a:p>
+            <a:fld id="{4E0213E6-8C4C-437E-84EC-B5D10E90E209}" type="slidenum">
+              <a:rPr lang="zh-CN" altLang="en-US" smtClean="0"/>
+            </a:fld>
+            <a:endParaRPr lang="zh-CN" altLang="en-US"/>
+          </a:p>
+        </p:txBody>
+      </p:sp>
+    </p:spTree>
+  </p:cSld>
+  <p:clrMapOvr>
+    <a:masterClrMapping/>
+  </p:clrMapOvr>
+</p:notes>
+</file>
+
+<file path=ppt/notesSlides/notesSlide5.xml><?xml version="1.0" encoding="utf-8"?>
+<p:notes xmlns:a="http://schemas.openxmlformats.org/drawingml/2006/main" xmlns:r="http://schemas.openxmlformats.org/officeDocument/2006/relationships" xmlns:p="http://schemas.openxmlformats.org/presentationml/2006/main">
+  <p:cSld>
+    <p:spTree>
+      <p:nvGrpSpPr>
+        <p:cNvPr id="1" name=""/>
+        <p:cNvGrpSpPr/>
+        <p:nvPr/>
+      </p:nvGrpSpPr>
+      <p:grpSpPr>
+        <a:xfrm>
+          <a:off x="0" y="0"/>
+          <a:ext cx="0" cy="0"/>
+          <a:chOff x="0" y="0"/>
+          <a:chExt cx="0" cy="0"/>
+        </a:xfrm>
+      </p:grpSpPr>
+      <p:sp>
+        <p:nvSpPr>
+          <p:cNvPr id="2" name="幻灯片图像占位符 1"/>
+          <p:cNvSpPr>
+            <a:spLocks noGrp="1" noRot="1" noChangeAspect="1"/>
+          </p:cNvSpPr>
+          <p:nvPr>
+            <p:ph type="sldImg"/>
+          </p:nvPr>
+        </p:nvSpPr>
+        <p:spPr/>
+      </p:sp>
+      <p:sp>
+        <p:nvSpPr>
+          <p:cNvPr id="3" name="备注占位符 2"/>
+          <p:cNvSpPr>
+            <a:spLocks noGrp="1"/>
+          </p:cNvSpPr>
+          <p:nvPr>
+            <p:ph type="body" idx="1"/>
+          </p:nvPr>
+        </p:nvSpPr>
+        <p:spPr/>
+        <p:txBody>
+          <a:bodyPr/>
+          <a:lstStyle/>
           <a:p>
             <a:endParaRPr lang="zh-CN" altLang="en-US" dirty="0"/>
           </a:p>
@@ -6660,8 +6638,8 @@
         </p:nvSpPr>
         <p:spPr>
           <a:xfrm>
-            <a:off x="0" y="575652"/>
-            <a:ext cx="6611815" cy="5753344"/>
+            <a:off x="0" y="575945"/>
+            <a:ext cx="12066905" cy="5753100"/>
           </a:xfrm>
         </p:spPr>
         <p:txBody>
@@ -6671,13 +6649,266 @@
           <a:lstStyle/>
           <a:p>
             <a:r>
-              <a:rPr lang="en-US" altLang="zh-CN" sz="2000" dirty="0"/>
+              <a:rPr lang="en-US" altLang="zh-CN" sz="2000" b="1" dirty="0">
+                <a:latin typeface="微软雅黑" charset="0"/>
+                <a:ea typeface="微软雅黑" charset="0"/>
+                <a:cs typeface="微软雅黑" charset="0"/>
+                <a:sym typeface="+mn-ea"/>
+              </a:rPr>
+              <a:t>performance_test   </a:t>
+            </a:r>
+            <a:r>
+              <a:rPr lang="zh-CN" altLang="en-US" sz="2000" b="1" dirty="0">
+                <a:latin typeface="微软雅黑" charset="0"/>
+                <a:ea typeface="微软雅黑" charset="0"/>
+                <a:cs typeface="微软雅黑" charset="0"/>
+                <a:sym typeface="+mn-ea"/>
+              </a:rPr>
+              <a:t>（</a:t>
+            </a:r>
+            <a:r>
+              <a:rPr lang="en-US" altLang="zh-CN" sz="2000" dirty="0">
+                <a:latin typeface="微软雅黑" charset="0"/>
+                <a:ea typeface="微软雅黑" charset="0"/>
+                <a:cs typeface="微软雅黑" charset="0"/>
+              </a:rPr>
               <a:t>https://github.com/ros2/performance_test/</a:t>
             </a:r>
-            <a:endParaRPr lang="en-US" altLang="zh-CN" sz="2000" dirty="0"/>
-          </a:p>
-        </p:txBody>
-      </p:sp>
+            <a:r>
+              <a:rPr lang="zh-CN" altLang="en-US" sz="2000" dirty="0">
+                <a:latin typeface="微软雅黑" charset="0"/>
+                <a:ea typeface="微软雅黑" charset="0"/>
+                <a:cs typeface="微软雅黑" charset="0"/>
+              </a:rPr>
+              <a:t>）</a:t>
+            </a:r>
+            <a:endParaRPr lang="en-US" altLang="zh-CN" sz="2000" dirty="0">
+              <a:latin typeface="微软雅黑" charset="0"/>
+              <a:ea typeface="微软雅黑" charset="0"/>
+              <a:cs typeface="微软雅黑" charset="0"/>
+            </a:endParaRPr>
+          </a:p>
+          <a:p>
+            <a:r>
+              <a:rPr lang="en-US" altLang="zh-CN" sz="1600" dirty="0">
+                <a:latin typeface="微软雅黑" charset="0"/>
+                <a:ea typeface="微软雅黑" charset="0"/>
+                <a:cs typeface="微软雅黑" charset="0"/>
+              </a:rPr>
+              <a:t>Test the performance and latency of various communication methods (such as ROS 2, FastDDSetc.)</a:t>
+            </a:r>
+            <a:endParaRPr lang="en-US" altLang="zh-CN" sz="1600" dirty="0">
+              <a:latin typeface="微软雅黑" charset="0"/>
+              <a:ea typeface="微软雅黑" charset="0"/>
+              <a:cs typeface="微软雅黑" charset="0"/>
+            </a:endParaRPr>
+          </a:p>
+          <a:p>
+            <a:r>
+              <a:rPr lang="en-US" altLang="zh-CN" sz="1600" dirty="0">
+                <a:latin typeface="微软雅黑" charset="0"/>
+                <a:ea typeface="微软雅黑" charset="0"/>
+                <a:cs typeface="微软雅黑" charset="0"/>
+              </a:rPr>
+              <a:t>Optional message size (128--8m), number of publish and subscribe, number of threads...</a:t>
+            </a:r>
+            <a:endParaRPr lang="en-US" altLang="zh-CN" sz="1600" dirty="0">
+              <a:latin typeface="微软雅黑" charset="0"/>
+              <a:ea typeface="微软雅黑" charset="0"/>
+              <a:cs typeface="微软雅黑" charset="0"/>
+            </a:endParaRPr>
+          </a:p>
+          <a:p>
+            <a:r>
+              <a:rPr lang="en-US" altLang="zh-CN" sz="1600" dirty="0">
+                <a:latin typeface="微软雅黑" charset="0"/>
+                <a:ea typeface="微软雅黑" charset="0"/>
+                <a:cs typeface="微软雅黑" charset="0"/>
+              </a:rPr>
+              <a:t>But in tests, the scheduling policy did not have a significant impact</a:t>
+            </a:r>
+            <a:endParaRPr lang="en-US" altLang="zh-CN" sz="1600" dirty="0">
+              <a:latin typeface="微软雅黑" charset="0"/>
+              <a:ea typeface="微软雅黑" charset="0"/>
+              <a:cs typeface="微软雅黑" charset="0"/>
+            </a:endParaRPr>
+          </a:p>
+          <a:p>
+            <a:r>
+              <a:rPr lang="en-US" altLang="zh-CN" sz="2000" b="1" dirty="0">
+                <a:latin typeface="微软雅黑" charset="0"/>
+                <a:ea typeface="微软雅黑" charset="0"/>
+                <a:cs typeface="微软雅黑" charset="0"/>
+                <a:sym typeface="+mn-ea"/>
+              </a:rPr>
+              <a:t>reference-system  </a:t>
+            </a:r>
+            <a:r>
+              <a:rPr lang="zh-CN" altLang="en-US" sz="2000" b="1" dirty="0">
+                <a:latin typeface="微软雅黑" charset="0"/>
+                <a:ea typeface="微软雅黑" charset="0"/>
+                <a:cs typeface="微软雅黑" charset="0"/>
+                <a:sym typeface="+mn-ea"/>
+              </a:rPr>
+              <a:t>（</a:t>
+            </a:r>
+            <a:r>
+              <a:rPr lang="en-US" altLang="zh-CN" sz="2000" dirty="0">
+                <a:latin typeface="微软雅黑" charset="0"/>
+                <a:ea typeface="微软雅黑" charset="0"/>
+                <a:cs typeface="微软雅黑" charset="0"/>
+              </a:rPr>
+              <a:t>https://github.com/ros-realtime/reference-system/</a:t>
+            </a:r>
+            <a:r>
+              <a:rPr lang="zh-CN" altLang="en-US" sz="2000" dirty="0">
+                <a:latin typeface="微软雅黑" charset="0"/>
+                <a:ea typeface="微软雅黑" charset="0"/>
+                <a:cs typeface="微软雅黑" charset="0"/>
+              </a:rPr>
+              <a:t>）</a:t>
+            </a:r>
+            <a:endParaRPr lang="en-US" altLang="zh-CN" sz="2000" dirty="0">
+              <a:latin typeface="微软雅黑" charset="0"/>
+              <a:ea typeface="微软雅黑" charset="0"/>
+              <a:cs typeface="微软雅黑" charset="0"/>
+            </a:endParaRPr>
+          </a:p>
+          <a:p>
+            <a:r>
+              <a:rPr lang="zh-CN" altLang="en-US" sz="1600" dirty="0">
+                <a:latin typeface="微软雅黑" charset="0"/>
+                <a:ea typeface="微软雅黑" charset="0"/>
+                <a:cs typeface="微软雅黑" charset="0"/>
+              </a:rPr>
+              <a:t>This example simulates a real scenario, with a variety of node types, arranged in a way that conforms to the actual system (as shown in the figure, publish-subscribe order, etc.)</a:t>
+            </a:r>
+            <a:endParaRPr lang="zh-CN" altLang="en-US" sz="1600" dirty="0">
+              <a:latin typeface="微软雅黑" charset="0"/>
+              <a:ea typeface="微软雅黑" charset="0"/>
+              <a:cs typeface="微软雅黑" charset="0"/>
+            </a:endParaRPr>
+          </a:p>
+          <a:p>
+            <a:r>
+              <a:rPr lang="zh-CN" altLang="en-US" sz="1600" dirty="0">
+                <a:latin typeface="微软雅黑" charset="0"/>
+                <a:ea typeface="微软雅黑" charset="0"/>
+                <a:cs typeface="微软雅黑" charset="0"/>
+              </a:rPr>
+              <a:t>The message size is fixed at 4kB. The single </a:t>
+            </a:r>
+            <a:r>
+              <a:rPr lang="en-US" altLang="zh-CN" sz="1600" dirty="0">
+                <a:latin typeface="微软雅黑" charset="0"/>
+                <a:ea typeface="微软雅黑" charset="0"/>
+                <a:cs typeface="微软雅黑" charset="0"/>
+              </a:rPr>
+              <a:t>run </a:t>
+            </a:r>
+            <a:r>
+              <a:rPr lang="zh-CN" altLang="en-US" sz="1600" dirty="0">
+                <a:latin typeface="微软雅黑" charset="0"/>
+                <a:ea typeface="微软雅黑" charset="0"/>
+                <a:cs typeface="微软雅黑" charset="0"/>
+              </a:rPr>
+              <a:t>time can be configured according to the platform performance (default 4096)</a:t>
+            </a:r>
+            <a:endParaRPr lang="zh-CN" altLang="en-US" sz="1600" dirty="0">
+              <a:latin typeface="微软雅黑" charset="0"/>
+              <a:ea typeface="微软雅黑" charset="0"/>
+              <a:cs typeface="微软雅黑" charset="0"/>
+            </a:endParaRPr>
+          </a:p>
+          <a:p>
+            <a:r>
+              <a:rPr lang="zh-CN" altLang="en-US" sz="1600" dirty="0">
+                <a:latin typeface="微软雅黑" charset="0"/>
+                <a:ea typeface="微软雅黑" charset="0"/>
+                <a:cs typeface="微软雅黑" charset="0"/>
+              </a:rPr>
+              <a:t>Use</a:t>
+            </a:r>
+            <a:r>
+              <a:rPr lang="en-US" altLang="zh-CN" sz="1600" dirty="0">
+                <a:latin typeface="微软雅黑" charset="0"/>
+                <a:ea typeface="微软雅黑" charset="0"/>
+                <a:cs typeface="微软雅黑" charset="0"/>
+              </a:rPr>
+              <a:t>d</a:t>
+            </a:r>
+            <a:r>
+              <a:rPr lang="zh-CN" altLang="en-US" sz="1600" dirty="0">
+                <a:latin typeface="微软雅黑" charset="0"/>
+                <a:ea typeface="微软雅黑" charset="0"/>
+                <a:cs typeface="微软雅黑" charset="0"/>
+              </a:rPr>
+              <a:t> the test package autoware_default_singlethreaded: All nodes are assigned to the same single-threaded ROS executor</a:t>
+            </a:r>
+            <a:endParaRPr lang="zh-CN" altLang="en-US" sz="1600" dirty="0">
+              <a:latin typeface="微软雅黑" charset="0"/>
+              <a:ea typeface="微软雅黑" charset="0"/>
+              <a:cs typeface="微软雅黑" charset="0"/>
+            </a:endParaRPr>
+          </a:p>
+        </p:txBody>
+      </p:sp>
+      <p:pic>
+        <p:nvPicPr>
+          <p:cNvPr id="4" name="图片 3"/>
+          <p:cNvPicPr>
+            <a:picLocks noChangeAspect="1"/>
+          </p:cNvPicPr>
+          <p:nvPr>
+            <p:custDataLst>
+              <p:tags r:id="rId1"/>
+            </p:custDataLst>
+          </p:nvPr>
+        </p:nvPicPr>
+        <p:blipFill>
+          <a:blip r:embed="rId2"/>
+          <a:stretch>
+            <a:fillRect/>
+          </a:stretch>
+        </p:blipFill>
+        <p:spPr>
+          <a:xfrm>
+            <a:off x="3953510" y="4015105"/>
+            <a:ext cx="8238490" cy="2498725"/>
+          </a:xfrm>
+          <a:prstGeom prst="rect">
+            <a:avLst/>
+          </a:prstGeom>
+        </p:spPr>
+      </p:pic>
+      <p:pic>
+        <p:nvPicPr>
+          <p:cNvPr id="5" name="图片 4"/>
+          <p:cNvPicPr>
+            <a:picLocks noChangeAspect="1"/>
+          </p:cNvPicPr>
+          <p:nvPr>
+            <p:custDataLst>
+              <p:tags r:id="rId3"/>
+            </p:custDataLst>
+          </p:nvPr>
+        </p:nvPicPr>
+        <p:blipFill>
+          <a:blip r:embed="rId4"/>
+          <a:stretch>
+            <a:fillRect/>
+          </a:stretch>
+        </p:blipFill>
+        <p:spPr>
+          <a:xfrm>
+            <a:off x="0" y="4015105"/>
+            <a:ext cx="3923030" cy="2166620"/>
+          </a:xfrm>
+          <a:prstGeom prst="rect">
+            <a:avLst/>
+          </a:prstGeom>
+        </p:spPr>
+      </p:pic>
     </p:spTree>
   </p:cSld>
   <p:clrMapOvr>
@@ -6774,90 +7005,67 @@
           <a:lstStyle/>
           <a:p>
             <a:r>
-              <a:rPr lang="zh-CN" altLang="en-US" sz="2000" dirty="0"/>
-              <a:t>修改调度策略为</a:t>
-            </a:r>
-            <a:r>
-              <a:rPr lang="en-US" altLang="zh-CN" sz="2000" dirty="0"/>
-              <a:t>FIFO</a:t>
-            </a:r>
-            <a:r>
-              <a:rPr lang="zh-CN" altLang="en-US" sz="2000" dirty="0"/>
-              <a:t>，优先级为</a:t>
-            </a:r>
-            <a:r>
-              <a:rPr lang="en-US" altLang="zh-CN" sz="2000" dirty="0"/>
-              <a:t>9</a:t>
-            </a:r>
-            <a:endParaRPr lang="en-US" altLang="zh-CN" sz="2000" dirty="0"/>
-          </a:p>
-          <a:p>
-            <a:r>
               <a:rPr lang="zh-CN" altLang="en-US" sz="2000" dirty="0">
-                <a:ea typeface="宋体" charset="0"/>
+                <a:latin typeface="微软雅黑" charset="0"/>
+                <a:ea typeface="微软雅黑" charset="0"/>
+                <a:cs typeface="微软雅黑" charset="0"/>
               </a:rPr>
-              <a:t>始终满负载的情况下，</a:t>
+              <a:t>Change the scheduling strategy to FIFO, priority 9</a:t>
             </a:r>
             <a:endParaRPr lang="zh-CN" altLang="en-US" sz="2000" dirty="0">
-              <a:ea typeface="宋体" charset="0"/>
+              <a:latin typeface="微软雅黑" charset="0"/>
+              <a:ea typeface="微软雅黑" charset="0"/>
+              <a:cs typeface="微软雅黑" charset="0"/>
             </a:endParaRPr>
           </a:p>
           <a:p>
             <a:r>
               <a:rPr lang="zh-CN" altLang="en-US" sz="2000" dirty="0">
-                <a:ea typeface="宋体" charset="0"/>
+                <a:latin typeface="微软雅黑" charset="0"/>
+                <a:ea typeface="微软雅黑" charset="0"/>
+                <a:cs typeface="微软雅黑" charset="0"/>
               </a:rPr>
-              <a:t>默认调度策略：</a:t>
-            </a:r>
-            <a:r>
-              <a:rPr lang="en-US" altLang="zh-CN" sz="2000" dirty="0">
-                <a:ea typeface="宋体" charset="0"/>
+              <a:t>When the load is always full,</a:t>
+            </a:r>
+            <a:endParaRPr lang="zh-CN" altLang="en-US" sz="2000" dirty="0">
+              <a:latin typeface="微软雅黑" charset="0"/>
+              <a:ea typeface="微软雅黑" charset="0"/>
+              <a:cs typeface="微软雅黑" charset="0"/>
+            </a:endParaRPr>
+          </a:p>
+          <a:p>
+            <a:r>
+              <a:rPr lang="zh-CN" altLang="en-US" sz="2000" dirty="0">
+                <a:latin typeface="微软雅黑" charset="0"/>
+                <a:ea typeface="微软雅黑" charset="0"/>
+                <a:cs typeface="微软雅黑" charset="0"/>
               </a:rPr>
-              <a:t>ROS2</a:t>
-            </a:r>
+              <a:t>Default scheduling strategy: ROS2 program will be disturbed, and there will be more delays.</a:t>
+            </a:r>
+            <a:endParaRPr lang="zh-CN" altLang="en-US" sz="2000" dirty="0">
+              <a:latin typeface="微软雅黑" charset="0"/>
+              <a:ea typeface="微软雅黑" charset="0"/>
+              <a:cs typeface="微软雅黑" charset="0"/>
+            </a:endParaRPr>
+          </a:p>
+          <a:p>
+            <a:pPr>
+              <a:lnSpc>
+                <a:spcPct val="100000"/>
+              </a:lnSpc>
+            </a:pPr>
             <a:r>
               <a:rPr lang="zh-CN" altLang="en-US" sz="2000" dirty="0">
-                <a:ea typeface="宋体" charset="0"/>
+                <a:latin typeface="微软雅黑" charset="0"/>
+                <a:ea typeface="微软雅黑" charset="0"/>
+                <a:cs typeface="微软雅黑" charset="0"/>
               </a:rPr>
-              <a:t>程序会被干扰，出现较多延迟的现象。</a:t>
+              <a:t>FIFO scheduling strategy: ROS2 program delay is significantly reduced</a:t>
             </a:r>
             <a:endParaRPr lang="zh-CN" altLang="en-US" sz="2000" dirty="0">
-              <a:ea typeface="宋体" charset="0"/>
-            </a:endParaRPr>
-          </a:p>
-          <a:p>
-            <a:r>
-              <a:rPr lang="en-US" altLang="zh-CN" sz="2000" dirty="0">
-                <a:ea typeface="宋体" charset="0"/>
-              </a:rPr>
-              <a:t>FIFO</a:t>
-            </a:r>
-            <a:r>
-              <a:rPr lang="zh-CN" altLang="en-US" sz="2000" dirty="0">
-                <a:ea typeface="宋体" charset="0"/>
-              </a:rPr>
-              <a:t>调度策略：</a:t>
-            </a:r>
-            <a:r>
-              <a:rPr lang="en-US" altLang="zh-CN" sz="2000" dirty="0">
-                <a:ea typeface="宋体" charset="0"/>
-              </a:rPr>
-              <a:t>ROS2</a:t>
-            </a:r>
-            <a:r>
-              <a:rPr lang="zh-CN" altLang="en-US" sz="2000" dirty="0">
-                <a:ea typeface="宋体" charset="0"/>
-              </a:rPr>
-              <a:t>程序延迟明显</a:t>
-            </a:r>
-            <a:r>
-              <a:rPr lang="zh-CN" altLang="en-US" sz="2000" dirty="0">
-                <a:ea typeface="宋体" charset="0"/>
-              </a:rPr>
-              <a:t>减少</a:t>
-            </a:r>
-            <a:endParaRPr lang="zh-CN" altLang="en-US" sz="2000" dirty="0">
-              <a:ea typeface="宋体" charset="0"/>
+              <a:latin typeface="微软雅黑" charset="0"/>
+              <a:ea typeface="微软雅黑" charset="0"/>
+              <a:cs typeface="微软雅黑" charset="0"/>
             </a:endParaRPr>
           </a:p>
         </p:txBody>
@@ -6882,7 +7090,7 @@
         </p:blipFill>
         <p:spPr>
           <a:xfrm>
-            <a:off x="1434465" y="2248535"/>
+            <a:off x="2159635" y="2413635"/>
             <a:ext cx="7258050" cy="4145280"/>
           </a:xfrm>
           <a:prstGeom prst="rect">
@@ -6987,87 +7195,32 @@
           <a:p>
             <a:r>
               <a:rPr lang="zh-CN" altLang="en-US" sz="2000" dirty="0">
-                <a:sym typeface="+mn-ea"/>
+                <a:latin typeface="微软雅黑" charset="0"/>
+                <a:ea typeface="微软雅黑" charset="0"/>
               </a:rPr>
-              <a:t>修改调度策略为</a:t>
-            </a:r>
-            <a:r>
-              <a:rPr lang="en-US" altLang="zh-CN" sz="2000" dirty="0">
-                <a:sym typeface="+mn-ea"/>
+              <a:t>Change the scheduling strategy to FIFO, with priorities 9 and 89.</a:t>
+            </a:r>
+            <a:endParaRPr lang="zh-CN" altLang="en-US" sz="2000" dirty="0">
+              <a:latin typeface="微软雅黑" charset="0"/>
+              <a:ea typeface="微软雅黑" charset="0"/>
+            </a:endParaRPr>
+          </a:p>
+          <a:p>
+            <a:pPr>
+              <a:lnSpc>
+                <a:spcPct val="120000"/>
+              </a:lnSpc>
+            </a:pPr>
+            <a:r>
+              <a:rPr lang="zh-CN" altLang="en-US" sz="2000" dirty="0">
+                <a:latin typeface="微软雅黑" charset="0"/>
+                <a:ea typeface="微软雅黑" charset="0"/>
               </a:rPr>
-              <a:t>FIFO</a:t>
-            </a:r>
-            <a:r>
-              <a:rPr lang="zh-CN" altLang="en-US" sz="2000" dirty="0">
-                <a:sym typeface="+mn-ea"/>
-              </a:rPr>
-              <a:t>，优先级为</a:t>
-            </a:r>
-            <a:r>
-              <a:rPr lang="en-US" altLang="zh-CN" sz="2000" dirty="0">
-                <a:sym typeface="+mn-ea"/>
-              </a:rPr>
-              <a:t>9</a:t>
-            </a:r>
-            <a:r>
-              <a:rPr lang="zh-CN" altLang="en-US" sz="2000" dirty="0">
-                <a:sym typeface="+mn-ea"/>
-              </a:rPr>
-              <a:t>和</a:t>
-            </a:r>
-            <a:r>
-              <a:rPr lang="en-US" altLang="zh-CN" sz="2000" dirty="0">
-                <a:sym typeface="+mn-ea"/>
-              </a:rPr>
-              <a:t>89</a:t>
-            </a:r>
-            <a:endParaRPr lang="en-US" altLang="zh-CN" sz="2000" dirty="0"/>
-          </a:p>
-          <a:p>
-            <a:r>
-              <a:rPr lang="zh-CN" altLang="en-US" sz="2000" dirty="0">
-                <a:ea typeface="宋体" charset="0"/>
-                <a:sym typeface="+mn-ea"/>
-              </a:rPr>
-              <a:t>始终满负载的情况下，</a:t>
+              <a:t>Under full load conditions, the change in priority has no significant effect on the operation of the ROS2 program (such as latency).</a:t>
             </a:r>
             <a:endParaRPr lang="zh-CN" altLang="en-US" sz="2000" dirty="0">
-              <a:ea typeface="宋体" charset="0"/>
-            </a:endParaRPr>
-          </a:p>
-          <a:p>
-            <a:r>
-              <a:rPr lang="zh-CN" altLang="en-US" sz="2000" dirty="0">
-                <a:ea typeface="宋体" charset="0"/>
-              </a:rPr>
-              <a:t>优先级的改变对</a:t>
-            </a:r>
-            <a:r>
-              <a:rPr lang="en-US" altLang="zh-CN" sz="2000" dirty="0">
-                <a:ea typeface="宋体" charset="0"/>
-              </a:rPr>
-              <a:t>ROS2</a:t>
-            </a:r>
-            <a:r>
-              <a:rPr lang="zh-CN" altLang="en-US" sz="2000" dirty="0">
-                <a:ea typeface="宋体" charset="0"/>
-              </a:rPr>
-              <a:t>程序的运行（例如</a:t>
-            </a:r>
-            <a:r>
-              <a:rPr lang="zh-CN" altLang="en-US" sz="2000" dirty="0">
-                <a:ea typeface="宋体" charset="0"/>
-              </a:rPr>
-              <a:t>延迟）并没有产生明显的</a:t>
-            </a:r>
-            <a:r>
-              <a:rPr lang="zh-CN" altLang="en-US" sz="2000" dirty="0">
-                <a:ea typeface="宋体" charset="0"/>
-              </a:rPr>
-              <a:t>影响</a:t>
-            </a:r>
-            <a:endParaRPr lang="zh-CN" altLang="en-US" sz="2000" dirty="0">
-              <a:ea typeface="宋体" charset="0"/>
+              <a:latin typeface="微软雅黑" charset="0"/>
+              <a:ea typeface="微软雅黑" charset="0"/>
             </a:endParaRPr>
           </a:p>
         </p:txBody>
@@ -7092,7 +7245,7 @@
         </p:blipFill>
         <p:spPr>
           <a:xfrm>
-            <a:off x="1907540" y="2125980"/>
+            <a:off x="1645920" y="1783715"/>
             <a:ext cx="8433435" cy="4624070"/>
           </a:xfrm>
           <a:prstGeom prst="rect">
@@ -7195,66 +7348,38 @@
           </a:bodyPr>
           <a:lstStyle/>
           <a:p>
-            <a:r>
-              <a:rPr lang="zh-CN" altLang="en-US" sz="2000" dirty="0">
+            <a:pPr>
+              <a:lnSpc>
+                <a:spcPct val="120000"/>
+              </a:lnSpc>
+            </a:pPr>
+            <a:r>
+              <a:rPr sz="2000" dirty="0">
+                <a:latin typeface="微软雅黑" charset="0"/>
+                <a:ea typeface="微软雅黑" charset="0"/>
                 <a:sym typeface="+mn-ea"/>
               </a:rPr>
-              <a:t>修改调度策略为</a:t>
-            </a:r>
-            <a:r>
-              <a:rPr lang="en-US" altLang="zh-CN" sz="2000" dirty="0">
+              <a:t>Change the scheduling strategy to DDL</a:t>
+            </a:r>
+            <a:endParaRPr sz="2000" dirty="0">
+              <a:latin typeface="微软雅黑" charset="0"/>
+              <a:ea typeface="微软雅黑" charset="0"/>
+              <a:sym typeface="+mn-ea"/>
+            </a:endParaRPr>
+          </a:p>
+          <a:p>
+            <a:r>
+              <a:rPr sz="2000" dirty="0">
+                <a:latin typeface="微软雅黑" charset="0"/>
+                <a:ea typeface="微软雅黑" charset="0"/>
                 <a:sym typeface="+mn-ea"/>
               </a:rPr>
-              <a:t>DDL</a:t>
-            </a:r>
-            <a:endParaRPr lang="en-US" altLang="zh-CN" sz="2000" dirty="0"/>
-          </a:p>
-          <a:p>
-            <a:r>
-              <a:rPr lang="zh-CN" altLang="en-US" sz="2000" dirty="0">
-                <a:ea typeface="宋体" charset="0"/>
-                <a:sym typeface="+mn-ea"/>
-              </a:rPr>
-              <a:t>始终满负载的情况下，</a:t>
-            </a:r>
-            <a:endParaRPr lang="zh-CN" altLang="en-US" sz="2000" dirty="0">
-              <a:ea typeface="宋体" charset="0"/>
+              <a:t>When the load is always full, the ROS2 program will be less disturbed under the DDL scheduling strategy</a:t>
+            </a:r>
+            <a:endParaRPr sz="2000" dirty="0">
+              <a:latin typeface="微软雅黑" charset="0"/>
+              <a:ea typeface="微软雅黑" charset="0"/>
               <a:sym typeface="+mn-ea"/>
-            </a:endParaRPr>
-          </a:p>
-          <a:p>
-            <a:r>
-              <a:rPr lang="en-US" altLang="zh-CN" sz="2000" dirty="0">
-                <a:ea typeface="宋体" charset="0"/>
-              </a:rPr>
-              <a:t>ROS2</a:t>
-            </a:r>
-            <a:r>
-              <a:rPr lang="zh-CN" altLang="en-US" sz="2000" dirty="0">
-                <a:ea typeface="宋体" charset="0"/>
-              </a:rPr>
-              <a:t>程序在</a:t>
-            </a:r>
-            <a:r>
-              <a:rPr lang="en-US" altLang="zh-CN" sz="2000" dirty="0">
-                <a:ea typeface="宋体" charset="0"/>
-              </a:rPr>
-              <a:t>DDL</a:t>
-            </a:r>
-            <a:r>
-              <a:rPr lang="zh-CN" altLang="en-US" sz="2000" dirty="0">
-                <a:ea typeface="宋体" charset="0"/>
-              </a:rPr>
-              <a:t>调度策略下受到更少的</a:t>
-            </a:r>
-            <a:r>
-              <a:rPr lang="zh-CN" altLang="en-US" sz="2000" dirty="0">
-                <a:ea typeface="宋体" charset="0"/>
-              </a:rPr>
-              <a:t>干扰</a:t>
-            </a:r>
-            <a:endParaRPr lang="zh-CN" altLang="en-US" sz="2000" dirty="0">
-              <a:ea typeface="宋体" charset="0"/>
             </a:endParaRPr>
           </a:p>
         </p:txBody>
@@ -7279,8 +7404,254 @@
         </p:blipFill>
         <p:spPr>
           <a:xfrm>
-            <a:off x="699770" y="2025015"/>
+            <a:off x="1137285" y="2025015"/>
             <a:ext cx="9917430" cy="4428490"/>
+          </a:xfrm>
+          <a:prstGeom prst="rect">
+            <a:avLst/>
+          </a:prstGeom>
+        </p:spPr>
+      </p:pic>
+    </p:spTree>
+  </p:cSld>
+  <p:clrMapOvr>
+    <a:masterClrMapping/>
+  </p:clrMapOvr>
+</p:sld>
+</file>
+
+<file path=ppt/slides/slide6.xml><?xml version="1.0" encoding="utf-8"?>
+<p:sld xmlns:a="http://schemas.openxmlformats.org/drawingml/2006/main" xmlns:r="http://schemas.openxmlformats.org/officeDocument/2006/relationships" xmlns:p="http://schemas.openxmlformats.org/presentationml/2006/main">
+  <p:cSld>
+    <p:spTree>
+      <p:nvGrpSpPr>
+        <p:cNvPr id="1" name=""/>
+        <p:cNvGrpSpPr/>
+        <p:nvPr/>
+      </p:nvGrpSpPr>
+      <p:grpSpPr>
+        <a:xfrm>
+          <a:off x="0" y="0"/>
+          <a:ext cx="0" cy="0"/>
+          <a:chOff x="0" y="0"/>
+          <a:chExt cx="0" cy="0"/>
+        </a:xfrm>
+      </p:grpSpPr>
+      <p:sp>
+        <p:nvSpPr>
+          <p:cNvPr id="2" name="标题 1"/>
+          <p:cNvSpPr>
+            <a:spLocks noGrp="1"/>
+          </p:cNvSpPr>
+          <p:nvPr>
+            <p:ph type="title"/>
+          </p:nvPr>
+        </p:nvSpPr>
+        <p:spPr>
+          <a:xfrm>
+            <a:off x="0" y="0"/>
+            <a:ext cx="10515600" cy="575652"/>
+          </a:xfrm>
+        </p:spPr>
+        <p:txBody>
+          <a:bodyPr>
+            <a:normAutofit fontScale="90000"/>
+          </a:bodyPr>
+          <a:lstStyle/>
+          <a:p>
+            <a:pPr>
+              <a:lnSpc>
+                <a:spcPct val="110000"/>
+              </a:lnSpc>
+            </a:pPr>
+            <a:r>
+              <a:rPr lang="en-US" altLang="zh-CN" dirty="0">
+                <a:latin typeface="微软雅黑" charset="0"/>
+                <a:ea typeface="微软雅黑" charset="0"/>
+              </a:rPr>
+              <a:t>Benchmark &amp;</a:t>
+            </a:r>
+            <a:r>
+              <a:rPr lang="en-US" altLang="zh-CN" dirty="0">
+                <a:latin typeface="微软雅黑" charset="0"/>
+                <a:ea typeface="微软雅黑" charset="0"/>
+              </a:rPr>
+              <a:t> ROS2</a:t>
+            </a:r>
+            <a:endParaRPr lang="en-US" altLang="zh-CN" dirty="0">
+              <a:latin typeface="微软雅黑" charset="0"/>
+              <a:ea typeface="微软雅黑" charset="0"/>
+            </a:endParaRPr>
+          </a:p>
+        </p:txBody>
+      </p:sp>
+      <p:sp>
+        <p:nvSpPr>
+          <p:cNvPr id="3" name="内容占位符 2"/>
+          <p:cNvSpPr>
+            <a:spLocks noGrp="1"/>
+          </p:cNvSpPr>
+          <p:nvPr>
+            <p:ph idx="1"/>
+          </p:nvPr>
+        </p:nvSpPr>
+        <p:spPr>
+          <a:xfrm>
+            <a:off x="0" y="575945"/>
+            <a:ext cx="11958955" cy="5753100"/>
+          </a:xfrm>
+        </p:spPr>
+        <p:txBody>
+          <a:bodyPr>
+            <a:normAutofit/>
+          </a:bodyPr>
+          <a:lstStyle/>
+          <a:p>
+            <a:pPr>
+              <a:lnSpc>
+                <a:spcPct val="130000"/>
+              </a:lnSpc>
+            </a:pPr>
+            <a:r>
+              <a:rPr sz="2000" dirty="0">
+                <a:latin typeface="微软雅黑" charset="0"/>
+                <a:ea typeface="微软雅黑" charset="0"/>
+                <a:sym typeface="+mn-ea"/>
+              </a:rPr>
+              <a:t>Modify the scheduling strategy to FIFO--OTHER--DDL</a:t>
+            </a:r>
+            <a:endParaRPr sz="2000" dirty="0">
+              <a:latin typeface="微软雅黑" charset="0"/>
+              <a:ea typeface="微软雅黑" charset="0"/>
+              <a:sym typeface="+mn-ea"/>
+            </a:endParaRPr>
+          </a:p>
+          <a:p>
+            <a:pPr>
+              <a:lnSpc>
+                <a:spcPct val="130000"/>
+              </a:lnSpc>
+            </a:pPr>
+            <a:r>
+              <a:rPr sz="2000" dirty="0">
+                <a:latin typeface="微软雅黑" charset="0"/>
+                <a:ea typeface="微软雅黑" charset="0"/>
+                <a:sym typeface="+mn-ea"/>
+              </a:rPr>
+              <a:t>The real-time scheduling strategy will reduce the delay or interference of the ROS2 program, but the impact of the FIFO and DDL scheduling strategies on ROS2 under the non-real-time kernel does not show a significant difference</a:t>
+            </a:r>
+            <a:endParaRPr sz="2000" dirty="0">
+              <a:latin typeface="微软雅黑" charset="0"/>
+              <a:ea typeface="微软雅黑" charset="0"/>
+              <a:sym typeface="+mn-ea"/>
+            </a:endParaRPr>
+          </a:p>
+        </p:txBody>
+      </p:sp>
+      <p:pic>
+        <p:nvPicPr>
+          <p:cNvPr id="4" name="图片 3"/>
+          <p:cNvPicPr>
+            <a:picLocks noChangeAspect="1"/>
+          </p:cNvPicPr>
+          <p:nvPr>
+            <p:custDataLst>
+              <p:tags r:id="rId1"/>
+            </p:custDataLst>
+          </p:nvPr>
+        </p:nvPicPr>
+        <p:blipFill>
+          <a:blip r:embed="rId2"/>
+          <a:stretch>
+            <a:fillRect/>
+          </a:stretch>
+        </p:blipFill>
+        <p:spPr>
+          <a:xfrm>
+            <a:off x="1590040" y="2837180"/>
+            <a:ext cx="7969885" cy="2898775"/>
+          </a:xfrm>
+          <a:prstGeom prst="rect">
+            <a:avLst/>
+          </a:prstGeom>
+        </p:spPr>
+      </p:pic>
+    </p:spTree>
+  </p:cSld>
+  <p:clrMapOvr>
+    <a:masterClrMapping/>
+  </p:clrMapOvr>
+</p:sld>
+</file>
+
+<file path=ppt/slides/slide7.xml><?xml version="1.0" encoding="utf-8"?>
+<p:sld xmlns:a="http://schemas.openxmlformats.org/drawingml/2006/main" xmlns:r="http://schemas.openxmlformats.org/officeDocument/2006/relationships" xmlns:p="http://schemas.openxmlformats.org/presentationml/2006/main">
+  <p:cSld>
+    <p:spTree>
+      <p:nvGrpSpPr>
+        <p:cNvPr id="1" name=""/>
+        <p:cNvGrpSpPr/>
+        <p:nvPr/>
+      </p:nvGrpSpPr>
+      <p:grpSpPr/>
+      <p:sp>
+        <p:nvSpPr>
+          <p:cNvPr id="2" name="标题 1"/>
+          <p:cNvSpPr>
+            <a:spLocks noGrp="1"/>
+          </p:cNvSpPr>
+          <p:nvPr>
+            <p:ph type="title"/>
+          </p:nvPr>
+        </p:nvSpPr>
+        <p:spPr/>
+        <p:txBody>
+          <a:bodyPr/>
+          <a:p>
+            <a:endParaRPr lang="zh-CN" altLang="en-US"/>
+          </a:p>
+        </p:txBody>
+      </p:sp>
+      <p:sp>
+        <p:nvSpPr>
+          <p:cNvPr id="3" name="内容占位符 2"/>
+          <p:cNvSpPr>
+            <a:spLocks noGrp="1"/>
+          </p:cNvSpPr>
+          <p:nvPr>
+            <p:ph idx="1"/>
+          </p:nvPr>
+        </p:nvSpPr>
+        <p:spPr/>
+        <p:txBody>
+          <a:bodyPr/>
+          <a:p>
+            <a:endParaRPr lang="zh-CN" altLang="en-US"/>
+          </a:p>
+        </p:txBody>
+      </p:sp>
+      <p:pic>
+        <p:nvPicPr>
+          <p:cNvPr id="9" name="图片 8"/>
+          <p:cNvPicPr>
+            <a:picLocks noChangeAspect="1"/>
+          </p:cNvPicPr>
+          <p:nvPr>
+            <p:custDataLst>
+              <p:tags r:id="rId1"/>
+            </p:custDataLst>
+          </p:nvPr>
+        </p:nvPicPr>
+        <p:blipFill>
+          <a:blip r:embed="rId2"/>
+          <a:stretch>
+            <a:fillRect/>
+          </a:stretch>
+        </p:blipFill>
+        <p:spPr>
+          <a:xfrm>
+            <a:off x="2890396" y="1276177"/>
+            <a:ext cx="5398894" cy="4124036"/>
           </a:xfrm>
           <a:prstGeom prst="rect">
             <a:avLst/>
@@ -7308,6 +7679,30 @@
 </file>
 
 <file path=ppt/tags/tag3.xml><?xml version="1.0" encoding="utf-8"?>
+<p:tagLst xmlns:p="http://schemas.openxmlformats.org/presentationml/2006/main">
+  <p:tag name="KSO_WM_BEAUTIFY_FLAG" val=""/>
+</p:tagLst>
+</file>
+
+<file path=ppt/tags/tag4.xml><?xml version="1.0" encoding="utf-8"?>
+<p:tagLst xmlns:p="http://schemas.openxmlformats.org/presentationml/2006/main">
+  <p:tag name="KSO_WM_BEAUTIFY_FLAG" val=""/>
+</p:tagLst>
+</file>
+
+<file path=ppt/tags/tag5.xml><?xml version="1.0" encoding="utf-8"?>
+<p:tagLst xmlns:p="http://schemas.openxmlformats.org/presentationml/2006/main">
+  <p:tag name="KSO_WM_BEAUTIFY_FLAG" val=""/>
+</p:tagLst>
+</file>
+
+<file path=ppt/tags/tag6.xml><?xml version="1.0" encoding="utf-8"?>
+<p:tagLst xmlns:p="http://schemas.openxmlformats.org/presentationml/2006/main">
+  <p:tag name="KSO_WM_BEAUTIFY_FLAG" val=""/>
+</p:tagLst>
+</file>
+
+<file path=ppt/tags/tag7.xml><?xml version="1.0" encoding="utf-8"?>
 <p:tagLst xmlns:p="http://schemas.openxmlformats.org/presentationml/2006/main">
   <p:tag name="KSO_WM_BEAUTIFY_FLAG" val=""/>
 </p:tagLst>

</xml_diff>